<commit_message>
read me and presentation done
</commit_message>
<xml_diff>
--- a/docs/finalpresentation.pptx
+++ b/docs/finalpresentation.pptx
@@ -207,7 +207,7 @@
               <a:cs typeface="+mn-cs"/>
             </a:defRPr>
           </a:pPr>
-          <a:endParaRPr lang="pt-PT"/>
+          <a:endParaRPr lang="en-US"/>
         </a:p>
       </c:txPr>
     </c:title>
@@ -1326,7 +1326,7 @@
                 <a:cs typeface="+mn-cs"/>
               </a:defRPr>
             </a:pPr>
-            <a:endParaRPr lang="pt-PT"/>
+            <a:endParaRPr lang="en-US"/>
           </a:p>
         </c:txPr>
         <c:crossAx val="576068816"/>
@@ -1408,7 +1408,7 @@
                   <a:cs typeface="+mn-cs"/>
                 </a:defRPr>
               </a:pPr>
-              <a:endParaRPr lang="pt-PT"/>
+              <a:endParaRPr lang="en-US"/>
             </a:p>
           </c:txPr>
         </c:title>
@@ -1440,7 +1440,7 @@
                 <a:cs typeface="+mn-cs"/>
               </a:defRPr>
             </a:pPr>
-            <a:endParaRPr lang="pt-PT"/>
+            <a:endParaRPr lang="en-US"/>
           </a:p>
         </c:txPr>
         <c:crossAx val="576068176"/>
@@ -1483,7 +1483,7 @@
               <a:cs typeface="+mn-cs"/>
             </a:defRPr>
           </a:pPr>
-          <a:endParaRPr lang="pt-PT"/>
+          <a:endParaRPr lang="en-US"/>
         </a:p>
       </c:txPr>
     </c:legend>
@@ -1512,7 +1512,7 @@
       <a:pPr>
         <a:defRPr/>
       </a:pPr>
-      <a:endParaRPr lang="pt-PT"/>
+      <a:endParaRPr lang="en-US"/>
     </a:p>
   </c:txPr>
   <c:externalData r:id="rId3">
@@ -1591,7 +1591,7 @@
               <a:cs typeface="+mn-cs"/>
             </a:defRPr>
           </a:pPr>
-          <a:endParaRPr lang="pt-PT"/>
+          <a:endParaRPr lang="en-US"/>
         </a:p>
       </c:txPr>
     </c:title>
@@ -2512,7 +2512,7 @@
                 <a:cs typeface="+mn-cs"/>
               </a:defRPr>
             </a:pPr>
-            <a:endParaRPr lang="pt-PT"/>
+            <a:endParaRPr lang="en-US"/>
           </a:p>
         </c:txPr>
         <c:crossAx val="576048336"/>
@@ -2594,7 +2594,7 @@
                   <a:cs typeface="+mn-cs"/>
                 </a:defRPr>
               </a:pPr>
-              <a:endParaRPr lang="pt-PT"/>
+              <a:endParaRPr lang="en-US"/>
             </a:p>
           </c:txPr>
         </c:title>
@@ -2626,7 +2626,7 @@
                 <a:cs typeface="+mn-cs"/>
               </a:defRPr>
             </a:pPr>
-            <a:endParaRPr lang="pt-PT"/>
+            <a:endParaRPr lang="en-US"/>
           </a:p>
         </c:txPr>
         <c:crossAx val="576045136"/>
@@ -2668,7 +2668,7 @@
               <a:cs typeface="+mn-cs"/>
             </a:defRPr>
           </a:pPr>
-          <a:endParaRPr lang="pt-PT"/>
+          <a:endParaRPr lang="en-US"/>
         </a:p>
       </c:txPr>
     </c:legend>
@@ -2697,7 +2697,7 @@
       <a:pPr>
         <a:defRPr/>
       </a:pPr>
-      <a:endParaRPr lang="pt-PT"/>
+      <a:endParaRPr lang="en-US"/>
     </a:p>
   </c:txPr>
   <c:externalData r:id="rId3">
@@ -2776,7 +2776,7 @@
               <a:cs typeface="+mn-cs"/>
             </a:defRPr>
           </a:pPr>
-          <a:endParaRPr lang="pt-PT"/>
+          <a:endParaRPr lang="en-US"/>
         </a:p>
       </c:txPr>
     </c:title>
@@ -3935,7 +3935,7 @@
                 <a:cs typeface="+mn-cs"/>
               </a:defRPr>
             </a:pPr>
-            <a:endParaRPr lang="pt-PT"/>
+            <a:endParaRPr lang="en-US"/>
           </a:p>
         </c:txPr>
         <c:crossAx val="576048336"/>
@@ -4017,7 +4017,7 @@
                   <a:cs typeface="+mn-cs"/>
                 </a:defRPr>
               </a:pPr>
-              <a:endParaRPr lang="pt-PT"/>
+              <a:endParaRPr lang="en-US"/>
             </a:p>
           </c:txPr>
         </c:title>
@@ -4049,7 +4049,7 @@
                 <a:cs typeface="+mn-cs"/>
               </a:defRPr>
             </a:pPr>
-            <a:endParaRPr lang="pt-PT"/>
+            <a:endParaRPr lang="en-US"/>
           </a:p>
         </c:txPr>
         <c:crossAx val="576045136"/>
@@ -4091,7 +4091,7 @@
               <a:cs typeface="+mn-cs"/>
             </a:defRPr>
           </a:pPr>
-          <a:endParaRPr lang="pt-PT"/>
+          <a:endParaRPr lang="en-US"/>
         </a:p>
       </c:txPr>
     </c:legend>
@@ -4120,7 +4120,7 @@
       <a:pPr>
         <a:defRPr/>
       </a:pPr>
-      <a:endParaRPr lang="pt-PT"/>
+      <a:endParaRPr lang="en-US"/>
     </a:p>
   </c:txPr>
   <c:externalData r:id="rId3">
@@ -4199,7 +4199,7 @@
               <a:cs typeface="+mn-cs"/>
             </a:defRPr>
           </a:pPr>
-          <a:endParaRPr lang="pt-PT"/>
+          <a:endParaRPr lang="en-US"/>
         </a:p>
       </c:txPr>
     </c:title>
@@ -5378,7 +5378,7 @@
                 <a:cs typeface="+mn-cs"/>
               </a:defRPr>
             </a:pPr>
-            <a:endParaRPr lang="pt-PT"/>
+            <a:endParaRPr lang="en-US"/>
           </a:p>
         </c:txPr>
         <c:crossAx val="488915848"/>
@@ -5460,7 +5460,7 @@
                   <a:cs typeface="+mn-cs"/>
                 </a:defRPr>
               </a:pPr>
-              <a:endParaRPr lang="pt-PT"/>
+              <a:endParaRPr lang="en-US"/>
             </a:p>
           </c:txPr>
         </c:title>
@@ -5492,7 +5492,7 @@
                 <a:cs typeface="+mn-cs"/>
               </a:defRPr>
             </a:pPr>
-            <a:endParaRPr lang="pt-PT"/>
+            <a:endParaRPr lang="en-US"/>
           </a:p>
         </c:txPr>
         <c:crossAx val="488912328"/>
@@ -5534,7 +5534,7 @@
               <a:cs typeface="+mn-cs"/>
             </a:defRPr>
           </a:pPr>
-          <a:endParaRPr lang="pt-PT"/>
+          <a:endParaRPr lang="en-US"/>
         </a:p>
       </c:txPr>
     </c:legend>
@@ -5563,7 +5563,7 @@
       <a:pPr>
         <a:defRPr/>
       </a:pPr>
-      <a:endParaRPr lang="pt-PT"/>
+      <a:endParaRPr lang="en-US"/>
     </a:p>
   </c:txPr>
   <c:externalData r:id="rId3">
@@ -5642,7 +5642,7 @@
               <a:cs typeface="+mn-cs"/>
             </a:defRPr>
           </a:pPr>
-          <a:endParaRPr lang="pt-PT"/>
+          <a:endParaRPr lang="en-US"/>
         </a:p>
       </c:txPr>
     </c:title>
@@ -6737,7 +6737,7 @@
                 <a:cs typeface="+mn-cs"/>
               </a:defRPr>
             </a:pPr>
-            <a:endParaRPr lang="pt-PT"/>
+            <a:endParaRPr lang="en-US"/>
           </a:p>
         </c:txPr>
         <c:crossAx val="532865232"/>
@@ -6824,7 +6824,7 @@
                   <a:cs typeface="+mn-cs"/>
                 </a:defRPr>
               </a:pPr>
-              <a:endParaRPr lang="pt-PT"/>
+              <a:endParaRPr lang="en-US"/>
             </a:p>
           </c:txPr>
         </c:title>
@@ -6856,7 +6856,7 @@
                 <a:cs typeface="+mn-cs"/>
               </a:defRPr>
             </a:pPr>
-            <a:endParaRPr lang="pt-PT"/>
+            <a:endParaRPr lang="en-US"/>
           </a:p>
         </c:txPr>
         <c:crossAx val="532862352"/>
@@ -6898,7 +6898,7 @@
               <a:cs typeface="+mn-cs"/>
             </a:defRPr>
           </a:pPr>
-          <a:endParaRPr lang="pt-PT"/>
+          <a:endParaRPr lang="en-US"/>
         </a:p>
       </c:txPr>
     </c:legend>
@@ -6927,7 +6927,7 @@
       <a:pPr>
         <a:defRPr/>
       </a:pPr>
-      <a:endParaRPr lang="pt-PT"/>
+      <a:endParaRPr lang="en-US"/>
     </a:p>
   </c:txPr>
   <c:externalData r:id="rId3">
@@ -7006,7 +7006,7 @@
               <a:cs typeface="+mn-cs"/>
             </a:defRPr>
           </a:pPr>
-          <a:endParaRPr lang="pt-PT"/>
+          <a:endParaRPr lang="en-US"/>
         </a:p>
       </c:txPr>
     </c:title>
@@ -8125,7 +8125,7 @@
                 <a:cs typeface="+mn-cs"/>
               </a:defRPr>
             </a:pPr>
-            <a:endParaRPr lang="pt-PT"/>
+            <a:endParaRPr lang="en-US"/>
           </a:p>
         </c:txPr>
         <c:crossAx val="476724040"/>
@@ -8212,7 +8212,7 @@
                   <a:cs typeface="+mn-cs"/>
                 </a:defRPr>
               </a:pPr>
-              <a:endParaRPr lang="pt-PT"/>
+              <a:endParaRPr lang="en-US"/>
             </a:p>
           </c:txPr>
         </c:title>
@@ -8244,7 +8244,7 @@
                 <a:cs typeface="+mn-cs"/>
               </a:defRPr>
             </a:pPr>
-            <a:endParaRPr lang="pt-PT"/>
+            <a:endParaRPr lang="en-US"/>
           </a:p>
         </c:txPr>
         <c:crossAx val="476728200"/>
@@ -8286,7 +8286,7 @@
               <a:cs typeface="+mn-cs"/>
             </a:defRPr>
           </a:pPr>
-          <a:endParaRPr lang="pt-PT"/>
+          <a:endParaRPr lang="en-US"/>
         </a:p>
       </c:txPr>
     </c:legend>
@@ -8315,7 +8315,7 @@
       <a:pPr>
         <a:defRPr/>
       </a:pPr>
-      <a:endParaRPr lang="pt-PT"/>
+      <a:endParaRPr lang="en-US"/>
     </a:p>
   </c:txPr>
   <c:externalData r:id="rId3">
@@ -8394,7 +8394,7 @@
               <a:cs typeface="+mn-cs"/>
             </a:defRPr>
           </a:pPr>
-          <a:endParaRPr lang="pt-PT"/>
+          <a:endParaRPr lang="en-US"/>
         </a:p>
       </c:txPr>
     </c:title>
@@ -9533,7 +9533,7 @@
                   <a:cs typeface="+mn-cs"/>
                 </a:defRPr>
               </a:pPr>
-              <a:endParaRPr lang="pt-PT"/>
+              <a:endParaRPr lang="en-US"/>
             </a:p>
           </c:txPr>
         </c:title>
@@ -9571,7 +9571,7 @@
                 <a:cs typeface="+mn-cs"/>
               </a:defRPr>
             </a:pPr>
-            <a:endParaRPr lang="pt-PT"/>
+            <a:endParaRPr lang="en-US"/>
           </a:p>
         </c:txPr>
         <c:crossAx val="530307384"/>
@@ -9628,7 +9628,7 @@
                   <a:cs typeface="+mn-cs"/>
                 </a:defRPr>
               </a:pPr>
-              <a:endParaRPr lang="pt-PT"/>
+              <a:endParaRPr lang="en-US"/>
             </a:p>
           </c:txPr>
         </c:title>
@@ -9660,7 +9660,7 @@
                 <a:cs typeface="+mn-cs"/>
               </a:defRPr>
             </a:pPr>
-            <a:endParaRPr lang="pt-PT"/>
+            <a:endParaRPr lang="en-US"/>
           </a:p>
         </c:txPr>
         <c:crossAx val="530309624"/>
@@ -9702,7 +9702,7 @@
               <a:cs typeface="+mn-cs"/>
             </a:defRPr>
           </a:pPr>
-          <a:endParaRPr lang="pt-PT"/>
+          <a:endParaRPr lang="en-US"/>
         </a:p>
       </c:txPr>
     </c:legend>
@@ -9731,7 +9731,7 @@
       <a:pPr>
         <a:defRPr/>
       </a:pPr>
-      <a:endParaRPr lang="pt-PT"/>
+      <a:endParaRPr lang="en-US"/>
     </a:p>
   </c:txPr>
   <c:externalData r:id="rId3">
@@ -9810,7 +9810,7 @@
               <a:cs typeface="+mn-cs"/>
             </a:defRPr>
           </a:pPr>
-          <a:endParaRPr lang="pt-PT"/>
+          <a:endParaRPr lang="en-US"/>
         </a:p>
       </c:txPr>
     </c:title>
@@ -10977,7 +10977,7 @@
                 <a:cs typeface="+mn-cs"/>
               </a:defRPr>
             </a:pPr>
-            <a:endParaRPr lang="pt-PT"/>
+            <a:endParaRPr lang="en-US"/>
           </a:p>
         </c:txPr>
         <c:crossAx val="530485496"/>
@@ -11059,7 +11059,7 @@
                   <a:cs typeface="+mn-cs"/>
                 </a:defRPr>
               </a:pPr>
-              <a:endParaRPr lang="pt-PT"/>
+              <a:endParaRPr lang="en-US"/>
             </a:p>
           </c:txPr>
         </c:title>
@@ -11091,7 +11091,7 @@
                 <a:cs typeface="+mn-cs"/>
               </a:defRPr>
             </a:pPr>
-            <a:endParaRPr lang="pt-PT"/>
+            <a:endParaRPr lang="en-US"/>
           </a:p>
         </c:txPr>
         <c:crossAx val="530485176"/>
@@ -11133,7 +11133,7 @@
               <a:cs typeface="+mn-cs"/>
             </a:defRPr>
           </a:pPr>
-          <a:endParaRPr lang="pt-PT"/>
+          <a:endParaRPr lang="en-US"/>
         </a:p>
       </c:txPr>
     </c:legend>
@@ -11162,7 +11162,7 @@
       <a:pPr>
         <a:defRPr/>
       </a:pPr>
-      <a:endParaRPr lang="pt-PT"/>
+      <a:endParaRPr lang="en-US"/>
     </a:p>
   </c:txPr>
   <c:externalData r:id="rId3">
@@ -11241,7 +11241,7 @@
               <a:cs typeface="+mn-cs"/>
             </a:defRPr>
           </a:pPr>
-          <a:endParaRPr lang="pt-PT"/>
+          <a:endParaRPr lang="en-US"/>
         </a:p>
       </c:txPr>
     </c:title>
@@ -12336,7 +12336,7 @@
                 <a:cs typeface="+mn-cs"/>
               </a:defRPr>
             </a:pPr>
-            <a:endParaRPr lang="pt-PT"/>
+            <a:endParaRPr lang="en-US"/>
           </a:p>
         </c:txPr>
         <c:crossAx val="532054664"/>
@@ -12423,7 +12423,7 @@
                   <a:cs typeface="+mn-cs"/>
                 </a:defRPr>
               </a:pPr>
-              <a:endParaRPr lang="pt-PT"/>
+              <a:endParaRPr lang="en-US"/>
             </a:p>
           </c:txPr>
         </c:title>
@@ -12455,7 +12455,7 @@
                 <a:cs typeface="+mn-cs"/>
               </a:defRPr>
             </a:pPr>
-            <a:endParaRPr lang="pt-PT"/>
+            <a:endParaRPr lang="en-US"/>
           </a:p>
         </c:txPr>
         <c:crossAx val="532054024"/>
@@ -12497,7 +12497,7 @@
               <a:cs typeface="+mn-cs"/>
             </a:defRPr>
           </a:pPr>
-          <a:endParaRPr lang="pt-PT"/>
+          <a:endParaRPr lang="en-US"/>
         </a:p>
       </c:txPr>
     </c:legend>
@@ -12526,7 +12526,7 @@
       <a:pPr>
         <a:defRPr/>
       </a:pPr>
-      <a:endParaRPr lang="pt-PT"/>
+      <a:endParaRPr lang="en-US"/>
     </a:p>
   </c:txPr>
   <c:externalData r:id="rId3">
@@ -12605,7 +12605,7 @@
               <a:cs typeface="+mn-cs"/>
             </a:defRPr>
           </a:pPr>
-          <a:endParaRPr lang="pt-PT"/>
+          <a:endParaRPr lang="en-US"/>
         </a:p>
       </c:txPr>
     </c:title>
@@ -13182,7 +13182,7 @@
                 <a:cs typeface="+mn-cs"/>
               </a:defRPr>
             </a:pPr>
-            <a:endParaRPr lang="pt-PT"/>
+            <a:endParaRPr lang="en-US"/>
           </a:p>
         </c:txPr>
         <c:crossAx val="248970040"/>
@@ -13269,7 +13269,7 @@
                   <a:cs typeface="+mn-cs"/>
                 </a:defRPr>
               </a:pPr>
-              <a:endParaRPr lang="pt-PT"/>
+              <a:endParaRPr lang="en-US"/>
             </a:p>
           </c:txPr>
         </c:title>
@@ -13301,7 +13301,7 @@
                 <a:cs typeface="+mn-cs"/>
               </a:defRPr>
             </a:pPr>
-            <a:endParaRPr lang="pt-PT"/>
+            <a:endParaRPr lang="en-US"/>
           </a:p>
         </c:txPr>
         <c:crossAx val="248963640"/>
@@ -13343,7 +13343,7 @@
               <a:cs typeface="+mn-cs"/>
             </a:defRPr>
           </a:pPr>
-          <a:endParaRPr lang="pt-PT"/>
+          <a:endParaRPr lang="en-US"/>
         </a:p>
       </c:txPr>
     </c:legend>
@@ -13372,7 +13372,7 @@
       <a:pPr>
         <a:defRPr/>
       </a:pPr>
-      <a:endParaRPr lang="pt-PT"/>
+      <a:endParaRPr lang="en-US"/>
     </a:p>
   </c:txPr>
   <c:externalData r:id="rId3">
@@ -13449,7 +13449,7 @@
               <a:cs typeface="+mn-cs"/>
             </a:defRPr>
           </a:pPr>
-          <a:endParaRPr lang="pt-PT"/>
+          <a:endParaRPr lang="en-US"/>
         </a:p>
       </c:txPr>
     </c:title>
@@ -14026,7 +14026,7 @@
                 <a:cs typeface="+mn-cs"/>
               </a:defRPr>
             </a:pPr>
-            <a:endParaRPr lang="pt-PT"/>
+            <a:endParaRPr lang="en-US"/>
           </a:p>
         </c:txPr>
         <c:crossAx val="452565304"/>
@@ -14108,7 +14108,7 @@
                   <a:cs typeface="+mn-cs"/>
                 </a:defRPr>
               </a:pPr>
-              <a:endParaRPr lang="pt-PT"/>
+              <a:endParaRPr lang="en-US"/>
             </a:p>
           </c:txPr>
         </c:title>
@@ -14140,7 +14140,7 @@
                 <a:cs typeface="+mn-cs"/>
               </a:defRPr>
             </a:pPr>
-            <a:endParaRPr lang="pt-PT"/>
+            <a:endParaRPr lang="en-US"/>
           </a:p>
         </c:txPr>
         <c:crossAx val="452564984"/>
@@ -14182,7 +14182,7 @@
               <a:cs typeface="+mn-cs"/>
             </a:defRPr>
           </a:pPr>
-          <a:endParaRPr lang="pt-PT"/>
+          <a:endParaRPr lang="en-US"/>
         </a:p>
       </c:txPr>
     </c:legend>
@@ -14211,7 +14211,7 @@
       <a:pPr>
         <a:defRPr/>
       </a:pPr>
-      <a:endParaRPr lang="pt-PT"/>
+      <a:endParaRPr lang="en-US"/>
     </a:p>
   </c:txPr>
   <c:externalData r:id="rId3">
@@ -14290,7 +14290,7 @@
               <a:cs typeface="+mn-cs"/>
             </a:defRPr>
           </a:pPr>
-          <a:endParaRPr lang="pt-PT"/>
+          <a:endParaRPr lang="en-US"/>
         </a:p>
       </c:txPr>
     </c:title>
@@ -14867,7 +14867,7 @@
                 <a:cs typeface="+mn-cs"/>
               </a:defRPr>
             </a:pPr>
-            <a:endParaRPr lang="pt-PT"/>
+            <a:endParaRPr lang="en-US"/>
           </a:p>
         </c:txPr>
         <c:crossAx val="476653960"/>
@@ -14954,7 +14954,7 @@
                   <a:cs typeface="+mn-cs"/>
                 </a:defRPr>
               </a:pPr>
-              <a:endParaRPr lang="pt-PT"/>
+              <a:endParaRPr lang="en-US"/>
             </a:p>
           </c:txPr>
         </c:title>
@@ -14986,7 +14986,7 @@
                 <a:cs typeface="+mn-cs"/>
               </a:defRPr>
             </a:pPr>
-            <a:endParaRPr lang="pt-PT"/>
+            <a:endParaRPr lang="en-US"/>
           </a:p>
         </c:txPr>
         <c:crossAx val="476652680"/>
@@ -15028,7 +15028,7 @@
               <a:cs typeface="+mn-cs"/>
             </a:defRPr>
           </a:pPr>
-          <a:endParaRPr lang="pt-PT"/>
+          <a:endParaRPr lang="en-US"/>
         </a:p>
       </c:txPr>
     </c:legend>
@@ -15057,7 +15057,7 @@
       <a:pPr>
         <a:defRPr/>
       </a:pPr>
-      <a:endParaRPr lang="pt-PT"/>
+      <a:endParaRPr lang="en-US"/>
     </a:p>
   </c:txPr>
   <c:externalData r:id="rId3">
@@ -15132,7 +15132,7 @@
               <a:cs typeface="+mn-cs"/>
             </a:defRPr>
           </a:pPr>
-          <a:endParaRPr lang="pt-PT"/>
+          <a:endParaRPr lang="en-US"/>
         </a:p>
       </c:txPr>
     </c:title>
@@ -15709,7 +15709,7 @@
                 <a:cs typeface="+mn-cs"/>
               </a:defRPr>
             </a:pPr>
-            <a:endParaRPr lang="pt-PT"/>
+            <a:endParaRPr lang="en-US"/>
           </a:p>
         </c:txPr>
         <c:crossAx val="528005880"/>
@@ -15791,7 +15791,7 @@
                   <a:cs typeface="+mn-cs"/>
                 </a:defRPr>
               </a:pPr>
-              <a:endParaRPr lang="pt-PT"/>
+              <a:endParaRPr lang="en-US"/>
             </a:p>
           </c:txPr>
         </c:title>
@@ -15823,7 +15823,7 @@
                 <a:cs typeface="+mn-cs"/>
               </a:defRPr>
             </a:pPr>
-            <a:endParaRPr lang="pt-PT"/>
+            <a:endParaRPr lang="en-US"/>
           </a:p>
         </c:txPr>
         <c:crossAx val="528009400"/>
@@ -15865,7 +15865,7 @@
               <a:cs typeface="+mn-cs"/>
             </a:defRPr>
           </a:pPr>
-          <a:endParaRPr lang="pt-PT"/>
+          <a:endParaRPr lang="en-US"/>
         </a:p>
       </c:txPr>
     </c:legend>
@@ -15894,7 +15894,7 @@
       <a:pPr>
         <a:defRPr/>
       </a:pPr>
-      <a:endParaRPr lang="pt-PT"/>
+      <a:endParaRPr lang="en-US"/>
     </a:p>
   </c:txPr>
   <c:externalData r:id="rId3">
@@ -15973,7 +15973,7 @@
               <a:cs typeface="+mn-cs"/>
             </a:defRPr>
           </a:pPr>
-          <a:endParaRPr lang="pt-PT"/>
+          <a:endParaRPr lang="en-US"/>
         </a:p>
       </c:txPr>
     </c:title>
@@ -16550,7 +16550,7 @@
                 <a:cs typeface="+mn-cs"/>
               </a:defRPr>
             </a:pPr>
-            <a:endParaRPr lang="pt-PT"/>
+            <a:endParaRPr lang="en-US"/>
           </a:p>
         </c:txPr>
         <c:crossAx val="248956600"/>
@@ -16632,7 +16632,7 @@
                   <a:cs typeface="+mn-cs"/>
                 </a:defRPr>
               </a:pPr>
-              <a:endParaRPr lang="pt-PT"/>
+              <a:endParaRPr lang="en-US"/>
             </a:p>
           </c:txPr>
         </c:title>
@@ -16664,7 +16664,7 @@
                 <a:cs typeface="+mn-cs"/>
               </a:defRPr>
             </a:pPr>
-            <a:endParaRPr lang="pt-PT"/>
+            <a:endParaRPr lang="en-US"/>
           </a:p>
         </c:txPr>
         <c:crossAx val="248956280"/>
@@ -16706,7 +16706,7 @@
               <a:cs typeface="+mn-cs"/>
             </a:defRPr>
           </a:pPr>
-          <a:endParaRPr lang="pt-PT"/>
+          <a:endParaRPr lang="en-US"/>
         </a:p>
       </c:txPr>
     </c:legend>
@@ -16735,7 +16735,7 @@
       <a:pPr>
         <a:defRPr/>
       </a:pPr>
-      <a:endParaRPr lang="pt-PT"/>
+      <a:endParaRPr lang="en-US"/>
     </a:p>
   </c:txPr>
   <c:externalData r:id="rId3">
@@ -16814,7 +16814,7 @@
               <a:cs typeface="+mn-cs"/>
             </a:defRPr>
           </a:pPr>
-          <a:endParaRPr lang="pt-PT"/>
+          <a:endParaRPr lang="en-US"/>
         </a:p>
       </c:txPr>
     </c:title>
@@ -17391,7 +17391,7 @@
                 <a:cs typeface="+mn-cs"/>
               </a:defRPr>
             </a:pPr>
-            <a:endParaRPr lang="pt-PT"/>
+            <a:endParaRPr lang="en-US"/>
           </a:p>
         </c:txPr>
         <c:crossAx val="452533304"/>
@@ -17473,7 +17473,7 @@
                   <a:cs typeface="+mn-cs"/>
                 </a:defRPr>
               </a:pPr>
-              <a:endParaRPr lang="pt-PT"/>
+              <a:endParaRPr lang="en-US"/>
             </a:p>
           </c:txPr>
         </c:title>
@@ -17505,7 +17505,7 @@
                 <a:cs typeface="+mn-cs"/>
               </a:defRPr>
             </a:pPr>
-            <a:endParaRPr lang="pt-PT"/>
+            <a:endParaRPr lang="en-US"/>
           </a:p>
         </c:txPr>
         <c:crossAx val="452535544"/>
@@ -17547,7 +17547,7 @@
               <a:cs typeface="+mn-cs"/>
             </a:defRPr>
           </a:pPr>
-          <a:endParaRPr lang="pt-PT"/>
+          <a:endParaRPr lang="en-US"/>
         </a:p>
       </c:txPr>
     </c:legend>
@@ -17576,7 +17576,7 @@
       <a:pPr>
         <a:defRPr/>
       </a:pPr>
-      <a:endParaRPr lang="pt-PT"/>
+      <a:endParaRPr lang="en-US"/>
     </a:p>
   </c:txPr>
   <c:externalData r:id="rId3">
@@ -17659,7 +17659,7 @@
               <a:cs typeface="+mn-cs"/>
             </a:defRPr>
           </a:pPr>
-          <a:endParaRPr lang="pt-PT"/>
+          <a:endParaRPr lang="en-US"/>
         </a:p>
       </c:txPr>
     </c:title>
@@ -18778,7 +18778,7 @@
                 <a:cs typeface="+mn-cs"/>
               </a:defRPr>
             </a:pPr>
-            <a:endParaRPr lang="pt-PT"/>
+            <a:endParaRPr lang="en-US"/>
           </a:p>
         </c:txPr>
         <c:crossAx val="576068816"/>
@@ -18860,7 +18860,7 @@
                   <a:cs typeface="+mn-cs"/>
                 </a:defRPr>
               </a:pPr>
-              <a:endParaRPr lang="pt-PT"/>
+              <a:endParaRPr lang="en-US"/>
             </a:p>
           </c:txPr>
         </c:title>
@@ -18892,7 +18892,7 @@
                 <a:cs typeface="+mn-cs"/>
               </a:defRPr>
             </a:pPr>
-            <a:endParaRPr lang="pt-PT"/>
+            <a:endParaRPr lang="en-US"/>
           </a:p>
         </c:txPr>
         <c:crossAx val="576068176"/>
@@ -18935,7 +18935,7 @@
               <a:cs typeface="+mn-cs"/>
             </a:defRPr>
           </a:pPr>
-          <a:endParaRPr lang="pt-PT"/>
+          <a:endParaRPr lang="en-US"/>
         </a:p>
       </c:txPr>
     </c:legend>
@@ -18964,7 +18964,7 @@
       <a:pPr>
         <a:defRPr/>
       </a:pPr>
-      <a:endParaRPr lang="pt-PT"/>
+      <a:endParaRPr lang="en-US"/>
     </a:p>
   </c:txPr>
   <c:externalData r:id="rId3">
@@ -32791,10 +32791,10 @@
       </p:grpSpPr>
       <p:sp>
         <p:nvSpPr>
-          <p:cNvPr id="9" name="Rectangle 8">
+          <p:cNvPr id="40" name="Rectangle 25">
             <a:extLst>
               <a:ext uri="{FF2B5EF4-FFF2-40B4-BE49-F238E27FC236}">
-                <a16:creationId xmlns:a16="http://schemas.microsoft.com/office/drawing/2014/main" id="{D829E218-74FB-4455-98BE-F2C5BA8978BE}"/>
+                <a16:creationId xmlns:a16="http://schemas.microsoft.com/office/drawing/2014/main" id="{F240A2FC-E2C3-458D-96B4-5DF9028D93A5}"/>
               </a:ext>
               <a:ext uri="{C183D7F6-B498-43B3-948B-1728B52AA6E4}">
                 <adec:decorative xmlns:adec="http://schemas.microsoft.com/office/drawing/2017/decorative" val="1"/>
@@ -32846,10 +32846,10 @@
       </p:sp>
       <p:sp>
         <p:nvSpPr>
-          <p:cNvPr id="11" name="Rectangle 10">
+          <p:cNvPr id="41" name="Rectangle 27">
             <a:extLst>
               <a:ext uri="{FF2B5EF4-FFF2-40B4-BE49-F238E27FC236}">
-                <a16:creationId xmlns:a16="http://schemas.microsoft.com/office/drawing/2014/main" id="{7E8D75FD-D4F9-4D11-B70D-82EFCB4CFA5B}"/>
+                <a16:creationId xmlns:a16="http://schemas.microsoft.com/office/drawing/2014/main" id="{5F097929-F3D6-4D1F-8AFC-CF348171A9E1}"/>
               </a:ext>
               <a:ext uri="{C183D7F6-B498-43B3-948B-1728B52AA6E4}">
                 <adec:decorative xmlns:adec="http://schemas.microsoft.com/office/drawing/2017/decorative" val="1"/>
@@ -32901,10 +32901,10 @@
       </p:sp>
       <p:cxnSp>
         <p:nvCxnSpPr>
-          <p:cNvPr id="13" name="Straight Connector 12">
+          <p:cNvPr id="42" name="Straight Connector 29">
             <a:extLst>
               <a:ext uri="{FF2B5EF4-FFF2-40B4-BE49-F238E27FC236}">
-                <a16:creationId xmlns:a16="http://schemas.microsoft.com/office/drawing/2014/main" id="{1F5DC8C3-BA5F-4EED-BB9A-A14272BD82A1}"/>
+                <a16:creationId xmlns:a16="http://schemas.microsoft.com/office/drawing/2014/main" id="{43074C91-9045-414B-B5F9-567DAE3EED25}"/>
               </a:ext>
               <a:ext uri="{C183D7F6-B498-43B3-948B-1728B52AA6E4}">
                 <adec:decorative xmlns:adec="http://schemas.microsoft.com/office/drawing/2017/decorative" val="1"/>
@@ -32956,10 +32956,10 @@
       </p:cxnSp>
       <p:sp useBgFill="1">
         <p:nvSpPr>
-          <p:cNvPr id="15" name="Rectangle 14">
+          <p:cNvPr id="43" name="Rectangle 31">
             <a:extLst>
               <a:ext uri="{FF2B5EF4-FFF2-40B4-BE49-F238E27FC236}">
-                <a16:creationId xmlns:a16="http://schemas.microsoft.com/office/drawing/2014/main" id="{8638A98B-4B4B-4607-B11F-7DCA0D7CCE17}"/>
+                <a16:creationId xmlns:a16="http://schemas.microsoft.com/office/drawing/2014/main" id="{2779F603-B669-4AD6-82F9-E09F76165B99}"/>
               </a:ext>
               <a:ext uri="{C183D7F6-B498-43B3-948B-1728B52AA6E4}">
                 <adec:decorative xmlns:adec="http://schemas.microsoft.com/office/drawing/2017/decorative" val="1"/>
@@ -32980,7 +32980,7 @@
         <p:spPr>
           <a:xfrm>
             <a:off x="0" y="0"/>
-            <a:ext cx="12192000" cy="6858000"/>
+            <a:ext cx="12192001" cy="6334316"/>
           </a:xfrm>
           <a:prstGeom prst="rect">
             <a:avLst/>
@@ -32995,8 +32995,8 @@
               <a:shade val="50000"/>
             </a:schemeClr>
           </a:lnRef>
-          <a:fillRef idx="1001">
-            <a:schemeClr val="lt1"/>
+          <a:fillRef idx="1">
+            <a:schemeClr val="accent1"/>
           </a:fillRef>
           <a:effectRef idx="0">
             <a:schemeClr val="accent1"/>
@@ -33016,10 +33016,145 @@
       </p:sp>
       <p:sp>
         <p:nvSpPr>
-          <p:cNvPr id="17" name="Rectangle 16">
+          <p:cNvPr id="2" name="Título 1">
             <a:extLst>
               <a:ext uri="{FF2B5EF4-FFF2-40B4-BE49-F238E27FC236}">
-                <a16:creationId xmlns:a16="http://schemas.microsoft.com/office/drawing/2014/main" id="{8E3B9B0E-204E-4BFD-B58A-E71D9CDC37F3}"/>
+                <a16:creationId xmlns:a16="http://schemas.microsoft.com/office/drawing/2014/main" id="{521C8342-27FD-4900-A258-7AF029B72CB9}"/>
+              </a:ext>
+            </a:extLst>
+          </p:cNvPr>
+          <p:cNvSpPr>
+            <a:spLocks noGrp="1"/>
+          </p:cNvSpPr>
+          <p:nvPr>
+            <p:ph type="title"/>
+          </p:nvPr>
+        </p:nvSpPr>
+        <p:spPr>
+          <a:xfrm>
+            <a:off x="5289754" y="639097"/>
+            <a:ext cx="6253317" cy="3686015"/>
+          </a:xfrm>
+        </p:spPr>
+        <p:txBody>
+          <a:bodyPr vert="horz" lIns="91440" tIns="45720" rIns="91440" bIns="45720" rtlCol="0" anchor="b">
+            <a:normAutofit/>
+          </a:bodyPr>
+          <a:lstStyle/>
+          <a:p>
+            <a:r>
+              <a:rPr lang="en-US" sz="8000">
+                <a:solidFill>
+                  <a:schemeClr val="tx1">
+                    <a:lumMod val="85000"/>
+                    <a:lumOff val="15000"/>
+                  </a:schemeClr>
+                </a:solidFill>
+              </a:rPr>
+              <a:t>Anexos</a:t>
+            </a:r>
+          </a:p>
+        </p:txBody>
+      </p:sp>
+      <p:pic>
+        <p:nvPicPr>
+          <p:cNvPr id="44" name="Graphic 22" descr="Clipe">
+            <a:extLst>
+              <a:ext uri="{FF2B5EF4-FFF2-40B4-BE49-F238E27FC236}">
+                <a16:creationId xmlns:a16="http://schemas.microsoft.com/office/drawing/2014/main" id="{005EB142-B29D-4326-AE22-4FB5A15DB9DD}"/>
+              </a:ext>
+            </a:extLst>
+          </p:cNvPr>
+          <p:cNvPicPr>
+            <a:picLocks noChangeAspect="1"/>
+          </p:cNvPicPr>
+          <p:nvPr/>
+        </p:nvPicPr>
+        <p:blipFill>
+          <a:blip r:embed="rId2">
+            <a:extLst>
+              <a:ext uri="{28A0092B-C50C-407E-A947-70E740481C1C}">
+                <a14:useLocalDpi xmlns:a14="http://schemas.microsoft.com/office/drawing/2010/main" val="0"/>
+              </a:ext>
+              <a:ext uri="{96DAC541-7B7A-43D3-8B79-37D633B846F1}">
+                <asvg:svgBlip xmlns:asvg="http://schemas.microsoft.com/office/drawing/2016/SVG/main" r:embed="rId3"/>
+              </a:ext>
+            </a:extLst>
+          </a:blip>
+          <a:stretch>
+            <a:fillRect/>
+          </a:stretch>
+        </p:blipFill>
+        <p:spPr>
+          <a:xfrm>
+            <a:off x="633999" y="1163529"/>
+            <a:ext cx="4001315" cy="4001315"/>
+          </a:xfrm>
+          <a:prstGeom prst="rect">
+            <a:avLst/>
+          </a:prstGeom>
+        </p:spPr>
+      </p:pic>
+      <p:cxnSp>
+        <p:nvCxnSpPr>
+          <p:cNvPr id="45" name="Straight Connector 33">
+            <a:extLst>
+              <a:ext uri="{FF2B5EF4-FFF2-40B4-BE49-F238E27FC236}">
+                <a16:creationId xmlns:a16="http://schemas.microsoft.com/office/drawing/2014/main" id="{7ABFD994-C2DC-4E7D-9411-C7FF7813EF47}"/>
+              </a:ext>
+              <a:ext uri="{C183D7F6-B498-43B3-948B-1728B52AA6E4}">
+                <adec:decorative xmlns:adec="http://schemas.microsoft.com/office/drawing/2017/decorative" val="1"/>
+              </a:ext>
+            </a:extLst>
+          </p:cNvPr>
+          <p:cNvCxnSpPr>
+            <a:cxnSpLocks noGrp="1" noRot="1" noChangeAspect="1" noMove="1" noResize="1" noEditPoints="1" noAdjustHandles="1" noChangeArrowheads="1" noChangeShapeType="1"/>
+          </p:cNvCxnSpPr>
+          <p:nvPr>
+            <p:extLst>
+              <p:ext uri="{386F3935-93C4-4BCD-93E2-E3B085C9AB24}">
+                <p16:designElem xmlns:p16="http://schemas.microsoft.com/office/powerpoint/2015/main" val="1"/>
+              </p:ext>
+            </p:extLst>
+          </p:nvPr>
+        </p:nvCxnSpPr>
+        <p:spPr>
+          <a:xfrm>
+            <a:off x="5447071" y="4343400"/>
+            <a:ext cx="5636107" cy="0"/>
+          </a:xfrm>
+          <a:prstGeom prst="line">
+            <a:avLst/>
+          </a:prstGeom>
+          <a:ln w="6350">
+            <a:solidFill>
+              <a:schemeClr val="tx2">
+                <a:alpha val="90000"/>
+              </a:schemeClr>
+            </a:solidFill>
+          </a:ln>
+        </p:spPr>
+        <p:style>
+          <a:lnRef idx="1">
+            <a:schemeClr val="accent1"/>
+          </a:lnRef>
+          <a:fillRef idx="0">
+            <a:schemeClr val="accent1"/>
+          </a:fillRef>
+          <a:effectRef idx="0">
+            <a:schemeClr val="accent1"/>
+          </a:effectRef>
+          <a:fontRef idx="minor">
+            <a:schemeClr val="tx1"/>
+          </a:fontRef>
+        </p:style>
+      </p:cxnSp>
+      <p:sp>
+        <p:nvSpPr>
+          <p:cNvPr id="46" name="Rectangle 35">
+            <a:extLst>
+              <a:ext uri="{FF2B5EF4-FFF2-40B4-BE49-F238E27FC236}">
+                <a16:creationId xmlns:a16="http://schemas.microsoft.com/office/drawing/2014/main" id="{BC0D1FC6-352C-4C7D-825F-C4E2F6A8059C}"/>
               </a:ext>
               <a:ext uri="{C183D7F6-B498-43B3-948B-1728B52AA6E4}">
                 <adec:decorative xmlns:adec="http://schemas.microsoft.com/office/drawing/2017/decorative" val="1"/>
@@ -33037,16 +33172,16 @@
             </p:extLst>
           </p:nvPr>
         </p:nvSpPr>
-        <p:spPr bwMode="white">
+        <p:spPr>
           <a:xfrm>
-            <a:off x="7613486" y="0"/>
-            <a:ext cx="4584734" cy="6858000"/>
+            <a:off x="15" y="6334316"/>
+            <a:ext cx="12191985" cy="66484"/>
           </a:xfrm>
           <a:prstGeom prst="rect">
             <a:avLst/>
           </a:prstGeom>
           <a:solidFill>
-            <a:schemeClr val="accent2"/>
+            <a:schemeClr val="accent1"/>
           </a:solidFill>
           <a:ln>
             <a:noFill/>
@@ -33071,54 +33206,10 @@
       </p:sp>
       <p:sp>
         <p:nvSpPr>
-          <p:cNvPr id="2" name="Título 1">
+          <p:cNvPr id="47" name="Rectangle 37">
             <a:extLst>
               <a:ext uri="{FF2B5EF4-FFF2-40B4-BE49-F238E27FC236}">
-                <a16:creationId xmlns:a16="http://schemas.microsoft.com/office/drawing/2014/main" id="{521C8342-27FD-4900-A258-7AF029B72CB9}"/>
-              </a:ext>
-            </a:extLst>
-          </p:cNvPr>
-          <p:cNvSpPr>
-            <a:spLocks noGrp="1"/>
-          </p:cNvSpPr>
-          <p:nvPr>
-            <p:ph type="title"/>
-          </p:nvPr>
-        </p:nvSpPr>
-        <p:spPr>
-          <a:xfrm>
-            <a:off x="8096885" y="640080"/>
-            <a:ext cx="3659246" cy="2926080"/>
-          </a:xfrm>
-        </p:spPr>
-        <p:txBody>
-          <a:bodyPr vert="horz" lIns="91440" tIns="45720" rIns="91440" bIns="45720" rtlCol="0" anchor="b">
-            <a:normAutofit/>
-          </a:bodyPr>
-          <a:lstStyle/>
-          <a:p>
-            <a:r>
-              <a:rPr lang="en-US" sz="4400" dirty="0" err="1">
-                <a:solidFill>
-                  <a:srgbClr val="FFFFFF"/>
-                </a:solidFill>
-              </a:rPr>
-              <a:t>Anexos</a:t>
-            </a:r>
-            <a:endParaRPr lang="en-US" sz="4400" dirty="0">
-              <a:solidFill>
-                <a:srgbClr val="FFFFFF"/>
-              </a:solidFill>
-            </a:endParaRPr>
-          </a:p>
-        </p:txBody>
-      </p:sp>
-      <p:sp>
-        <p:nvSpPr>
-          <p:cNvPr id="19" name="Rectangle 18">
-            <a:extLst>
-              <a:ext uri="{FF2B5EF4-FFF2-40B4-BE49-F238E27FC236}">
-                <a16:creationId xmlns:a16="http://schemas.microsoft.com/office/drawing/2014/main" id="{B1121E64-CB88-4BF5-B531-C0316E7F6E30}"/>
+                <a16:creationId xmlns:a16="http://schemas.microsoft.com/office/drawing/2014/main" id="{541AFC2C-CD98-4478-AB71-1A864026D92F}"/>
               </a:ext>
               <a:ext uri="{C183D7F6-B498-43B3-948B-1728B52AA6E4}">
                 <adec:decorative xmlns:adec="http://schemas.microsoft.com/office/drawing/2017/decorative" val="1"/>
@@ -33138,14 +33229,14 @@
         </p:nvSpPr>
         <p:spPr>
           <a:xfrm>
-            <a:off x="7556906" y="0"/>
-            <a:ext cx="64008" cy="6858000"/>
+            <a:off x="1" y="6400800"/>
+            <a:ext cx="12192000" cy="457200"/>
           </a:xfrm>
           <a:prstGeom prst="rect">
             <a:avLst/>
           </a:prstGeom>
           <a:solidFill>
-            <a:schemeClr val="accent1"/>
+            <a:schemeClr val="accent2"/>
           </a:solidFill>
           <a:ln>
             <a:noFill/>
@@ -33351,14 +33442,28 @@
           <a:lstStyle/>
           <a:p>
             <a:r>
-              <a:rPr lang="pt-PT" sz="1400" dirty="0"/>
-              <a:t>Verifica-se que a heurística 2, apesar de os caminhos por ela obtidos serem mais próximos dos caminhos ideias, demora na maioria das vezes mais tempo do que o algoritmo 1 e necessita de expandir mais nós do que as restantes heurísticas. </a:t>
+              <a:rPr lang="pt-PT" sz="1400" dirty="0">
+                <a:solidFill>
+                  <a:schemeClr val="tx1">
+                    <a:lumMod val="75000"/>
+                    <a:lumOff val="25000"/>
+                  </a:schemeClr>
+                </a:solidFill>
+              </a:rPr>
+              <a:t>Verifica-se que a heurística 2, apesar de os caminhos por ela obtidos serem mais próximos dos caminhos ideais, demora na maioria das vezes mais tempo do que a heurística 1 e necessita de expandir mais nós do que as restantes heurísticas. </a:t>
             </a:r>
           </a:p>
           <a:p>
             <a:r>
-              <a:rPr lang="pt-PT" sz="1400" dirty="0"/>
-              <a:t>Os resultados obtidos para as heurísticas 1 e 3 são muito semelhantes em termos de tempo consumido, mas verifica-se que a heurística 3 em certos níveis (como o nível 5) necessita de expandir bastantes mais nós para atingir o mesmo resultado</a:t>
+              <a:rPr lang="pt-PT" sz="1400" dirty="0">
+                <a:solidFill>
+                  <a:schemeClr val="tx1">
+                    <a:lumMod val="75000"/>
+                    <a:lumOff val="25000"/>
+                  </a:schemeClr>
+                </a:solidFill>
+              </a:rPr>
+              <a:t>Os resultados obtidos para as heurísticas 1 e 3 são muito semelhantes em termos de tempo consumido, mas verifica-se que a heurística 3 em certos níveis (como o nível 5) necessita de expandir bastantes mais nós para atingir o mesmo resultado.</a:t>
             </a:r>
           </a:p>
         </p:txBody>
@@ -33455,19 +33560,40 @@
           <a:lstStyle/>
           <a:p>
             <a:r>
-              <a:rPr lang="pt-PT" sz="1400" dirty="0"/>
+              <a:rPr lang="pt-PT" sz="1400" dirty="0">
+                <a:solidFill>
+                  <a:schemeClr val="tx1">
+                    <a:lumMod val="75000"/>
+                    <a:lumOff val="25000"/>
+                  </a:schemeClr>
+                </a:solidFill>
+              </a:rPr>
               <a:t>Verifica-se que a heurística 3 para os níveis 11 e 17 não apresenta como solução o caminho ideal, pelo que não é uma boa heurística. </a:t>
             </a:r>
           </a:p>
           <a:p>
             <a:r>
-              <a:rPr lang="pt-PT" sz="1400" dirty="0"/>
+              <a:rPr lang="pt-PT" sz="1400" dirty="0">
+                <a:solidFill>
+                  <a:schemeClr val="tx1">
+                    <a:lumMod val="75000"/>
+                    <a:lumOff val="25000"/>
+                  </a:schemeClr>
+                </a:solidFill>
+              </a:rPr>
               <a:t>Comparando as heurísticas 1 e 2, verifica-se que, apesar de apresentarem alguns resultados bastante semelhantes, a heurística 1 tende a demorar menos tempo para resolver os níveis do que a heurística 2.</a:t>
             </a:r>
           </a:p>
           <a:p>
             <a:r>
-              <a:rPr lang="pt-PT" sz="1400" dirty="0"/>
+              <a:rPr lang="pt-PT" sz="1400" dirty="0">
+                <a:solidFill>
+                  <a:schemeClr val="tx1">
+                    <a:lumMod val="75000"/>
+                    <a:lumOff val="25000"/>
+                  </a:schemeClr>
+                </a:solidFill>
+              </a:rPr>
               <a:t>Relativamente aos nós expandidos, ambas as heurísticas apresentam resultados muito parecidos para todos os níveis.</a:t>
             </a:r>
           </a:p>
@@ -37767,8 +37893,8 @@
         </p:nvSpPr>
         <p:spPr>
           <a:xfrm>
-            <a:off x="1097280" y="2223427"/>
-            <a:ext cx="9966960" cy="4001525"/>
+            <a:off x="1097280" y="2023963"/>
+            <a:ext cx="9966960" cy="4200989"/>
           </a:xfrm>
         </p:spPr>
         <p:txBody>
@@ -37785,12 +37911,29 @@
               <a:buChar char="•"/>
             </a:pPr>
             <a:r>
+              <a:rPr lang="pt-PT" sz="1600" b="1" u="sng" dirty="0"/>
+              <a:t>Pesquisa primeiro em profundidade (DFS)</a:t>
+            </a:r>
+            <a:r>
               <a:rPr lang="pt-PT" sz="1600" b="1" dirty="0"/>
-              <a:t>Pesquisa primeiro em profundidade (DFS): </a:t>
+              <a:t>: </a:t>
             </a:r>
             <a:r>
               <a:rPr lang="pt-PT" sz="1600" dirty="0"/>
-              <a:t>A DFS consiste na expansão dos nós da árvore, começando na sua raiz, e aprofundando progressivamente a cada interação, até chegar ao nó de profundidade máxima, retrocedendo depois para visitar os restantes. De modo a tornar o algoritmo um pouco mais eficiente removemos todos os ciclos evitando repetir estados de tabuleiro já visitados. No nosso problema, um nó é explorado em profundidade até se encontrar uma solução, terminando a pesquisa. Desta forma é sempre encontrada uma solução mas não sendo garantida a solução ótima (menor número de movimentos).</a:t>
+              <a:t>A DFS consiste na expansão dos nós da árvore, começando na sua raiz, e aprofundando progressivamente a cada interação, até chegar ao nó de profundidade máxima, retrocedendo depois para visitar os restantes. </a:t>
+            </a:r>
+          </a:p>
+          <a:p>
+            <a:pPr lvl="2">
+              <a:lnSpc>
+                <a:spcPct val="100000"/>
+              </a:lnSpc>
+              <a:buFont typeface="Wingdings" panose="05000000000000000000" pitchFamily="2" charset="2"/>
+              <a:buChar char="ü"/>
+            </a:pPr>
+            <a:r>
+              <a:rPr lang="pt-PT" sz="1600" dirty="0"/>
+              <a:t>De modo a tornar o algoritmo um pouco mais eficiente removemos todos os ciclos evitando repetir estados de tabuleiro já visitados.  No nosso problema, um nó é explorado em profundidade até se encontrar uma solução, terminando a pesquisa. Desta forma é sempre encontrada uma solução mas não sendo garantida a solução ótima (menor número de movimentos).</a:t>
             </a:r>
           </a:p>
           <a:p>
@@ -37802,12 +37945,29 @@
               <a:buChar char="•"/>
             </a:pPr>
             <a:r>
+              <a:rPr lang="pt-PT" sz="1600" b="1" u="sng" dirty="0"/>
+              <a:t>Pesquisa primeiro em largura (BFS)</a:t>
+            </a:r>
+            <a:r>
               <a:rPr lang="pt-PT" sz="1600" b="1" dirty="0"/>
-              <a:t>Pesquisa primeiro em largura (BFS): </a:t>
+              <a:t>: </a:t>
             </a:r>
             <a:r>
               <a:rPr lang="pt-PT" sz="1600" dirty="0"/>
-              <a:t>A BFS, por sua vez, consiste na expansão dos nós em largura, ou seja, nível a nível, apenas passando para uma profundidade d+1 quando todos os nós tiverem sido visitados. No caso do presente problema, os nós são explorados até ser encontrada a solução ótima.</a:t>
+              <a:t>A BFS, por sua vez, consiste na expansão dos nós em largura, ou seja, nível a nível, apenas passando para uma profundidade d+1 quando todos os nós tiverem sido visitados. </a:t>
+            </a:r>
+          </a:p>
+          <a:p>
+            <a:pPr lvl="2">
+              <a:lnSpc>
+                <a:spcPct val="100000"/>
+              </a:lnSpc>
+              <a:buFont typeface="Wingdings" panose="05000000000000000000" pitchFamily="2" charset="2"/>
+              <a:buChar char="ü"/>
+            </a:pPr>
+            <a:r>
+              <a:rPr lang="pt-PT" sz="1600" dirty="0"/>
+              <a:t>No caso do presente problema, os nós são explorados até ser encontrada a solução ótima.</a:t>
             </a:r>
           </a:p>
           <a:p>
@@ -37819,15 +37979,15 @@
               <a:buChar char="•"/>
             </a:pPr>
             <a:r>
-              <a:rPr lang="pt-PT" sz="1600" b="1" dirty="0" err="1"/>
+              <a:rPr lang="pt-PT" sz="1600" b="1" u="sng" dirty="0" err="1"/>
               <a:t>Iterative</a:t>
             </a:r>
             <a:r>
-              <a:rPr lang="pt-PT" sz="1600" b="1" dirty="0"/>
+              <a:rPr lang="pt-PT" sz="1600" b="1" u="sng" dirty="0"/>
               <a:t> </a:t>
             </a:r>
             <a:r>
-              <a:rPr lang="pt-PT" sz="1600" b="1" dirty="0" err="1"/>
+              <a:rPr lang="pt-PT" sz="1600" b="1" u="sng" dirty="0" err="1"/>
               <a:t>Deepening</a:t>
             </a:r>
             <a:r>
@@ -37852,7 +38012,20 @@
             </a:r>
             <a:r>
               <a:rPr lang="pt-PT" sz="1600" dirty="0"/>
-              <a:t> efetuamos uma DFS com um nível de profundidade limitado e fomos aumentando esse nível de profundidade até encontrar uma solução. Este algoritmo a partir do nível 15 (nível com número ótimo de movimentos 11) começou a tornar-se demasiado demorado apesar de encontrar a solução ótima.</a:t>
+              <a:t> efetuamos uma DFS com um nível de profundidade limitado e fomos aumentando esse nível de profundidade até encontrar uma solução.</a:t>
+            </a:r>
+          </a:p>
+          <a:p>
+            <a:pPr lvl="2">
+              <a:lnSpc>
+                <a:spcPct val="100000"/>
+              </a:lnSpc>
+              <a:buFont typeface="Wingdings" panose="05000000000000000000" pitchFamily="2" charset="2"/>
+              <a:buChar char="ü"/>
+            </a:pPr>
+            <a:r>
+              <a:rPr lang="pt-PT" sz="1600" dirty="0"/>
+              <a:t> Este algoritmo a partir do nível 15 (nível com número ótimo de movimentos 11) começou a tornar-se demasiado demorado apesar de encontrar a solução ótima.</a:t>
             </a:r>
           </a:p>
           <a:p>
@@ -38180,13 +38353,13 @@
         </p:nvSpPr>
         <p:spPr>
           <a:xfrm>
-            <a:off x="1097279" y="2090446"/>
-            <a:ext cx="10139290" cy="3778647"/>
+            <a:off x="675249" y="1936827"/>
+            <a:ext cx="10789920" cy="4154483"/>
           </a:xfrm>
         </p:spPr>
         <p:txBody>
           <a:bodyPr>
-            <a:normAutofit/>
+            <a:noAutofit/>
           </a:bodyPr>
           <a:lstStyle/>
           <a:p>
@@ -38198,13 +38371,38 @@
               <a:buChar char="•"/>
             </a:pPr>
             <a:r>
+              <a:rPr lang="pt-PT" sz="1600" b="1" u="sng" dirty="0"/>
+              <a:t>Pesquisa de custo uniforme</a:t>
+            </a:r>
+            <a:r>
               <a:rPr lang="pt-PT" sz="1600" b="1" dirty="0"/>
-              <a:t>Pesquisa de custo uniforme: </a:t>
+              <a:t>: </a:t>
             </a:r>
             <a:r>
               <a:rPr lang="pt-PT" sz="1600" dirty="0"/>
-              <a:t>Esta pesquisa é semelhante à DFS, no sentido em que exporá os nós por níveos de profundidade, mas, em vez de os expandir por ordem, estes irão ser ordenados segundo uma função de custo, sendo explorados os nós de um determinado nível por ordem desse custo (de menor para maior). Como o custo de qualquer movimento neste caso é sempre 1, então este algoritmo torna-se igual à pesquisa em largura.</a:t>
-            </a:r>
+              <a:t>Esta pesquisa é semelhante à DFS, no sentido em que exporá os nós por níveis de profundidade, mas, em vez de os expandir por ordem, estes irão ser ordenados segundo uma função de custo, sendo explorados os nós de um determinado nível por ordem desse custo (de menor para maior). </a:t>
+            </a:r>
+          </a:p>
+          <a:p>
+            <a:pPr lvl="2">
+              <a:lnSpc>
+                <a:spcPct val="100000"/>
+              </a:lnSpc>
+              <a:buFont typeface="Wingdings" panose="05000000000000000000" pitchFamily="2" charset="2"/>
+              <a:buChar char="ü"/>
+            </a:pPr>
+            <a:r>
+              <a:rPr lang="pt-PT" sz="1600" dirty="0"/>
+              <a:t>Como o custo de qualquer movimento neste caso é sempre 1, então este algoritmo torna-se igual à pesquisa em largura.</a:t>
+            </a:r>
+          </a:p>
+          <a:p>
+            <a:pPr marL="384048" lvl="2" indent="0">
+              <a:lnSpc>
+                <a:spcPct val="100000"/>
+              </a:lnSpc>
+              <a:buNone/>
+            </a:pPr>
             <a:endParaRPr lang="pt-PT" sz="1600" b="1" dirty="0"/>
           </a:p>
           <a:p>
@@ -38216,8 +38414,12 @@
               <a:buChar char="•"/>
             </a:pPr>
             <a:r>
+              <a:rPr lang="pt-PT" sz="1600" b="1" u="sng" dirty="0"/>
+              <a:t>Pesquisa gananciosa</a:t>
+            </a:r>
+            <a:r>
               <a:rPr lang="pt-PT" sz="1600" b="1" dirty="0"/>
-              <a:t>Pesquisa gananciosa: </a:t>
+              <a:t>: </a:t>
             </a:r>
             <a:r>
               <a:rPr lang="pt-PT" sz="1600" dirty="0"/>
@@ -38233,35 +38435,56 @@
               <a:buChar char="•"/>
             </a:pPr>
             <a:r>
+              <a:rPr lang="pt-PT" sz="1600" b="1" u="sng" dirty="0"/>
+              <a:t>A*</a:t>
+            </a:r>
+            <a:r>
               <a:rPr lang="pt-PT" sz="1600" b="1" dirty="0"/>
-              <a:t>A*: </a:t>
+              <a:t>: </a:t>
             </a:r>
             <a:r>
               <a:rPr lang="pt-PT" sz="1600" dirty="0"/>
-              <a:t>Este combina o custo para chegar até ao nó atual, com a estimativa do custo de avançar para o próximo nó (g(n)), somando isto ao valor retornado pela heurística da pesquisa gananciosa (h(n)), sendo f(n)= g(n)+h(n), seguindo sempre o caminho que minimiza f(n).</a:t>
+              <a:t>Este combina o custo para chegar até ao nó atual, com a estimativa do custo de avançar para o próximo nó (g(n)), somando isto ao valor retornado pela heurística da pesquisa gananciosa (h(n)), sendo f(n)= g(n)+h(n), seguindo sempre o caminho que minimiza f(n). O algoritmo A* necessita de manter todos os nós em  memória enquanto procura a solução uma vez que efetua uma pesquisa exaustiva. Assim enquanto que a complexidade temporal é igual à do </a:t>
+            </a:r>
+            <a:r>
+              <a:rPr lang="pt-PT" sz="1600" dirty="0" err="1"/>
+              <a:t>greedy</a:t>
+            </a:r>
+            <a:r>
+              <a:rPr lang="pt-PT" sz="1600" dirty="0"/>
+              <a:t>, o algoritmo A* têm uma complexidade espacial maior O(</a:t>
+            </a:r>
+            <a:r>
+              <a:rPr lang="pt-PT" sz="1600" dirty="0" err="1"/>
+              <a:t>b^m</a:t>
+            </a:r>
+            <a:r>
+              <a:rPr lang="pt-PT" sz="1600" dirty="0"/>
+              <a:t>). </a:t>
             </a:r>
           </a:p>
           <a:p>
-            <a:pPr lvl="1">
+            <a:pPr marL="201168" lvl="1" indent="0">
               <a:lnSpc>
                 <a:spcPct val="100000"/>
               </a:lnSpc>
-              <a:buFont typeface="Arial" panose="020B0604020202020204" pitchFamily="34" charset="0"/>
-              <a:buChar char="•"/>
+              <a:buNone/>
             </a:pPr>
-            <a:endParaRPr lang="pt-PT" sz="1600" dirty="0"/>
-          </a:p>
-          <a:p>
-            <a:pPr lvl="1">
-              <a:lnSpc>
-                <a:spcPct val="100000"/>
-              </a:lnSpc>
-              <a:buFont typeface="Arial" panose="020B0604020202020204" pitchFamily="34" charset="0"/>
-              <a:buChar char="•"/>
-            </a:pPr>
+            <a:r>
+              <a:rPr lang="pt-PT" sz="1600" u="sng" dirty="0"/>
+              <a:t>Enquanto que o algoritmo A* alcança sempre a solução ótima e é completo o algoritmo </a:t>
+            </a:r>
+            <a:r>
+              <a:rPr lang="pt-PT" sz="1600" u="sng" dirty="0" err="1"/>
+              <a:t>greedy</a:t>
+            </a:r>
+            <a:r>
+              <a:rPr lang="pt-PT" sz="1600" u="sng" dirty="0"/>
+              <a:t> não é completo, o que significa que pode optar por caminhos que não alcancem o estado objetivo. </a:t>
+            </a:r>
             <a:r>
               <a:rPr lang="pt-PT" sz="1600" dirty="0"/>
-              <a:t>ACRESCENTAR PARTE DE A* SER OTIMO E COMPLETO ENQUANTO GREEDY NÃO E COMPLETO NEM OTIMO</a:t>
+              <a:t>(Ver anexo I e II para comparação de resultados).</a:t>
             </a:r>
           </a:p>
         </p:txBody>

</xml_diff>

<commit_message>
Correct a bug in game, finish pptx and update README
</commit_message>
<xml_diff>
--- a/docs/finalpresentation.pptx
+++ b/docs/finalpresentation.pptx
@@ -14,7 +14,7 @@
     <p:sldId id="274" r:id="rId5"/>
     <p:sldId id="278" r:id="rId6"/>
     <p:sldId id="272" r:id="rId7"/>
-    <p:sldId id="273" r:id="rId8"/>
+    <p:sldId id="285" r:id="rId8"/>
     <p:sldId id="267" r:id="rId9"/>
     <p:sldId id="268" r:id="rId10"/>
     <p:sldId id="269" r:id="rId11"/>
@@ -207,7 +207,7 @@
               <a:cs typeface="+mn-cs"/>
             </a:defRPr>
           </a:pPr>
-          <a:endParaRPr lang="en-US"/>
+          <a:endParaRPr lang="pt-PT"/>
         </a:p>
       </c:txPr>
     </c:title>
@@ -1326,7 +1326,7 @@
                 <a:cs typeface="+mn-cs"/>
               </a:defRPr>
             </a:pPr>
-            <a:endParaRPr lang="en-US"/>
+            <a:endParaRPr lang="pt-PT"/>
           </a:p>
         </c:txPr>
         <c:crossAx val="576068816"/>
@@ -1408,7 +1408,7 @@
                   <a:cs typeface="+mn-cs"/>
                 </a:defRPr>
               </a:pPr>
-              <a:endParaRPr lang="en-US"/>
+              <a:endParaRPr lang="pt-PT"/>
             </a:p>
           </c:txPr>
         </c:title>
@@ -1440,7 +1440,7 @@
                 <a:cs typeface="+mn-cs"/>
               </a:defRPr>
             </a:pPr>
-            <a:endParaRPr lang="en-US"/>
+            <a:endParaRPr lang="pt-PT"/>
           </a:p>
         </c:txPr>
         <c:crossAx val="576068176"/>
@@ -1483,7 +1483,7 @@
               <a:cs typeface="+mn-cs"/>
             </a:defRPr>
           </a:pPr>
-          <a:endParaRPr lang="en-US"/>
+          <a:endParaRPr lang="pt-PT"/>
         </a:p>
       </c:txPr>
     </c:legend>
@@ -1512,7 +1512,7 @@
       <a:pPr>
         <a:defRPr/>
       </a:pPr>
-      <a:endParaRPr lang="en-US"/>
+      <a:endParaRPr lang="pt-PT"/>
     </a:p>
   </c:txPr>
   <c:externalData r:id="rId3">
@@ -1591,7 +1591,7 @@
               <a:cs typeface="+mn-cs"/>
             </a:defRPr>
           </a:pPr>
-          <a:endParaRPr lang="en-US"/>
+          <a:endParaRPr lang="pt-PT"/>
         </a:p>
       </c:txPr>
     </c:title>
@@ -2512,7 +2512,7 @@
                 <a:cs typeface="+mn-cs"/>
               </a:defRPr>
             </a:pPr>
-            <a:endParaRPr lang="en-US"/>
+            <a:endParaRPr lang="pt-PT"/>
           </a:p>
         </c:txPr>
         <c:crossAx val="576048336"/>
@@ -2594,7 +2594,7 @@
                   <a:cs typeface="+mn-cs"/>
                 </a:defRPr>
               </a:pPr>
-              <a:endParaRPr lang="en-US"/>
+              <a:endParaRPr lang="pt-PT"/>
             </a:p>
           </c:txPr>
         </c:title>
@@ -2626,7 +2626,7 @@
                 <a:cs typeface="+mn-cs"/>
               </a:defRPr>
             </a:pPr>
-            <a:endParaRPr lang="en-US"/>
+            <a:endParaRPr lang="pt-PT"/>
           </a:p>
         </c:txPr>
         <c:crossAx val="576045136"/>
@@ -2668,7 +2668,7 @@
               <a:cs typeface="+mn-cs"/>
             </a:defRPr>
           </a:pPr>
-          <a:endParaRPr lang="en-US"/>
+          <a:endParaRPr lang="pt-PT"/>
         </a:p>
       </c:txPr>
     </c:legend>
@@ -2697,7 +2697,7 @@
       <a:pPr>
         <a:defRPr/>
       </a:pPr>
-      <a:endParaRPr lang="en-US"/>
+      <a:endParaRPr lang="pt-PT"/>
     </a:p>
   </c:txPr>
   <c:externalData r:id="rId3">
@@ -2776,7 +2776,7 @@
               <a:cs typeface="+mn-cs"/>
             </a:defRPr>
           </a:pPr>
-          <a:endParaRPr lang="en-US"/>
+          <a:endParaRPr lang="pt-PT"/>
         </a:p>
       </c:txPr>
     </c:title>
@@ -3935,7 +3935,7 @@
                 <a:cs typeface="+mn-cs"/>
               </a:defRPr>
             </a:pPr>
-            <a:endParaRPr lang="en-US"/>
+            <a:endParaRPr lang="pt-PT"/>
           </a:p>
         </c:txPr>
         <c:crossAx val="576048336"/>
@@ -4017,7 +4017,7 @@
                   <a:cs typeface="+mn-cs"/>
                 </a:defRPr>
               </a:pPr>
-              <a:endParaRPr lang="en-US"/>
+              <a:endParaRPr lang="pt-PT"/>
             </a:p>
           </c:txPr>
         </c:title>
@@ -4049,7 +4049,7 @@
                 <a:cs typeface="+mn-cs"/>
               </a:defRPr>
             </a:pPr>
-            <a:endParaRPr lang="en-US"/>
+            <a:endParaRPr lang="pt-PT"/>
           </a:p>
         </c:txPr>
         <c:crossAx val="576045136"/>
@@ -4091,7 +4091,7 @@
               <a:cs typeface="+mn-cs"/>
             </a:defRPr>
           </a:pPr>
-          <a:endParaRPr lang="en-US"/>
+          <a:endParaRPr lang="pt-PT"/>
         </a:p>
       </c:txPr>
     </c:legend>
@@ -4120,7 +4120,7 @@
       <a:pPr>
         <a:defRPr/>
       </a:pPr>
-      <a:endParaRPr lang="en-US"/>
+      <a:endParaRPr lang="pt-PT"/>
     </a:p>
   </c:txPr>
   <c:externalData r:id="rId3">
@@ -4199,7 +4199,7 @@
               <a:cs typeface="+mn-cs"/>
             </a:defRPr>
           </a:pPr>
-          <a:endParaRPr lang="en-US"/>
+          <a:endParaRPr lang="pt-PT"/>
         </a:p>
       </c:txPr>
     </c:title>
@@ -5378,7 +5378,7 @@
                 <a:cs typeface="+mn-cs"/>
               </a:defRPr>
             </a:pPr>
-            <a:endParaRPr lang="en-US"/>
+            <a:endParaRPr lang="pt-PT"/>
           </a:p>
         </c:txPr>
         <c:crossAx val="488915848"/>
@@ -5460,7 +5460,7 @@
                   <a:cs typeface="+mn-cs"/>
                 </a:defRPr>
               </a:pPr>
-              <a:endParaRPr lang="en-US"/>
+              <a:endParaRPr lang="pt-PT"/>
             </a:p>
           </c:txPr>
         </c:title>
@@ -5492,7 +5492,7 @@
                 <a:cs typeface="+mn-cs"/>
               </a:defRPr>
             </a:pPr>
-            <a:endParaRPr lang="en-US"/>
+            <a:endParaRPr lang="pt-PT"/>
           </a:p>
         </c:txPr>
         <c:crossAx val="488912328"/>
@@ -5534,7 +5534,7 @@
               <a:cs typeface="+mn-cs"/>
             </a:defRPr>
           </a:pPr>
-          <a:endParaRPr lang="en-US"/>
+          <a:endParaRPr lang="pt-PT"/>
         </a:p>
       </c:txPr>
     </c:legend>
@@ -5563,7 +5563,7 @@
       <a:pPr>
         <a:defRPr/>
       </a:pPr>
-      <a:endParaRPr lang="en-US"/>
+      <a:endParaRPr lang="pt-PT"/>
     </a:p>
   </c:txPr>
   <c:externalData r:id="rId3">
@@ -5642,7 +5642,7 @@
               <a:cs typeface="+mn-cs"/>
             </a:defRPr>
           </a:pPr>
-          <a:endParaRPr lang="en-US"/>
+          <a:endParaRPr lang="pt-PT"/>
         </a:p>
       </c:txPr>
     </c:title>
@@ -6737,7 +6737,7 @@
                 <a:cs typeface="+mn-cs"/>
               </a:defRPr>
             </a:pPr>
-            <a:endParaRPr lang="en-US"/>
+            <a:endParaRPr lang="pt-PT"/>
           </a:p>
         </c:txPr>
         <c:crossAx val="532865232"/>
@@ -6824,7 +6824,7 @@
                   <a:cs typeface="+mn-cs"/>
                 </a:defRPr>
               </a:pPr>
-              <a:endParaRPr lang="en-US"/>
+              <a:endParaRPr lang="pt-PT"/>
             </a:p>
           </c:txPr>
         </c:title>
@@ -6856,7 +6856,7 @@
                 <a:cs typeface="+mn-cs"/>
               </a:defRPr>
             </a:pPr>
-            <a:endParaRPr lang="en-US"/>
+            <a:endParaRPr lang="pt-PT"/>
           </a:p>
         </c:txPr>
         <c:crossAx val="532862352"/>
@@ -6898,7 +6898,7 @@
               <a:cs typeface="+mn-cs"/>
             </a:defRPr>
           </a:pPr>
-          <a:endParaRPr lang="en-US"/>
+          <a:endParaRPr lang="pt-PT"/>
         </a:p>
       </c:txPr>
     </c:legend>
@@ -6927,7 +6927,7 @@
       <a:pPr>
         <a:defRPr/>
       </a:pPr>
-      <a:endParaRPr lang="en-US"/>
+      <a:endParaRPr lang="pt-PT"/>
     </a:p>
   </c:txPr>
   <c:externalData r:id="rId3">
@@ -7006,7 +7006,7 @@
               <a:cs typeface="+mn-cs"/>
             </a:defRPr>
           </a:pPr>
-          <a:endParaRPr lang="en-US"/>
+          <a:endParaRPr lang="pt-PT"/>
         </a:p>
       </c:txPr>
     </c:title>
@@ -8125,7 +8125,7 @@
                 <a:cs typeface="+mn-cs"/>
               </a:defRPr>
             </a:pPr>
-            <a:endParaRPr lang="en-US"/>
+            <a:endParaRPr lang="pt-PT"/>
           </a:p>
         </c:txPr>
         <c:crossAx val="476724040"/>
@@ -8212,7 +8212,7 @@
                   <a:cs typeface="+mn-cs"/>
                 </a:defRPr>
               </a:pPr>
-              <a:endParaRPr lang="en-US"/>
+              <a:endParaRPr lang="pt-PT"/>
             </a:p>
           </c:txPr>
         </c:title>
@@ -8244,7 +8244,7 @@
                 <a:cs typeface="+mn-cs"/>
               </a:defRPr>
             </a:pPr>
-            <a:endParaRPr lang="en-US"/>
+            <a:endParaRPr lang="pt-PT"/>
           </a:p>
         </c:txPr>
         <c:crossAx val="476728200"/>
@@ -8286,7 +8286,7 @@
               <a:cs typeface="+mn-cs"/>
             </a:defRPr>
           </a:pPr>
-          <a:endParaRPr lang="en-US"/>
+          <a:endParaRPr lang="pt-PT"/>
         </a:p>
       </c:txPr>
     </c:legend>
@@ -8315,7 +8315,7 @@
       <a:pPr>
         <a:defRPr/>
       </a:pPr>
-      <a:endParaRPr lang="en-US"/>
+      <a:endParaRPr lang="pt-PT"/>
     </a:p>
   </c:txPr>
   <c:externalData r:id="rId3">
@@ -8331,10 +8331,10 @@
   <c:roundedCorners val="0"/>
   <mc:AlternateContent xmlns:mc="http://schemas.openxmlformats.org/markup-compatibility/2006">
     <mc:Choice xmlns:c14="http://schemas.microsoft.com/office/drawing/2007/8/2/chart" Requires="c14">
-      <c14:style val="102"/>
+      <c14:style val="103"/>
     </mc:Choice>
     <mc:Fallback>
-      <c:style val="2"/>
+      <c:style val="3"/>
     </mc:Fallback>
   </mc:AlternateContent>
   <c:chart>
@@ -8394,7 +8394,7 @@
               <a:cs typeface="+mn-cs"/>
             </a:defRPr>
           </a:pPr>
-          <a:endParaRPr lang="en-US"/>
+          <a:endParaRPr lang="pt-PT"/>
         </a:p>
       </c:txPr>
     </c:title>
@@ -8421,7 +8421,9 @@
           <c:spPr>
             <a:ln w="28575" cap="rnd">
               <a:solidFill>
-                <a:schemeClr val="accent2"/>
+                <a:schemeClr val="accent1">
+                  <a:shade val="70000"/>
+                </a:schemeClr>
               </a:solidFill>
               <a:round/>
             </a:ln>
@@ -8591,7 +8593,9 @@
           <c:spPr>
             <a:ln w="28575" cap="rnd">
               <a:solidFill>
-                <a:schemeClr val="accent3"/>
+                <a:schemeClr val="accent1">
+                  <a:shade val="90000"/>
+                </a:schemeClr>
               </a:solidFill>
               <a:round/>
             </a:ln>
@@ -8761,7 +8765,9 @@
           <c:spPr>
             <a:ln w="28575" cap="rnd">
               <a:solidFill>
-                <a:schemeClr val="accent6"/>
+                <a:schemeClr val="accent1">
+                  <a:tint val="50000"/>
+                </a:schemeClr>
               </a:solidFill>
               <a:round/>
             </a:ln>
@@ -8951,7 +8957,9 @@
                 <c:spPr>
                   <a:ln w="28575" cap="rnd">
                     <a:solidFill>
-                      <a:schemeClr val="accent1"/>
+                      <a:schemeClr val="accent1">
+                        <a:shade val="50000"/>
+                      </a:schemeClr>
                     </a:solidFill>
                     <a:round/>
                   </a:ln>
@@ -9141,7 +9149,9 @@
                 <c:spPr>
                   <a:ln w="28575" cap="rnd">
                     <a:solidFill>
-                      <a:schemeClr val="accent4"/>
+                      <a:schemeClr val="accent1">
+                        <a:tint val="90000"/>
+                      </a:schemeClr>
                     </a:solidFill>
                     <a:round/>
                   </a:ln>
@@ -9331,7 +9341,9 @@
                 <c:spPr>
                   <a:ln w="28575" cap="rnd">
                     <a:solidFill>
-                      <a:schemeClr val="accent5"/>
+                      <a:schemeClr val="accent1">
+                        <a:tint val="70000"/>
+                      </a:schemeClr>
                     </a:solidFill>
                     <a:round/>
                   </a:ln>
@@ -9533,7 +9545,7 @@
                   <a:cs typeface="+mn-cs"/>
                 </a:defRPr>
               </a:pPr>
-              <a:endParaRPr lang="en-US"/>
+              <a:endParaRPr lang="pt-PT"/>
             </a:p>
           </c:txPr>
         </c:title>
@@ -9571,7 +9583,7 @@
                 <a:cs typeface="+mn-cs"/>
               </a:defRPr>
             </a:pPr>
-            <a:endParaRPr lang="en-US"/>
+            <a:endParaRPr lang="pt-PT"/>
           </a:p>
         </c:txPr>
         <c:crossAx val="530307384"/>
@@ -9628,7 +9640,7 @@
                   <a:cs typeface="+mn-cs"/>
                 </a:defRPr>
               </a:pPr>
-              <a:endParaRPr lang="en-US"/>
+              <a:endParaRPr lang="pt-PT"/>
             </a:p>
           </c:txPr>
         </c:title>
@@ -9660,7 +9672,7 @@
                 <a:cs typeface="+mn-cs"/>
               </a:defRPr>
             </a:pPr>
-            <a:endParaRPr lang="en-US"/>
+            <a:endParaRPr lang="pt-PT"/>
           </a:p>
         </c:txPr>
         <c:crossAx val="530309624"/>
@@ -9702,7 +9714,7 @@
               <a:cs typeface="+mn-cs"/>
             </a:defRPr>
           </a:pPr>
-          <a:endParaRPr lang="en-US"/>
+          <a:endParaRPr lang="pt-PT"/>
         </a:p>
       </c:txPr>
     </c:legend>
@@ -9731,7 +9743,7 @@
       <a:pPr>
         <a:defRPr/>
       </a:pPr>
-      <a:endParaRPr lang="en-US"/>
+      <a:endParaRPr lang="pt-PT"/>
     </a:p>
   </c:txPr>
   <c:externalData r:id="rId3">
@@ -9747,10 +9759,10 @@
   <c:roundedCorners val="0"/>
   <mc:AlternateContent xmlns:mc="http://schemas.openxmlformats.org/markup-compatibility/2006">
     <mc:Choice xmlns:c14="http://schemas.microsoft.com/office/drawing/2007/8/2/chart" Requires="c14">
-      <c14:style val="102"/>
+      <c14:style val="103"/>
     </mc:Choice>
     <mc:Fallback>
-      <c:style val="2"/>
+      <c:style val="3"/>
     </mc:Fallback>
   </mc:AlternateContent>
   <c:chart>
@@ -9810,7 +9822,7 @@
               <a:cs typeface="+mn-cs"/>
             </a:defRPr>
           </a:pPr>
-          <a:endParaRPr lang="en-US"/>
+          <a:endParaRPr lang="pt-PT"/>
         </a:p>
       </c:txPr>
     </c:title>
@@ -9837,7 +9849,9 @@
           <c:spPr>
             <a:ln w="28575" cap="rnd">
               <a:solidFill>
-                <a:schemeClr val="accent1"/>
+                <a:schemeClr val="accent1">
+                  <a:shade val="50000"/>
+                </a:schemeClr>
               </a:solidFill>
               <a:round/>
             </a:ln>
@@ -10007,7 +10021,9 @@
           <c:spPr>
             <a:ln w="28575" cap="rnd">
               <a:solidFill>
-                <a:schemeClr val="accent4"/>
+                <a:schemeClr val="accent1">
+                  <a:tint val="90000"/>
+                </a:schemeClr>
               </a:solidFill>
               <a:round/>
             </a:ln>
@@ -10197,7 +10213,9 @@
                 <c:spPr>
                   <a:ln w="28575" cap="rnd">
                     <a:solidFill>
-                      <a:schemeClr val="accent2"/>
+                      <a:schemeClr val="accent1">
+                        <a:shade val="70000"/>
+                      </a:schemeClr>
                     </a:solidFill>
                     <a:round/>
                   </a:ln>
@@ -10387,7 +10405,9 @@
                 <c:spPr>
                   <a:ln w="28575" cap="rnd">
                     <a:solidFill>
-                      <a:schemeClr val="accent3"/>
+                      <a:schemeClr val="accent1">
+                        <a:shade val="90000"/>
+                      </a:schemeClr>
                     </a:solidFill>
                     <a:round/>
                   </a:ln>
@@ -10577,7 +10597,9 @@
                 <c:spPr>
                   <a:ln w="28575" cap="rnd">
                     <a:solidFill>
-                      <a:schemeClr val="accent5"/>
+                      <a:schemeClr val="accent1">
+                        <a:tint val="70000"/>
+                      </a:schemeClr>
                     </a:solidFill>
                     <a:round/>
                   </a:ln>
@@ -10767,7 +10789,9 @@
                 <c:spPr>
                   <a:ln w="28575" cap="rnd">
                     <a:solidFill>
-                      <a:schemeClr val="accent6"/>
+                      <a:schemeClr val="accent1">
+                        <a:tint val="50000"/>
+                      </a:schemeClr>
                     </a:solidFill>
                     <a:round/>
                   </a:ln>
@@ -10977,7 +11001,7 @@
                 <a:cs typeface="+mn-cs"/>
               </a:defRPr>
             </a:pPr>
-            <a:endParaRPr lang="en-US"/>
+            <a:endParaRPr lang="pt-PT"/>
           </a:p>
         </c:txPr>
         <c:crossAx val="530485496"/>
@@ -11059,7 +11083,7 @@
                   <a:cs typeface="+mn-cs"/>
                 </a:defRPr>
               </a:pPr>
-              <a:endParaRPr lang="en-US"/>
+              <a:endParaRPr lang="pt-PT"/>
             </a:p>
           </c:txPr>
         </c:title>
@@ -11091,7 +11115,7 @@
                 <a:cs typeface="+mn-cs"/>
               </a:defRPr>
             </a:pPr>
-            <a:endParaRPr lang="en-US"/>
+            <a:endParaRPr lang="pt-PT"/>
           </a:p>
         </c:txPr>
         <c:crossAx val="530485176"/>
@@ -11133,7 +11157,7 @@
               <a:cs typeface="+mn-cs"/>
             </a:defRPr>
           </a:pPr>
-          <a:endParaRPr lang="en-US"/>
+          <a:endParaRPr lang="pt-PT"/>
         </a:p>
       </c:txPr>
     </c:legend>
@@ -11162,7 +11186,7 @@
       <a:pPr>
         <a:defRPr/>
       </a:pPr>
-      <a:endParaRPr lang="en-US"/>
+      <a:endParaRPr lang="pt-PT"/>
     </a:p>
   </c:txPr>
   <c:externalData r:id="rId3">
@@ -11241,7 +11265,7 @@
               <a:cs typeface="+mn-cs"/>
             </a:defRPr>
           </a:pPr>
-          <a:endParaRPr lang="en-US"/>
+          <a:endParaRPr lang="pt-PT"/>
         </a:p>
       </c:txPr>
     </c:title>
@@ -12336,7 +12360,7 @@
                 <a:cs typeface="+mn-cs"/>
               </a:defRPr>
             </a:pPr>
-            <a:endParaRPr lang="en-US"/>
+            <a:endParaRPr lang="pt-PT"/>
           </a:p>
         </c:txPr>
         <c:crossAx val="532054664"/>
@@ -12423,7 +12447,7 @@
                   <a:cs typeface="+mn-cs"/>
                 </a:defRPr>
               </a:pPr>
-              <a:endParaRPr lang="en-US"/>
+              <a:endParaRPr lang="pt-PT"/>
             </a:p>
           </c:txPr>
         </c:title>
@@ -12455,7 +12479,7 @@
                 <a:cs typeface="+mn-cs"/>
               </a:defRPr>
             </a:pPr>
-            <a:endParaRPr lang="en-US"/>
+            <a:endParaRPr lang="pt-PT"/>
           </a:p>
         </c:txPr>
         <c:crossAx val="532054024"/>
@@ -12497,7 +12521,7 @@
               <a:cs typeface="+mn-cs"/>
             </a:defRPr>
           </a:pPr>
-          <a:endParaRPr lang="en-US"/>
+          <a:endParaRPr lang="pt-PT"/>
         </a:p>
       </c:txPr>
     </c:legend>
@@ -12526,7 +12550,7 @@
       <a:pPr>
         <a:defRPr/>
       </a:pPr>
-      <a:endParaRPr lang="en-US"/>
+      <a:endParaRPr lang="pt-PT"/>
     </a:p>
   </c:txPr>
   <c:externalData r:id="rId3">
@@ -12605,7 +12629,7 @@
               <a:cs typeface="+mn-cs"/>
             </a:defRPr>
           </a:pPr>
-          <a:endParaRPr lang="en-US"/>
+          <a:endParaRPr lang="pt-PT"/>
         </a:p>
       </c:txPr>
     </c:title>
@@ -13182,7 +13206,7 @@
                 <a:cs typeface="+mn-cs"/>
               </a:defRPr>
             </a:pPr>
-            <a:endParaRPr lang="en-US"/>
+            <a:endParaRPr lang="pt-PT"/>
           </a:p>
         </c:txPr>
         <c:crossAx val="248970040"/>
@@ -13269,7 +13293,7 @@
                   <a:cs typeface="+mn-cs"/>
                 </a:defRPr>
               </a:pPr>
-              <a:endParaRPr lang="en-US"/>
+              <a:endParaRPr lang="pt-PT"/>
             </a:p>
           </c:txPr>
         </c:title>
@@ -13301,7 +13325,7 @@
                 <a:cs typeface="+mn-cs"/>
               </a:defRPr>
             </a:pPr>
-            <a:endParaRPr lang="en-US"/>
+            <a:endParaRPr lang="pt-PT"/>
           </a:p>
         </c:txPr>
         <c:crossAx val="248963640"/>
@@ -13343,7 +13367,7 @@
               <a:cs typeface="+mn-cs"/>
             </a:defRPr>
           </a:pPr>
-          <a:endParaRPr lang="en-US"/>
+          <a:endParaRPr lang="pt-PT"/>
         </a:p>
       </c:txPr>
     </c:legend>
@@ -13372,7 +13396,7 @@
       <a:pPr>
         <a:defRPr/>
       </a:pPr>
-      <a:endParaRPr lang="en-US"/>
+      <a:endParaRPr lang="pt-PT"/>
     </a:p>
   </c:txPr>
   <c:externalData r:id="rId3">
@@ -13449,7 +13473,7 @@
               <a:cs typeface="+mn-cs"/>
             </a:defRPr>
           </a:pPr>
-          <a:endParaRPr lang="en-US"/>
+          <a:endParaRPr lang="pt-PT"/>
         </a:p>
       </c:txPr>
     </c:title>
@@ -14026,7 +14050,7 @@
                 <a:cs typeface="+mn-cs"/>
               </a:defRPr>
             </a:pPr>
-            <a:endParaRPr lang="en-US"/>
+            <a:endParaRPr lang="pt-PT"/>
           </a:p>
         </c:txPr>
         <c:crossAx val="452565304"/>
@@ -14108,7 +14132,7 @@
                   <a:cs typeface="+mn-cs"/>
                 </a:defRPr>
               </a:pPr>
-              <a:endParaRPr lang="en-US"/>
+              <a:endParaRPr lang="pt-PT"/>
             </a:p>
           </c:txPr>
         </c:title>
@@ -14140,7 +14164,7 @@
                 <a:cs typeface="+mn-cs"/>
               </a:defRPr>
             </a:pPr>
-            <a:endParaRPr lang="en-US"/>
+            <a:endParaRPr lang="pt-PT"/>
           </a:p>
         </c:txPr>
         <c:crossAx val="452564984"/>
@@ -14182,7 +14206,7 @@
               <a:cs typeface="+mn-cs"/>
             </a:defRPr>
           </a:pPr>
-          <a:endParaRPr lang="en-US"/>
+          <a:endParaRPr lang="pt-PT"/>
         </a:p>
       </c:txPr>
     </c:legend>
@@ -14211,7 +14235,7 @@
       <a:pPr>
         <a:defRPr/>
       </a:pPr>
-      <a:endParaRPr lang="en-US"/>
+      <a:endParaRPr lang="pt-PT"/>
     </a:p>
   </c:txPr>
   <c:externalData r:id="rId3">
@@ -14290,7 +14314,7 @@
               <a:cs typeface="+mn-cs"/>
             </a:defRPr>
           </a:pPr>
-          <a:endParaRPr lang="en-US"/>
+          <a:endParaRPr lang="pt-PT"/>
         </a:p>
       </c:txPr>
     </c:title>
@@ -14867,7 +14891,7 @@
                 <a:cs typeface="+mn-cs"/>
               </a:defRPr>
             </a:pPr>
-            <a:endParaRPr lang="en-US"/>
+            <a:endParaRPr lang="pt-PT"/>
           </a:p>
         </c:txPr>
         <c:crossAx val="476653960"/>
@@ -14954,7 +14978,7 @@
                   <a:cs typeface="+mn-cs"/>
                 </a:defRPr>
               </a:pPr>
-              <a:endParaRPr lang="en-US"/>
+              <a:endParaRPr lang="pt-PT"/>
             </a:p>
           </c:txPr>
         </c:title>
@@ -14986,7 +15010,7 @@
                 <a:cs typeface="+mn-cs"/>
               </a:defRPr>
             </a:pPr>
-            <a:endParaRPr lang="en-US"/>
+            <a:endParaRPr lang="pt-PT"/>
           </a:p>
         </c:txPr>
         <c:crossAx val="476652680"/>
@@ -15028,7 +15052,7 @@
               <a:cs typeface="+mn-cs"/>
             </a:defRPr>
           </a:pPr>
-          <a:endParaRPr lang="en-US"/>
+          <a:endParaRPr lang="pt-PT"/>
         </a:p>
       </c:txPr>
     </c:legend>
@@ -15057,7 +15081,7 @@
       <a:pPr>
         <a:defRPr/>
       </a:pPr>
-      <a:endParaRPr lang="en-US"/>
+      <a:endParaRPr lang="pt-PT"/>
     </a:p>
   </c:txPr>
   <c:externalData r:id="rId3">
@@ -15132,7 +15156,7 @@
               <a:cs typeface="+mn-cs"/>
             </a:defRPr>
           </a:pPr>
-          <a:endParaRPr lang="en-US"/>
+          <a:endParaRPr lang="pt-PT"/>
         </a:p>
       </c:txPr>
     </c:title>
@@ -15709,7 +15733,7 @@
                 <a:cs typeface="+mn-cs"/>
               </a:defRPr>
             </a:pPr>
-            <a:endParaRPr lang="en-US"/>
+            <a:endParaRPr lang="pt-PT"/>
           </a:p>
         </c:txPr>
         <c:crossAx val="528005880"/>
@@ -15791,7 +15815,7 @@
                   <a:cs typeface="+mn-cs"/>
                 </a:defRPr>
               </a:pPr>
-              <a:endParaRPr lang="en-US"/>
+              <a:endParaRPr lang="pt-PT"/>
             </a:p>
           </c:txPr>
         </c:title>
@@ -15823,7 +15847,7 @@
                 <a:cs typeface="+mn-cs"/>
               </a:defRPr>
             </a:pPr>
-            <a:endParaRPr lang="en-US"/>
+            <a:endParaRPr lang="pt-PT"/>
           </a:p>
         </c:txPr>
         <c:crossAx val="528009400"/>
@@ -15865,7 +15889,7 @@
               <a:cs typeface="+mn-cs"/>
             </a:defRPr>
           </a:pPr>
-          <a:endParaRPr lang="en-US"/>
+          <a:endParaRPr lang="pt-PT"/>
         </a:p>
       </c:txPr>
     </c:legend>
@@ -15894,7 +15918,7 @@
       <a:pPr>
         <a:defRPr/>
       </a:pPr>
-      <a:endParaRPr lang="en-US"/>
+      <a:endParaRPr lang="pt-PT"/>
     </a:p>
   </c:txPr>
   <c:externalData r:id="rId3">
@@ -15973,7 +15997,7 @@
               <a:cs typeface="+mn-cs"/>
             </a:defRPr>
           </a:pPr>
-          <a:endParaRPr lang="en-US"/>
+          <a:endParaRPr lang="pt-PT"/>
         </a:p>
       </c:txPr>
     </c:title>
@@ -16550,7 +16574,7 @@
                 <a:cs typeface="+mn-cs"/>
               </a:defRPr>
             </a:pPr>
-            <a:endParaRPr lang="en-US"/>
+            <a:endParaRPr lang="pt-PT"/>
           </a:p>
         </c:txPr>
         <c:crossAx val="248956600"/>
@@ -16632,7 +16656,7 @@
                   <a:cs typeface="+mn-cs"/>
                 </a:defRPr>
               </a:pPr>
-              <a:endParaRPr lang="en-US"/>
+              <a:endParaRPr lang="pt-PT"/>
             </a:p>
           </c:txPr>
         </c:title>
@@ -16664,7 +16688,7 @@
                 <a:cs typeface="+mn-cs"/>
               </a:defRPr>
             </a:pPr>
-            <a:endParaRPr lang="en-US"/>
+            <a:endParaRPr lang="pt-PT"/>
           </a:p>
         </c:txPr>
         <c:crossAx val="248956280"/>
@@ -16706,7 +16730,7 @@
               <a:cs typeface="+mn-cs"/>
             </a:defRPr>
           </a:pPr>
-          <a:endParaRPr lang="en-US"/>
+          <a:endParaRPr lang="pt-PT"/>
         </a:p>
       </c:txPr>
     </c:legend>
@@ -16735,7 +16759,7 @@
       <a:pPr>
         <a:defRPr/>
       </a:pPr>
-      <a:endParaRPr lang="en-US"/>
+      <a:endParaRPr lang="pt-PT"/>
     </a:p>
   </c:txPr>
   <c:externalData r:id="rId3">
@@ -16814,7 +16838,7 @@
               <a:cs typeface="+mn-cs"/>
             </a:defRPr>
           </a:pPr>
-          <a:endParaRPr lang="en-US"/>
+          <a:endParaRPr lang="pt-PT"/>
         </a:p>
       </c:txPr>
     </c:title>
@@ -17391,7 +17415,7 @@
                 <a:cs typeface="+mn-cs"/>
               </a:defRPr>
             </a:pPr>
-            <a:endParaRPr lang="en-US"/>
+            <a:endParaRPr lang="pt-PT"/>
           </a:p>
         </c:txPr>
         <c:crossAx val="452533304"/>
@@ -17473,7 +17497,7 @@
                   <a:cs typeface="+mn-cs"/>
                 </a:defRPr>
               </a:pPr>
-              <a:endParaRPr lang="en-US"/>
+              <a:endParaRPr lang="pt-PT"/>
             </a:p>
           </c:txPr>
         </c:title>
@@ -17505,7 +17529,7 @@
                 <a:cs typeface="+mn-cs"/>
               </a:defRPr>
             </a:pPr>
-            <a:endParaRPr lang="en-US"/>
+            <a:endParaRPr lang="pt-PT"/>
           </a:p>
         </c:txPr>
         <c:crossAx val="452535544"/>
@@ -17547,7 +17571,7 @@
               <a:cs typeface="+mn-cs"/>
             </a:defRPr>
           </a:pPr>
-          <a:endParaRPr lang="en-US"/>
+          <a:endParaRPr lang="pt-PT"/>
         </a:p>
       </c:txPr>
     </c:legend>
@@ -17576,7 +17600,7 @@
       <a:pPr>
         <a:defRPr/>
       </a:pPr>
-      <a:endParaRPr lang="en-US"/>
+      <a:endParaRPr lang="pt-PT"/>
     </a:p>
   </c:txPr>
   <c:externalData r:id="rId3">
@@ -17659,7 +17683,7 @@
               <a:cs typeface="+mn-cs"/>
             </a:defRPr>
           </a:pPr>
-          <a:endParaRPr lang="en-US"/>
+          <a:endParaRPr lang="pt-PT"/>
         </a:p>
       </c:txPr>
     </c:title>
@@ -18778,7 +18802,7 @@
                 <a:cs typeface="+mn-cs"/>
               </a:defRPr>
             </a:pPr>
-            <a:endParaRPr lang="en-US"/>
+            <a:endParaRPr lang="pt-PT"/>
           </a:p>
         </c:txPr>
         <c:crossAx val="576068816"/>
@@ -18860,7 +18884,7 @@
                   <a:cs typeface="+mn-cs"/>
                 </a:defRPr>
               </a:pPr>
-              <a:endParaRPr lang="en-US"/>
+              <a:endParaRPr lang="pt-PT"/>
             </a:p>
           </c:txPr>
         </c:title>
@@ -18892,7 +18916,7 @@
                 <a:cs typeface="+mn-cs"/>
               </a:defRPr>
             </a:pPr>
-            <a:endParaRPr lang="en-US"/>
+            <a:endParaRPr lang="pt-PT"/>
           </a:p>
         </c:txPr>
         <c:crossAx val="576068176"/>
@@ -18935,7 +18959,7 @@
               <a:cs typeface="+mn-cs"/>
             </a:defRPr>
           </a:pPr>
-          <a:endParaRPr lang="en-US"/>
+          <a:endParaRPr lang="pt-PT"/>
         </a:p>
       </c:txPr>
     </c:legend>
@@ -18964,7 +18988,7 @@
       <a:pPr>
         <a:defRPr/>
       </a:pPr>
-      <a:endParaRPr lang="en-US"/>
+      <a:endParaRPr lang="pt-PT"/>
     </a:p>
   </c:txPr>
   <c:externalData r:id="rId3">
@@ -19010,82 +19034,14 @@
 </file>
 
 <file path=ppt/charts/colors15.xml><?xml version="1.0" encoding="utf-8"?>
-<cs:colorStyle xmlns:cs="http://schemas.microsoft.com/office/drawing/2012/chartStyle" xmlns:a="http://schemas.openxmlformats.org/drawingml/2006/main" meth="cycle" id="10">
+<cs:colorStyle xmlns:cs="http://schemas.microsoft.com/office/drawing/2012/chartStyle" xmlns:a="http://schemas.openxmlformats.org/drawingml/2006/main" meth="withinLinear" id="14">
   <a:schemeClr val="accent1"/>
-  <a:schemeClr val="accent2"/>
-  <a:schemeClr val="accent3"/>
-  <a:schemeClr val="accent4"/>
-  <a:schemeClr val="accent5"/>
-  <a:schemeClr val="accent6"/>
-  <cs:variation/>
-  <cs:variation>
-    <a:lumMod val="60000"/>
-  </cs:variation>
-  <cs:variation>
-    <a:lumMod val="80000"/>
-    <a:lumOff val="20000"/>
-  </cs:variation>
-  <cs:variation>
-    <a:lumMod val="80000"/>
-  </cs:variation>
-  <cs:variation>
-    <a:lumMod val="60000"/>
-    <a:lumOff val="40000"/>
-  </cs:variation>
-  <cs:variation>
-    <a:lumMod val="50000"/>
-  </cs:variation>
-  <cs:variation>
-    <a:lumMod val="70000"/>
-    <a:lumOff val="30000"/>
-  </cs:variation>
-  <cs:variation>
-    <a:lumMod val="70000"/>
-  </cs:variation>
-  <cs:variation>
-    <a:lumMod val="50000"/>
-    <a:lumOff val="50000"/>
-  </cs:variation>
 </cs:colorStyle>
 </file>
 
 <file path=ppt/charts/colors16.xml><?xml version="1.0" encoding="utf-8"?>
-<cs:colorStyle xmlns:cs="http://schemas.microsoft.com/office/drawing/2012/chartStyle" xmlns:a="http://schemas.openxmlformats.org/drawingml/2006/main" meth="cycle" id="10">
+<cs:colorStyle xmlns:cs="http://schemas.microsoft.com/office/drawing/2012/chartStyle" xmlns:a="http://schemas.openxmlformats.org/drawingml/2006/main" meth="withinLinear" id="14">
   <a:schemeClr val="accent1"/>
-  <a:schemeClr val="accent2"/>
-  <a:schemeClr val="accent3"/>
-  <a:schemeClr val="accent4"/>
-  <a:schemeClr val="accent5"/>
-  <a:schemeClr val="accent6"/>
-  <cs:variation/>
-  <cs:variation>
-    <a:lumMod val="60000"/>
-  </cs:variation>
-  <cs:variation>
-    <a:lumMod val="80000"/>
-    <a:lumOff val="20000"/>
-  </cs:variation>
-  <cs:variation>
-    <a:lumMod val="80000"/>
-  </cs:variation>
-  <cs:variation>
-    <a:lumMod val="60000"/>
-    <a:lumOff val="40000"/>
-  </cs:variation>
-  <cs:variation>
-    <a:lumMod val="50000"/>
-  </cs:variation>
-  <cs:variation>
-    <a:lumMod val="70000"/>
-    <a:lumOff val="30000"/>
-  </cs:variation>
-  <cs:variation>
-    <a:lumMod val="70000"/>
-  </cs:variation>
-  <cs:variation>
-    <a:lumMod val="50000"/>
-    <a:lumOff val="50000"/>
-  </cs:variation>
 </cs:colorStyle>
 </file>
 
@@ -27475,7 +27431,7 @@
           <a:p>
             <a:fld id="{F44294F6-B623-4C0C-8B0A-DE37EB53E815}" type="datetimeFigureOut">
               <a:rPr lang="pt-PT" smtClean="0"/>
-              <a:t>02/04/2021</a:t>
+              <a:t>03/04/2021</a:t>
             </a:fld>
             <a:endParaRPr lang="pt-PT"/>
           </a:p>
@@ -28053,9 +28009,9 @@
           <a:bodyPr/>
           <a:lstStyle/>
           <a:p>
-            <a:fld id="{9AB3A824-1A51-4B26-AD58-A6D8E14F6C04}" type="datetimeFigureOut">
+            <a:fld id="{73127B9F-1CEF-4C20-BF03-D17360EE4279}" type="datetime1">
               <a:rPr lang="en-US" smtClean="0"/>
-              <a:t>4/2/2021</a:t>
+              <a:t>4/3/2021</a:t>
             </a:fld>
             <a:endParaRPr lang="en-US" dirty="0"/>
           </a:p>
@@ -28266,9 +28222,9 @@
           <a:bodyPr/>
           <a:lstStyle/>
           <a:p>
-            <a:fld id="{D857E33E-8B18-4087-B112-809917729534}" type="datetimeFigureOut">
+            <a:fld id="{9C2AA84B-6463-48D6-9640-AA8D8EC0676F}" type="datetime1">
               <a:rPr lang="en-US" smtClean="0"/>
-              <a:t>4/2/2021</a:t>
+              <a:t>4/3/2021</a:t>
             </a:fld>
             <a:endParaRPr lang="en-US" dirty="0"/>
           </a:p>
@@ -28527,9 +28483,9 @@
           <a:bodyPr/>
           <a:lstStyle/>
           <a:p>
-            <a:fld id="{D3FFE419-2371-464F-8239-3959401C3561}" type="datetimeFigureOut">
+            <a:fld id="{17AEE62D-9B0A-477D-B3AC-2619EA412BF5}" type="datetime1">
               <a:rPr lang="en-US" smtClean="0"/>
-              <a:t>4/2/2021</a:t>
+              <a:t>4/3/2021</a:t>
             </a:fld>
             <a:endParaRPr lang="en-US" dirty="0"/>
           </a:p>
@@ -28702,9 +28658,9 @@
           <a:bodyPr/>
           <a:lstStyle/>
           <a:p>
-            <a:fld id="{97D162C4-EDD9-4389-A98B-B87ECEA2A816}" type="datetimeFigureOut">
+            <a:fld id="{8861DA35-EAEB-489D-A1AF-9015E3D16DF9}" type="datetime1">
               <a:rPr lang="en-US" smtClean="0"/>
-              <a:t>4/2/2021</a:t>
+              <a:t>4/3/2021</a:t>
             </a:fld>
             <a:endParaRPr lang="en-US" dirty="0"/>
           </a:p>
@@ -29050,9 +29006,9 @@
           <a:bodyPr/>
           <a:lstStyle/>
           <a:p>
-            <a:fld id="{3E5059C3-6A89-4494-99FF-5A4D6FFD50EB}" type="datetimeFigureOut">
+            <a:fld id="{72C57D42-48FC-4059-8102-DCAA8818E42F}" type="datetime1">
               <a:rPr lang="en-US" smtClean="0"/>
-              <a:t>4/2/2021</a:t>
+              <a:t>4/3/2021</a:t>
             </a:fld>
             <a:endParaRPr lang="en-US" dirty="0"/>
           </a:p>
@@ -29330,9 +29286,9 @@
           <a:bodyPr/>
           <a:lstStyle/>
           <a:p>
-            <a:fld id="{CA954B2F-12DE-47F5-8894-472B206D2E1E}" type="datetimeFigureOut">
+            <a:fld id="{E1632BDA-8E0D-4498-8032-34BF76D7B241}" type="datetime1">
               <a:rPr lang="en-US" smtClean="0"/>
-              <a:t>4/2/2021</a:t>
+              <a:t>4/3/2021</a:t>
             </a:fld>
             <a:endParaRPr lang="en-US" dirty="0"/>
           </a:p>
@@ -29714,9 +29670,9 @@
           <a:bodyPr/>
           <a:lstStyle/>
           <a:p>
-            <a:fld id="{3F30E46F-7819-4ACF-B48B-48222C2ACC88}" type="datetimeFigureOut">
+            <a:fld id="{74260D5A-4A0B-4CED-8D66-4ADB1195BC89}" type="datetime1">
               <a:rPr lang="en-US" smtClean="0"/>
-              <a:t>4/2/2021</a:t>
+              <a:t>4/3/2021</a:t>
             </a:fld>
             <a:endParaRPr lang="en-US" dirty="0"/>
           </a:p>
@@ -29837,9 +29793,9 @@
           <a:bodyPr/>
           <a:lstStyle/>
           <a:p>
-            <a:fld id="{1FAF3416-4057-4DAA-829D-4CA07428D088}" type="datetimeFigureOut">
+            <a:fld id="{91F6F9B4-FE5D-4101-A65A-2789C0AD46B7}" type="datetime1">
               <a:rPr lang="en-US" smtClean="0"/>
-              <a:t>4/2/2021</a:t>
+              <a:t>4/3/2021</a:t>
             </a:fld>
             <a:endParaRPr lang="en-US" dirty="0"/>
           </a:p>
@@ -30013,9 +29969,9 @@
           <a:bodyPr/>
           <a:lstStyle/>
           <a:p>
-            <a:fld id="{921D9284-D300-4297-87F7-E791DCC15DB1}" type="datetimeFigureOut">
+            <a:fld id="{180BD065-C9D8-4349-98F7-40EA485F831D}" type="datetime1">
               <a:rPr lang="en-US" smtClean="0"/>
-              <a:t>4/2/2021</a:t>
+              <a:t>4/3/2021</a:t>
             </a:fld>
             <a:endParaRPr lang="en-US" dirty="0"/>
           </a:p>
@@ -30372,9 +30328,9 @@
             </a:lvl1pPr>
           </a:lstStyle>
           <a:p>
-            <a:fld id="{37D525BB-DA17-4BA0-B3C8-3AC3ABC827E6}" type="datetimeFigureOut">
+            <a:fld id="{BA50BE06-1E37-4C09-8CAB-0552D9D0B473}" type="datetime1">
               <a:rPr lang="en-US" smtClean="0"/>
-              <a:t>4/2/2021</a:t>
+              <a:t>4/3/2021</a:t>
             </a:fld>
             <a:endParaRPr lang="en-US" dirty="0"/>
           </a:p>
@@ -30754,9 +30710,9 @@
           <a:bodyPr/>
           <a:lstStyle/>
           <a:p>
-            <a:fld id="{B16C4C9A-3960-41CF-A4E9-2A8FB932454B}" type="datetimeFigureOut">
+            <a:fld id="{68368B77-A686-46B6-9C66-013E6212C94A}" type="datetime1">
               <a:rPr lang="en-US" smtClean="0"/>
-              <a:t>4/2/2021</a:t>
+              <a:t>4/3/2021</a:t>
             </a:fld>
             <a:endParaRPr lang="en-US" dirty="0"/>
           </a:p>
@@ -31046,9 +31002,9 @@
             </a:lvl1pPr>
           </a:lstStyle>
           <a:p>
-            <a:fld id="{3CBC1C18-307B-4F68-A007-B5B542270E8D}" type="datetimeFigureOut">
+            <a:fld id="{3CD9D971-2A51-4AF6-BFC5-14FC66AB3101}" type="datetime1">
               <a:rPr lang="en-US" smtClean="0"/>
-              <a:t>4/2/2021</a:t>
+              <a:t>4/3/2021</a:t>
             </a:fld>
             <a:endParaRPr lang="en-US" dirty="0"/>
           </a:p>
@@ -31193,7 +31149,7 @@
     <p:sldLayoutId id="2147483766" r:id="rId10"/>
     <p:sldLayoutId id="2147483767" r:id="rId11"/>
   </p:sldLayoutIdLst>
-  <p:hf sldNum="0" hdr="0" ftr="0" dt="0"/>
+  <p:hf hdr="0" ftr="0" dt="0"/>
   <p:txStyles>
     <p:titleStyle>
       <a:lvl1pPr algn="l" defTabSz="914400" rtl="0" eaLnBrk="1" latinLnBrk="0" hangingPunct="1">
@@ -31973,6 +31929,35 @@
           </a:p>
         </p:txBody>
       </p:sp>
+      <p:sp>
+        <p:nvSpPr>
+          <p:cNvPr id="5" name="Marcador de Posição do Número do Diapositivo 4">
+            <a:extLst>
+              <a:ext uri="{FF2B5EF4-FFF2-40B4-BE49-F238E27FC236}">
+                <a16:creationId xmlns:a16="http://schemas.microsoft.com/office/drawing/2014/main" id="{E1AE1B5B-5329-446E-B7E4-6299E85631C8}"/>
+              </a:ext>
+            </a:extLst>
+          </p:cNvPr>
+          <p:cNvSpPr>
+            <a:spLocks noGrp="1"/>
+          </p:cNvSpPr>
+          <p:nvPr>
+            <p:ph type="sldNum" sz="quarter" idx="12"/>
+          </p:nvPr>
+        </p:nvSpPr>
+        <p:spPr/>
+        <p:txBody>
+          <a:bodyPr/>
+          <a:lstStyle/>
+          <a:p>
+            <a:fld id="{6D22F896-40B5-4ADD-8801-0D06FADFA095}" type="slidenum">
+              <a:rPr lang="en-US" smtClean="0"/>
+              <a:t>1</a:t>
+            </a:fld>
+            <a:endParaRPr lang="en-US" dirty="0"/>
+          </a:p>
+        </p:txBody>
+      </p:sp>
     </p:spTree>
     <p:extLst>
       <p:ext uri="{BB962C8B-B14F-4D97-AF65-F5344CB8AC3E}">
@@ -32136,6 +32121,35 @@
           </a:graphicData>
         </a:graphic>
       </p:graphicFrame>
+      <p:sp>
+        <p:nvSpPr>
+          <p:cNvPr id="4" name="Marcador de Posição do Número do Diapositivo 3">
+            <a:extLst>
+              <a:ext uri="{FF2B5EF4-FFF2-40B4-BE49-F238E27FC236}">
+                <a16:creationId xmlns:a16="http://schemas.microsoft.com/office/drawing/2014/main" id="{39FDDD2A-557C-4332-B430-DB71A95CBC8D}"/>
+              </a:ext>
+            </a:extLst>
+          </p:cNvPr>
+          <p:cNvSpPr>
+            <a:spLocks noGrp="1"/>
+          </p:cNvSpPr>
+          <p:nvPr>
+            <p:ph type="sldNum" sz="quarter" idx="12"/>
+          </p:nvPr>
+        </p:nvSpPr>
+        <p:spPr/>
+        <p:txBody>
+          <a:bodyPr/>
+          <a:lstStyle/>
+          <a:p>
+            <a:fld id="{6D22F896-40B5-4ADD-8801-0D06FADFA095}" type="slidenum">
+              <a:rPr lang="en-US" smtClean="0"/>
+              <a:t>10</a:t>
+            </a:fld>
+            <a:endParaRPr lang="en-US" dirty="0"/>
+          </a:p>
+        </p:txBody>
+      </p:sp>
     </p:spTree>
     <p:extLst>
       <p:ext uri="{BB962C8B-B14F-4D97-AF65-F5344CB8AC3E}">
@@ -32236,7 +32250,63 @@
             </a:pPr>
             <a:r>
               <a:rPr lang="pt-PT" sz="1600" dirty="0"/>
-              <a:t>Concluiu-se que algoritmos de pesquisa informada (particularmente o A* nos dados obtidos) são geralmente mais eficientes. </a:t>
+              <a:t>Concluímos, tal como seria esperado, que os algoritmos de pesquisa informada (</a:t>
+            </a:r>
+            <a:r>
+              <a:rPr lang="pt-PT" sz="1600" dirty="0" err="1"/>
+              <a:t>Greedy</a:t>
+            </a:r>
+            <a:r>
+              <a:rPr lang="pt-PT" sz="1600" dirty="0"/>
+              <a:t> e A*) são mais eficientes do que os métodos de pesquisa não informada (BFS, DFS, </a:t>
+            </a:r>
+            <a:r>
+              <a:rPr lang="pt-PT" sz="1600" i="1" dirty="0" err="1"/>
+              <a:t>Uniform</a:t>
+            </a:r>
+            <a:r>
+              <a:rPr lang="pt-PT" sz="1600" i="1" dirty="0"/>
+              <a:t> </a:t>
+            </a:r>
+            <a:r>
+              <a:rPr lang="pt-PT" sz="1600" i="1" dirty="0" err="1"/>
+              <a:t>Cost</a:t>
+            </a:r>
+            <a:r>
+              <a:rPr lang="pt-PT" sz="1600" dirty="0"/>
+              <a:t>, </a:t>
+            </a:r>
+            <a:r>
+              <a:rPr lang="pt-PT" sz="1600" i="1" dirty="0" err="1"/>
+              <a:t>Iterative</a:t>
+            </a:r>
+            <a:r>
+              <a:rPr lang="pt-PT" sz="1600" i="1" dirty="0"/>
+              <a:t> </a:t>
+            </a:r>
+            <a:r>
+              <a:rPr lang="pt-PT" sz="1600" i="1" dirty="0" err="1"/>
+              <a:t>Deepening</a:t>
+            </a:r>
+            <a:r>
+              <a:rPr lang="pt-PT" sz="1600" dirty="0"/>
+              <a:t>). Dentro dos algoritmos de pesquisa informada, concluímos que para os puzzles construídos, o A* se demonstra como mais eficiente. Relativamente ao </a:t>
+            </a:r>
+            <a:r>
+              <a:rPr lang="pt-PT" sz="1600" i="1" dirty="0" err="1"/>
+              <a:t>Iterative</a:t>
+            </a:r>
+            <a:r>
+              <a:rPr lang="pt-PT" sz="1600" i="1" dirty="0"/>
+              <a:t> </a:t>
+            </a:r>
+            <a:r>
+              <a:rPr lang="pt-PT" sz="1600" i="1" dirty="0" err="1"/>
+              <a:t>Deepening</a:t>
+            </a:r>
+            <a:r>
+              <a:rPr lang="pt-PT" sz="1600" dirty="0"/>
+              <a:t>, este demonstrou ser o menos eficaz, uma vez que necessita de expandir muitos mais nós do que os restantes para conseguir atingir os mesmos resultados.</a:t>
             </a:r>
           </a:p>
           <a:p>
@@ -32247,9 +32317,62 @@
             </a:pPr>
             <a:r>
               <a:rPr lang="pt-PT" sz="1600" dirty="0"/>
-              <a:t>Entendemos também a importância de escolher heurísticas adequadas, sendo que esta foi uma dificuldade com que nos deparamos no desenvolvimento do projeto.</a:t>
+              <a:t>Entendemos também a importância de escolher heurísticas adequadas, sendo que esta foi uma dificuldade com que nos deparamos no desenvolvimento do projeto. Desenvolvemos 3 diferentes heurísticas para podermos comparar os respetivos resultados quando aplicadas aos algoritmos </a:t>
+            </a:r>
+            <a:r>
+              <a:rPr lang="pt-PT" sz="1600" dirty="0" err="1"/>
+              <a:t>Greedy</a:t>
+            </a:r>
+            <a:r>
+              <a:rPr lang="pt-PT" sz="1600" dirty="0"/>
+              <a:t> e A*, tendo concluído que a </a:t>
+            </a:r>
+            <a:r>
+              <a:rPr lang="pt-PT" sz="1600" i="1" dirty="0"/>
+              <a:t>heuristic1</a:t>
+            </a:r>
+            <a:r>
+              <a:rPr lang="pt-PT" sz="1600" dirty="0"/>
+              <a:t> é a mais eficaz para ambos os algoritmos. Por outro lado, chegamos também à conclusão que a </a:t>
+            </a:r>
+            <a:r>
+              <a:rPr lang="pt-PT" sz="1600" i="1" dirty="0"/>
+              <a:t>heuristic3</a:t>
+            </a:r>
+            <a:r>
+              <a:rPr lang="pt-PT" sz="1600" dirty="0"/>
+              <a:t> não é boa, uma vez que quando aplicada ao A*, para alguns níveis, faz com que não se atinja uma solução ótima.  </a:t>
             </a:r>
             <a:endParaRPr lang="en-US" sz="1600" dirty="0"/>
+          </a:p>
+        </p:txBody>
+      </p:sp>
+      <p:sp>
+        <p:nvSpPr>
+          <p:cNvPr id="4" name="Marcador de Posição do Número do Diapositivo 3">
+            <a:extLst>
+              <a:ext uri="{FF2B5EF4-FFF2-40B4-BE49-F238E27FC236}">
+                <a16:creationId xmlns:a16="http://schemas.microsoft.com/office/drawing/2014/main" id="{1435BFEE-2C68-44A4-ABAC-4BAEB54B9300}"/>
+              </a:ext>
+            </a:extLst>
+          </p:cNvPr>
+          <p:cNvSpPr>
+            <a:spLocks noGrp="1"/>
+          </p:cNvSpPr>
+          <p:nvPr>
+            <p:ph type="sldNum" sz="quarter" idx="12"/>
+          </p:nvPr>
+        </p:nvSpPr>
+        <p:spPr/>
+        <p:txBody>
+          <a:bodyPr/>
+          <a:lstStyle/>
+          <a:p>
+            <a:fld id="{6D22F896-40B5-4ADD-8801-0D06FADFA095}" type="slidenum">
+              <a:rPr lang="en-US" smtClean="0"/>
+              <a:t>11</a:t>
+            </a:fld>
+            <a:endParaRPr lang="en-US" dirty="0"/>
           </a:p>
         </p:txBody>
       </p:sp>
@@ -32557,7 +32680,7 @@
                   <a:schemeClr val="accent1"/>
                 </a:solidFill>
               </a:rPr>
-              <a:t>;</a:t>
+              <a:t>; </a:t>
             </a:r>
           </a:p>
           <a:p>
@@ -32576,177 +32699,80 @@
               <a:buChar char="§"/>
             </a:pPr>
             <a:r>
-              <a:rPr lang="en-US" dirty="0" err="1">
-                <a:solidFill>
-                  <a:schemeClr val="accent1"/>
-                </a:solidFill>
-                <a:hlinkClick r:id="rId4">
-                  <a:extLst>
-                    <a:ext uri="{A12FA001-AC4F-418D-AE19-62706E023703}">
-                      <ahyp:hlinkClr xmlns:ahyp="http://schemas.microsoft.com/office/drawing/2018/hyperlinkcolor" val="tx"/>
-                    </a:ext>
-                  </a:extLst>
-                </a:hlinkClick>
-              </a:rPr>
-              <a:t>Exemplo</a:t>
-            </a:r>
-            <a:r>
-              <a:rPr lang="en-US" dirty="0">
-                <a:solidFill>
-                  <a:schemeClr val="accent1"/>
-                </a:solidFill>
-                <a:hlinkClick r:id="rId4">
-                  <a:extLst>
-                    <a:ext uri="{A12FA001-AC4F-418D-AE19-62706E023703}">
-                      <ahyp:hlinkClr xmlns:ahyp="http://schemas.microsoft.com/office/drawing/2018/hyperlinkcolor" val="tx"/>
-                    </a:ext>
-                  </a:extLst>
-                </a:hlinkClick>
-              </a:rPr>
-              <a:t> de </a:t>
-            </a:r>
-            <a:r>
-              <a:rPr lang="en-US" dirty="0" err="1">
-                <a:solidFill>
-                  <a:schemeClr val="accent1"/>
-                </a:solidFill>
-                <a:hlinkClick r:id="rId4">
-                  <a:extLst>
-                    <a:ext uri="{A12FA001-AC4F-418D-AE19-62706E023703}">
-                      <ahyp:hlinkClr xmlns:ahyp="http://schemas.microsoft.com/office/drawing/2018/hyperlinkcolor" val="tx"/>
-                    </a:ext>
-                  </a:extLst>
-                </a:hlinkClick>
-              </a:rPr>
+              <a:rPr lang="en-US" dirty="0"/>
+              <a:t>Slides das aulas </a:t>
+            </a:r>
+            <a:r>
+              <a:rPr lang="en-US" dirty="0" err="1"/>
+              <a:t>teóricas</a:t>
+            </a:r>
+            <a:r>
+              <a:rPr lang="en-US" dirty="0"/>
+              <a:t> e </a:t>
+            </a:r>
+            <a:r>
+              <a:rPr lang="en-US" dirty="0" err="1"/>
+              <a:t>teórico-práticas</a:t>
+            </a:r>
+            <a:r>
+              <a:rPr lang="en-US" dirty="0"/>
+              <a:t> para </a:t>
+            </a:r>
+            <a:r>
+              <a:rPr lang="en-US" dirty="0" err="1"/>
               <a:t>desenvolvimento</a:t>
             </a:r>
             <a:r>
-              <a:rPr lang="en-US" dirty="0">
-                <a:solidFill>
-                  <a:schemeClr val="accent1"/>
-                </a:solidFill>
-                <a:hlinkClick r:id="rId4">
-                  <a:extLst>
-                    <a:ext uri="{A12FA001-AC4F-418D-AE19-62706E023703}">
-                      <ahyp:hlinkClr xmlns:ahyp="http://schemas.microsoft.com/office/drawing/2018/hyperlinkcolor" val="tx"/>
-                    </a:ext>
-                  </a:extLst>
-                </a:hlinkClick>
-              </a:rPr>
-              <a:t> de </a:t>
-            </a:r>
-            <a:r>
-              <a:rPr lang="en-US" dirty="0" err="1">
-                <a:solidFill>
-                  <a:schemeClr val="accent1"/>
-                </a:solidFill>
-                <a:hlinkClick r:id="rId4">
-                  <a:extLst>
-                    <a:ext uri="{A12FA001-AC4F-418D-AE19-62706E023703}">
-                      <ahyp:hlinkClr xmlns:ahyp="http://schemas.microsoft.com/office/drawing/2018/hyperlinkcolor" val="tx"/>
-                    </a:ext>
-                  </a:extLst>
-                </a:hlinkClick>
-              </a:rPr>
+              <a:rPr lang="en-US" dirty="0"/>
+              <a:t> dos </a:t>
+            </a:r>
+            <a:r>
+              <a:rPr lang="en-US" dirty="0" err="1"/>
+              <a:t>diferentes</a:t>
+            </a:r>
+            <a:r>
+              <a:rPr lang="en-US" dirty="0"/>
+              <a:t> </a:t>
+            </a:r>
+            <a:r>
+              <a:rPr lang="en-US" dirty="0" err="1"/>
               <a:t>algoritmos</a:t>
             </a:r>
             <a:r>
-              <a:rPr lang="en-US" dirty="0">
-                <a:solidFill>
-                  <a:schemeClr val="accent1"/>
-                </a:solidFill>
-                <a:hlinkClick r:id="rId4">
-                  <a:extLst>
-                    <a:ext uri="{A12FA001-AC4F-418D-AE19-62706E023703}">
-                      <ahyp:hlinkClr xmlns:ahyp="http://schemas.microsoft.com/office/drawing/2018/hyperlinkcolor" val="tx"/>
-                    </a:ext>
-                  </a:extLst>
-                </a:hlinkClick>
-              </a:rPr>
-              <a:t> de </a:t>
-            </a:r>
-            <a:r>
-              <a:rPr lang="en-US" dirty="0" err="1">
-                <a:solidFill>
-                  <a:schemeClr val="accent1"/>
-                </a:solidFill>
-                <a:hlinkClick r:id="rId4">
-                  <a:extLst>
-                    <a:ext uri="{A12FA001-AC4F-418D-AE19-62706E023703}">
-                      <ahyp:hlinkClr xmlns:ahyp="http://schemas.microsoft.com/office/drawing/2018/hyperlinkcolor" val="tx"/>
-                    </a:ext>
-                  </a:extLst>
-                </a:hlinkClick>
-              </a:rPr>
-              <a:t>pesquisa</a:t>
-            </a:r>
-            <a:endParaRPr lang="en-US" dirty="0">
-              <a:solidFill>
-                <a:schemeClr val="accent1"/>
-              </a:solidFill>
-            </a:endParaRPr>
+              <a:rPr lang="en-US" dirty="0"/>
+              <a:t>. </a:t>
+            </a:r>
           </a:p>
           <a:p>
-            <a:pPr marL="285750" indent="-285750" defTabSz="914400">
-              <a:lnSpc>
-                <a:spcPct val="100000"/>
-              </a:lnSpc>
-              <a:spcAft>
-                <a:spcPts val="600"/>
-              </a:spcAft>
-              <a:buClr>
-                <a:schemeClr val="accent6"/>
-              </a:buClr>
-              <a:buSzPct val="90000"/>
-              <a:buFont typeface="Wingdings" panose="05000000000000000000" pitchFamily="2" charset="2"/>
-              <a:buChar char="§"/>
-            </a:pPr>
-            <a:r>
-              <a:rPr lang="en-US" dirty="0"/>
-              <a:t>Slides das aulas </a:t>
-            </a:r>
-            <a:r>
-              <a:rPr lang="en-US" dirty="0" err="1"/>
-              <a:t>teóricas</a:t>
-            </a:r>
-            <a:r>
-              <a:rPr lang="en-US" dirty="0"/>
-              <a:t> e </a:t>
-            </a:r>
-            <a:r>
-              <a:rPr lang="en-US" dirty="0" err="1"/>
-              <a:t>teórico-práticas</a:t>
-            </a:r>
-            <a:r>
-              <a:rPr lang="en-US" dirty="0"/>
-              <a:t> para </a:t>
-            </a:r>
-            <a:r>
-              <a:rPr lang="en-US" dirty="0" err="1"/>
-              <a:t>desenvolvimento</a:t>
-            </a:r>
-            <a:r>
-              <a:rPr lang="en-US" dirty="0"/>
-              <a:t> dos </a:t>
-            </a:r>
-            <a:r>
-              <a:rPr lang="en-US" dirty="0" err="1"/>
-              <a:t>diferentes</a:t>
-            </a:r>
-            <a:r>
-              <a:rPr lang="en-US" dirty="0"/>
-              <a:t> </a:t>
-            </a:r>
-            <a:r>
-              <a:rPr lang="en-US" dirty="0" err="1"/>
-              <a:t>algoritmos</a:t>
-            </a:r>
-            <a:r>
-              <a:rPr lang="en-US" dirty="0"/>
-              <a:t>. </a:t>
-            </a:r>
+            <a:endParaRPr lang="en-US" dirty="0"/>
           </a:p>
+        </p:txBody>
+      </p:sp>
+      <p:sp>
+        <p:nvSpPr>
+          <p:cNvPr id="4" name="Marcador de Posição do Número do Diapositivo 3">
+            <a:extLst>
+              <a:ext uri="{FF2B5EF4-FFF2-40B4-BE49-F238E27FC236}">
+                <a16:creationId xmlns:a16="http://schemas.microsoft.com/office/drawing/2014/main" id="{0D14FF01-CE5B-498B-AEA6-88546746C969}"/>
+              </a:ext>
+            </a:extLst>
+          </p:cNvPr>
+          <p:cNvSpPr>
+            <a:spLocks noGrp="1"/>
+          </p:cNvSpPr>
+          <p:nvPr>
+            <p:ph type="sldNum" sz="quarter" idx="12"/>
+          </p:nvPr>
+        </p:nvSpPr>
+        <p:spPr/>
+        <p:txBody>
+          <a:bodyPr/>
+          <a:lstStyle/>
           <a:p>
+            <a:fld id="{6D22F896-40B5-4ADD-8801-0D06FADFA095}" type="slidenum">
+              <a:rPr lang="en-US" smtClean="0"/>
+              <a:t>12</a:t>
+            </a:fld>
             <a:endParaRPr lang="en-US" dirty="0"/>
           </a:p>
         </p:txBody>
@@ -33259,6 +33285,35 @@
           </a:fontRef>
         </p:style>
       </p:sp>
+      <p:sp>
+        <p:nvSpPr>
+          <p:cNvPr id="3" name="Marcador de Posição do Número do Diapositivo 2">
+            <a:extLst>
+              <a:ext uri="{FF2B5EF4-FFF2-40B4-BE49-F238E27FC236}">
+                <a16:creationId xmlns:a16="http://schemas.microsoft.com/office/drawing/2014/main" id="{15A81C50-1C19-413D-A7B1-F62EFEC1FCD1}"/>
+              </a:ext>
+            </a:extLst>
+          </p:cNvPr>
+          <p:cNvSpPr>
+            <a:spLocks noGrp="1"/>
+          </p:cNvSpPr>
+          <p:nvPr>
+            <p:ph type="sldNum" sz="quarter" idx="12"/>
+          </p:nvPr>
+        </p:nvSpPr>
+        <p:spPr/>
+        <p:txBody>
+          <a:bodyPr/>
+          <a:lstStyle/>
+          <a:p>
+            <a:fld id="{6D22F896-40B5-4ADD-8801-0D06FADFA095}" type="slidenum">
+              <a:rPr lang="en-US" smtClean="0"/>
+              <a:t>13</a:t>
+            </a:fld>
+            <a:endParaRPr lang="en-US" dirty="0"/>
+          </a:p>
+        </p:txBody>
+      </p:sp>
     </p:spTree>
     <p:extLst>
       <p:ext uri="{BB962C8B-B14F-4D97-AF65-F5344CB8AC3E}">
@@ -33427,8 +33482,8 @@
         </p:nvSpPr>
         <p:spPr>
           <a:xfrm>
-            <a:off x="6447326" y="3860556"/>
-            <a:ext cx="4024312" cy="2246769"/>
+            <a:off x="6447326" y="3667843"/>
+            <a:ext cx="4024312" cy="2677656"/>
           </a:xfrm>
           <a:prstGeom prst="rect">
             <a:avLst/>
@@ -33450,10 +33505,19 @@
                   </a:schemeClr>
                 </a:solidFill>
               </a:rPr>
-              <a:t>Verifica-se que a heurística 2, apesar de os caminhos por ela obtidos serem mais próximos dos caminhos ideais, demora na maioria das vezes mais tempo do que a heurística 1 e necessita de expandir mais nós do que as restantes heurísticas. </a:t>
-            </a:r>
-          </a:p>
-          <a:p>
+              <a:t>Verifica-se que a </a:t>
+            </a:r>
+            <a:r>
+              <a:rPr lang="pt-PT" sz="1400" i="1" dirty="0">
+                <a:solidFill>
+                  <a:schemeClr val="tx1">
+                    <a:lumMod val="75000"/>
+                    <a:lumOff val="25000"/>
+                  </a:schemeClr>
+                </a:solidFill>
+              </a:rPr>
+              <a:t>heuristic2</a:t>
+            </a:r>
             <a:r>
               <a:rPr lang="pt-PT" sz="1400" dirty="0">
                 <a:solidFill>
@@ -33463,8 +33527,116 @@
                   </a:schemeClr>
                 </a:solidFill>
               </a:rPr>
-              <a:t>Os resultados obtidos para as heurísticas 1 e 3 são muito semelhantes em termos de tempo consumido, mas verifica-se que a heurística 3 em certos níveis (como o nível 5) necessita de expandir bastantes mais nós para atingir o mesmo resultado.</a:t>
-            </a:r>
+              <a:t>, apesar de os caminhos por ela obtidos serem mais próximos dos caminhos ideais, demora na maioria das vezes mais tempo do que a </a:t>
+            </a:r>
+            <a:r>
+              <a:rPr lang="pt-PT" sz="1400" i="1" dirty="0">
+                <a:solidFill>
+                  <a:schemeClr val="tx1">
+                    <a:lumMod val="75000"/>
+                    <a:lumOff val="25000"/>
+                  </a:schemeClr>
+                </a:solidFill>
+              </a:rPr>
+              <a:t>heuristic1</a:t>
+            </a:r>
+            <a:r>
+              <a:rPr lang="pt-PT" sz="1400" dirty="0">
+                <a:solidFill>
+                  <a:schemeClr val="tx1">
+                    <a:lumMod val="75000"/>
+                    <a:lumOff val="25000"/>
+                  </a:schemeClr>
+                </a:solidFill>
+              </a:rPr>
+              <a:t> e necessita de expandir mais nós do que as restantes heurísticas. </a:t>
+            </a:r>
+          </a:p>
+          <a:p>
+            <a:r>
+              <a:rPr lang="pt-PT" sz="1400" dirty="0">
+                <a:solidFill>
+                  <a:schemeClr val="tx1">
+                    <a:lumMod val="75000"/>
+                    <a:lumOff val="25000"/>
+                  </a:schemeClr>
+                </a:solidFill>
+              </a:rPr>
+              <a:t>Os resultados obtidos para as </a:t>
+            </a:r>
+            <a:r>
+              <a:rPr lang="pt-PT" sz="1400" i="1" dirty="0" err="1">
+                <a:solidFill>
+                  <a:schemeClr val="tx1">
+                    <a:lumMod val="75000"/>
+                    <a:lumOff val="25000"/>
+                  </a:schemeClr>
+                </a:solidFill>
+              </a:rPr>
+              <a:t>heuristics</a:t>
+            </a:r>
+            <a:r>
+              <a:rPr lang="pt-PT" sz="1400" dirty="0">
+                <a:solidFill>
+                  <a:schemeClr val="tx1">
+                    <a:lumMod val="75000"/>
+                    <a:lumOff val="25000"/>
+                  </a:schemeClr>
+                </a:solidFill>
+              </a:rPr>
+              <a:t> 1 e 3 são muito semelhantes em termos de tempo consumido, mas verifica-se que a </a:t>
+            </a:r>
+            <a:r>
+              <a:rPr lang="pt-PT" sz="1400" i="1" dirty="0">
+                <a:solidFill>
+                  <a:schemeClr val="tx1">
+                    <a:lumMod val="75000"/>
+                    <a:lumOff val="25000"/>
+                  </a:schemeClr>
+                </a:solidFill>
+              </a:rPr>
+              <a:t>heuristic</a:t>
+            </a:r>
+            <a:r>
+              <a:rPr lang="pt-PT" sz="1400" dirty="0">
+                <a:solidFill>
+                  <a:schemeClr val="tx1">
+                    <a:lumMod val="75000"/>
+                    <a:lumOff val="25000"/>
+                  </a:schemeClr>
+                </a:solidFill>
+              </a:rPr>
+              <a:t>3 em certos níveis (como o nível 5) necessita de expandir bastantes mais nós para atingir o mesmo resultado. Para além disso, esta heurística, como veremos no anexo seguinte, não é totalmente fiável.</a:t>
+            </a:r>
+          </a:p>
+        </p:txBody>
+      </p:sp>
+      <p:sp>
+        <p:nvSpPr>
+          <p:cNvPr id="3" name="Marcador de Posição do Número do Diapositivo 2">
+            <a:extLst>
+              <a:ext uri="{FF2B5EF4-FFF2-40B4-BE49-F238E27FC236}">
+                <a16:creationId xmlns:a16="http://schemas.microsoft.com/office/drawing/2014/main" id="{45096A1A-5063-4F56-8812-D2435E4ECFF7}"/>
+              </a:ext>
+            </a:extLst>
+          </p:cNvPr>
+          <p:cNvSpPr>
+            <a:spLocks noGrp="1"/>
+          </p:cNvSpPr>
+          <p:nvPr>
+            <p:ph type="sldNum" sz="quarter" idx="12"/>
+          </p:nvPr>
+        </p:nvSpPr>
+        <p:spPr/>
+        <p:txBody>
+          <a:bodyPr/>
+          <a:lstStyle/>
+          <a:p>
+            <a:fld id="{6D22F896-40B5-4ADD-8801-0D06FADFA095}" type="slidenum">
+              <a:rPr lang="en-US" smtClean="0"/>
+              <a:t>14</a:t>
+            </a:fld>
+            <a:endParaRPr lang="en-US" dirty="0"/>
           </a:p>
         </p:txBody>
       </p:sp>
@@ -33568,10 +33740,19 @@
                   </a:schemeClr>
                 </a:solidFill>
               </a:rPr>
-              <a:t>Verifica-se que a heurística 3 para os níveis 11 e 17 não apresenta como solução o caminho ideal, pelo que não é uma boa heurística. </a:t>
-            </a:r>
-          </a:p>
-          <a:p>
+              <a:t>Verifica-se que a </a:t>
+            </a:r>
+            <a:r>
+              <a:rPr lang="pt-PT" sz="1400" i="1" dirty="0">
+                <a:solidFill>
+                  <a:schemeClr val="tx1">
+                    <a:lumMod val="75000"/>
+                    <a:lumOff val="25000"/>
+                  </a:schemeClr>
+                </a:solidFill>
+              </a:rPr>
+              <a:t>heuristic3</a:t>
+            </a:r>
             <a:r>
               <a:rPr lang="pt-PT" sz="1400" dirty="0">
                 <a:solidFill>
@@ -33581,7 +33762,86 @@
                   </a:schemeClr>
                 </a:solidFill>
               </a:rPr>
-              <a:t>Comparando as heurísticas 1 e 2, verifica-se que, apesar de apresentarem alguns resultados bastante semelhantes, a heurística 1 tende a demorar menos tempo para resolver os níveis do que a heurística 2.</a:t>
+              <a:t> para os níveis 11 e 17 não apresenta como solução o caminho ideal, pelo que não é uma boa heurística. </a:t>
+            </a:r>
+          </a:p>
+          <a:p>
+            <a:r>
+              <a:rPr lang="pt-PT" sz="1400" dirty="0">
+                <a:solidFill>
+                  <a:schemeClr val="tx1">
+                    <a:lumMod val="75000"/>
+                    <a:lumOff val="25000"/>
+                  </a:schemeClr>
+                </a:solidFill>
+              </a:rPr>
+              <a:t>Comparando as </a:t>
+            </a:r>
+            <a:r>
+              <a:rPr lang="pt-PT" sz="1400" i="1" dirty="0" err="1">
+                <a:solidFill>
+                  <a:schemeClr val="tx1">
+                    <a:lumMod val="75000"/>
+                    <a:lumOff val="25000"/>
+                  </a:schemeClr>
+                </a:solidFill>
+              </a:rPr>
+              <a:t>heuristics</a:t>
+            </a:r>
+            <a:r>
+              <a:rPr lang="pt-PT" sz="1400" dirty="0">
+                <a:solidFill>
+                  <a:schemeClr val="tx1">
+                    <a:lumMod val="75000"/>
+                    <a:lumOff val="25000"/>
+                  </a:schemeClr>
+                </a:solidFill>
+              </a:rPr>
+              <a:t> 1 e 2, verifica-se que, apesar de apresentarem alguns resultados bastante semelhantes, a </a:t>
+            </a:r>
+            <a:r>
+              <a:rPr lang="pt-PT" sz="1400" i="1" dirty="0">
+                <a:solidFill>
+                  <a:schemeClr val="tx1">
+                    <a:lumMod val="75000"/>
+                    <a:lumOff val="25000"/>
+                  </a:schemeClr>
+                </a:solidFill>
+              </a:rPr>
+              <a:t>heuristic</a:t>
+            </a:r>
+            <a:r>
+              <a:rPr lang="pt-PT" sz="1400" dirty="0">
+                <a:solidFill>
+                  <a:schemeClr val="tx1">
+                    <a:lumMod val="75000"/>
+                    <a:lumOff val="25000"/>
+                  </a:schemeClr>
+                </a:solidFill>
+              </a:rPr>
+              <a:t>1 tende a demorar menos tempo para resolver os níveis do que a </a:t>
+            </a:r>
+            <a:r>
+              <a:rPr lang="pt-PT" sz="1400" i="1" dirty="0">
+                <a:solidFill>
+                  <a:schemeClr val="tx1">
+                    <a:lumMod val="75000"/>
+                    <a:lumOff val="25000"/>
+                  </a:schemeClr>
+                </a:solidFill>
+              </a:rPr>
+              <a:t>heuristic</a:t>
+            </a:r>
+            <a:r>
+              <a:rPr lang="pt-PT" sz="1400" dirty="0">
+                <a:solidFill>
+                  <a:schemeClr val="tx1">
+                    <a:lumMod val="75000"/>
+                    <a:lumOff val="25000"/>
+                  </a:schemeClr>
+                </a:solidFill>
+              </a:rPr>
+              <a:t>2.</a:t>
             </a:r>
           </a:p>
           <a:p>
@@ -33689,6 +33949,35 @@
           </a:graphicData>
         </a:graphic>
       </p:graphicFrame>
+      <p:sp>
+        <p:nvSpPr>
+          <p:cNvPr id="3" name="Marcador de Posição do Número do Diapositivo 2">
+            <a:extLst>
+              <a:ext uri="{FF2B5EF4-FFF2-40B4-BE49-F238E27FC236}">
+                <a16:creationId xmlns:a16="http://schemas.microsoft.com/office/drawing/2014/main" id="{CBB0B92D-4F40-424E-8811-219F8787C848}"/>
+              </a:ext>
+            </a:extLst>
+          </p:cNvPr>
+          <p:cNvSpPr>
+            <a:spLocks noGrp="1"/>
+          </p:cNvSpPr>
+          <p:nvPr>
+            <p:ph type="sldNum" sz="quarter" idx="12"/>
+          </p:nvPr>
+        </p:nvSpPr>
+        <p:spPr/>
+        <p:txBody>
+          <a:bodyPr/>
+          <a:lstStyle/>
+          <a:p>
+            <a:fld id="{6D22F896-40B5-4ADD-8801-0D06FADFA095}" type="slidenum">
+              <a:rPr lang="en-US" smtClean="0"/>
+              <a:t>15</a:t>
+            </a:fld>
+            <a:endParaRPr lang="en-US" dirty="0"/>
+          </a:p>
+        </p:txBody>
+      </p:sp>
     </p:spTree>
     <p:extLst>
       <p:ext uri="{BB962C8B-B14F-4D97-AF65-F5344CB8AC3E}">
@@ -33812,6 +34101,35 @@
           </a:graphicData>
         </a:graphic>
       </p:graphicFrame>
+      <p:sp>
+        <p:nvSpPr>
+          <p:cNvPr id="3" name="Marcador de Posição do Número do Diapositivo 2">
+            <a:extLst>
+              <a:ext uri="{FF2B5EF4-FFF2-40B4-BE49-F238E27FC236}">
+                <a16:creationId xmlns:a16="http://schemas.microsoft.com/office/drawing/2014/main" id="{4CB93729-7EA3-4CD3-B5EA-1DB8C104A3BA}"/>
+              </a:ext>
+            </a:extLst>
+          </p:cNvPr>
+          <p:cNvSpPr>
+            <a:spLocks noGrp="1"/>
+          </p:cNvSpPr>
+          <p:nvPr>
+            <p:ph type="sldNum" sz="quarter" idx="12"/>
+          </p:nvPr>
+        </p:nvSpPr>
+        <p:spPr/>
+        <p:txBody>
+          <a:bodyPr/>
+          <a:lstStyle/>
+          <a:p>
+            <a:fld id="{6D22F896-40B5-4ADD-8801-0D06FADFA095}" type="slidenum">
+              <a:rPr lang="en-US" smtClean="0"/>
+              <a:t>16</a:t>
+            </a:fld>
+            <a:endParaRPr lang="en-US" dirty="0"/>
+          </a:p>
+        </p:txBody>
+      </p:sp>
     </p:spTree>
     <p:extLst>
       <p:ext uri="{BB962C8B-B14F-4D97-AF65-F5344CB8AC3E}">
@@ -33935,6 +34253,35 @@
           </a:graphicData>
         </a:graphic>
       </p:graphicFrame>
+      <p:sp>
+        <p:nvSpPr>
+          <p:cNvPr id="3" name="Marcador de Posição do Número do Diapositivo 2">
+            <a:extLst>
+              <a:ext uri="{FF2B5EF4-FFF2-40B4-BE49-F238E27FC236}">
+                <a16:creationId xmlns:a16="http://schemas.microsoft.com/office/drawing/2014/main" id="{F30FA734-9FE7-4E59-8791-6C6B117E542C}"/>
+              </a:ext>
+            </a:extLst>
+          </p:cNvPr>
+          <p:cNvSpPr>
+            <a:spLocks noGrp="1"/>
+          </p:cNvSpPr>
+          <p:nvPr>
+            <p:ph type="sldNum" sz="quarter" idx="12"/>
+          </p:nvPr>
+        </p:nvSpPr>
+        <p:spPr/>
+        <p:txBody>
+          <a:bodyPr/>
+          <a:lstStyle/>
+          <a:p>
+            <a:fld id="{6D22F896-40B5-4ADD-8801-0D06FADFA095}" type="slidenum">
+              <a:rPr lang="en-US" smtClean="0"/>
+              <a:t>17</a:t>
+            </a:fld>
+            <a:endParaRPr lang="en-US" dirty="0"/>
+          </a:p>
+        </p:txBody>
+      </p:sp>
     </p:spTree>
     <p:extLst>
       <p:ext uri="{BB962C8B-B14F-4D97-AF65-F5344CB8AC3E}">
@@ -34058,6 +34405,35 @@
           </a:graphicData>
         </a:graphic>
       </p:graphicFrame>
+      <p:sp>
+        <p:nvSpPr>
+          <p:cNvPr id="3" name="Marcador de Posição do Número do Diapositivo 2">
+            <a:extLst>
+              <a:ext uri="{FF2B5EF4-FFF2-40B4-BE49-F238E27FC236}">
+                <a16:creationId xmlns:a16="http://schemas.microsoft.com/office/drawing/2014/main" id="{5A3A7571-48F9-48DF-AFFE-D9A8E5FB9DE1}"/>
+              </a:ext>
+            </a:extLst>
+          </p:cNvPr>
+          <p:cNvSpPr>
+            <a:spLocks noGrp="1"/>
+          </p:cNvSpPr>
+          <p:nvPr>
+            <p:ph type="sldNum" sz="quarter" idx="12"/>
+          </p:nvPr>
+        </p:nvSpPr>
+        <p:spPr/>
+        <p:txBody>
+          <a:bodyPr/>
+          <a:lstStyle/>
+          <a:p>
+            <a:fld id="{6D22F896-40B5-4ADD-8801-0D06FADFA095}" type="slidenum">
+              <a:rPr lang="en-US" smtClean="0"/>
+              <a:t>18</a:t>
+            </a:fld>
+            <a:endParaRPr lang="en-US" dirty="0"/>
+          </a:p>
+        </p:txBody>
+      </p:sp>
     </p:spTree>
     <p:extLst>
       <p:ext uri="{BB962C8B-B14F-4D97-AF65-F5344CB8AC3E}">
@@ -34106,7 +34482,7 @@
         </p:nvSpPr>
         <p:spPr>
           <a:xfrm>
-            <a:off x="507023" y="1"/>
+            <a:off x="507021" y="0"/>
             <a:ext cx="10058400" cy="1072662"/>
           </a:xfrm>
         </p:spPr>
@@ -34136,7 +34512,7 @@
           <p:nvPr>
             <p:extLst>
               <p:ext uri="{D42A27DB-BD31-4B8C-83A1-F6EECF244321}">
-                <p14:modId xmlns:p14="http://schemas.microsoft.com/office/powerpoint/2010/main" val="2693977498"/>
+                <p14:modId xmlns:p14="http://schemas.microsoft.com/office/powerpoint/2010/main" val="3024473933"/>
               </p:ext>
             </p:extLst>
           </p:nvPr>
@@ -34166,7 +34542,7 @@
           <p:nvPr>
             <p:extLst>
               <p:ext uri="{D42A27DB-BD31-4B8C-83A1-F6EECF244321}">
-                <p14:modId xmlns:p14="http://schemas.microsoft.com/office/powerpoint/2010/main" val="1315345696"/>
+                <p14:modId xmlns:p14="http://schemas.microsoft.com/office/powerpoint/2010/main" val="3423258390"/>
               </p:ext>
             </p:extLst>
           </p:nvPr>
@@ -34181,6 +34557,35 @@
           </a:graphicData>
         </a:graphic>
       </p:graphicFrame>
+      <p:sp>
+        <p:nvSpPr>
+          <p:cNvPr id="3" name="Marcador de Posição do Número do Diapositivo 2">
+            <a:extLst>
+              <a:ext uri="{FF2B5EF4-FFF2-40B4-BE49-F238E27FC236}">
+                <a16:creationId xmlns:a16="http://schemas.microsoft.com/office/drawing/2014/main" id="{F1BAAD57-A083-4BE9-9AC3-6E681B24ED5B}"/>
+              </a:ext>
+            </a:extLst>
+          </p:cNvPr>
+          <p:cNvSpPr>
+            <a:spLocks noGrp="1"/>
+          </p:cNvSpPr>
+          <p:nvPr>
+            <p:ph type="sldNum" sz="quarter" idx="12"/>
+          </p:nvPr>
+        </p:nvSpPr>
+        <p:spPr/>
+        <p:txBody>
+          <a:bodyPr/>
+          <a:lstStyle/>
+          <a:p>
+            <a:fld id="{6D22F896-40B5-4ADD-8801-0D06FADFA095}" type="slidenum">
+              <a:rPr lang="en-US" smtClean="0"/>
+              <a:t>19</a:t>
+            </a:fld>
+            <a:endParaRPr lang="en-US" dirty="0"/>
+          </a:p>
+        </p:txBody>
+      </p:sp>
     </p:spTree>
     <p:extLst>
       <p:ext uri="{BB962C8B-B14F-4D97-AF65-F5344CB8AC3E}">
@@ -34411,7 +34816,7 @@
               <a:rPr lang="pt-PT" sz="1600" b="0" i="0" dirty="0">
                 <a:effectLst/>
               </a:rPr>
-              <a:t>Existem três tipos de tiles no jogo, onde cada um apresenta uma cor diferente que os relaciona com o seu objetivo no jogo. Tiles preenchidas com uma cor escura correspondem a paredes, tiles com um ponto no centro correspondem a tiles objetivo e tiles pintadas com um círculo no centro correspondem a tiles jogáveis.</a:t>
+              <a:t>Existem três tipos de tiles no jogo, onde cada uma apresenta uma cor diferente que os relaciona com o seu objetivo no jogo. Tiles preenchidas com uma cor escura correspondem a paredes, tiles com um ponto no centro correspondem a tiles objetivo e tiles pintadas com um círculo no centro correspondem a tiles jogáveis.</a:t>
             </a:r>
           </a:p>
           <a:p>
@@ -34419,7 +34824,7 @@
               <a:rPr lang="pt-PT" sz="1600" b="0" i="0" dirty="0">
                 <a:effectLst/>
               </a:rPr>
-              <a:t>O objetivo do jogo é colocar as tiles jogáveis nas posições onde se encontram as tiles objetivo com a cor correspondente. Para tal, o jogador pode deslocar as peças para cima, baixo, esquerda e direita. Os movimentos são sincronizados, portanto, deve-se usar tiles fixos existentes para criar espaços entre os tiles e resolver o puzzle.</a:t>
+              <a:t>O objetivo do jogo é colocar as tiles jogáveis nas posições onde se encontram as tiles objetivo com a cor correspondente. Para tal, o jogador pode deslocar as peças para cima, baixo, esquerda e direita. Os movimentos são sincronizados, portanto, deve-se usar os tiles fixos existentes para criar espaços entre os tiles e resolver o puzzle.</a:t>
             </a:r>
           </a:p>
         </p:txBody>
@@ -34914,6 +35319,35 @@
           </a:prstGeom>
         </p:spPr>
       </p:pic>
+      <p:sp>
+        <p:nvSpPr>
+          <p:cNvPr id="4" name="Marcador de Posição do Número do Diapositivo 3">
+            <a:extLst>
+              <a:ext uri="{FF2B5EF4-FFF2-40B4-BE49-F238E27FC236}">
+                <a16:creationId xmlns:a16="http://schemas.microsoft.com/office/drawing/2014/main" id="{9D94D4FD-2B8C-4363-B1C5-BE1286ECDC9E}"/>
+              </a:ext>
+            </a:extLst>
+          </p:cNvPr>
+          <p:cNvSpPr>
+            <a:spLocks noGrp="1"/>
+          </p:cNvSpPr>
+          <p:nvPr>
+            <p:ph type="sldNum" sz="quarter" idx="12"/>
+          </p:nvPr>
+        </p:nvSpPr>
+        <p:spPr/>
+        <p:txBody>
+          <a:bodyPr/>
+          <a:lstStyle/>
+          <a:p>
+            <a:fld id="{6D22F896-40B5-4ADD-8801-0D06FADFA095}" type="slidenum">
+              <a:rPr lang="en-US" smtClean="0"/>
+              <a:t>2</a:t>
+            </a:fld>
+            <a:endParaRPr lang="en-US" dirty="0"/>
+          </a:p>
+        </p:txBody>
+      </p:sp>
     </p:spTree>
     <p:extLst>
       <p:ext uri="{BB962C8B-B14F-4D97-AF65-F5344CB8AC3E}">
@@ -35015,7 +35449,7 @@
             </a:pPr>
             <a:r>
               <a:rPr lang="pt-PT" sz="1600" dirty="0"/>
-              <a:t>O tabuleiro de jogo é representado por uma matriz B quadrangular com Y colunas e Y linhas, 4 &lt;= Y &lt;= 6. Os valores de cada célula têm os seguintes valores:</a:t>
+              <a:t>O tabuleiro de jogo é representado por uma matriz B quadrangular com Y colunas e Y linhas, 4 &lt;= Y &lt;= 6. Cada célula pode ter os seguintes valores:</a:t>
             </a:r>
           </a:p>
           <a:p>
@@ -35026,7 +35460,7 @@
             </a:pPr>
             <a:r>
               <a:rPr lang="pt-PT" sz="1600" dirty="0"/>
-              <a:t>‘X’, no caso de ser uma parede, </a:t>
+              <a:t>‘X’, no caso de ser uma parede; </a:t>
             </a:r>
           </a:p>
           <a:p>
@@ -35037,7 +35471,7 @@
             </a:pPr>
             <a:r>
               <a:rPr lang="pt-PT" sz="1600" dirty="0"/>
-              <a:t>‘IB’, ‘IG’, ‘IO’, ‘IP’, ‘IR’ ou ‘IY’ no caso de ser uma célula jogável</a:t>
+              <a:t>‘IB’, ‘IG’, ‘IO’, ‘IP’, ‘IR’ ou ‘IY’ no caso de ser uma célula jogável;</a:t>
             </a:r>
           </a:p>
           <a:p>
@@ -35048,7 +35482,7 @@
             </a:pPr>
             <a:r>
               <a:rPr lang="pt-PT" sz="1600" dirty="0"/>
-              <a:t>‘FB’, ‘FG’, ‘FO’, ‘FP’, ‘FR’ ou ‘FY’ no caso de ser uma célula destino </a:t>
+              <a:t>‘FB’, ‘FG’, ‘FO’, ‘FP’, ‘FR’ ou ‘FY’ no caso de ser uma célula destino; </a:t>
             </a:r>
           </a:p>
           <a:p>
@@ -35275,7 +35709,7 @@
                   </a:schemeClr>
                 </a:solidFill>
               </a:rPr>
-              <a:t>B = [  [ 'X’ , ‘X’ , '-’ , ‘X’ ],</a:t>
+              <a:t>F = [  [ 'X’ , ‘X’ , '-’ , ‘X’ ],</a:t>
             </a:r>
           </a:p>
           <a:p>
@@ -35334,6 +35768,35 @@
               </a:rPr>
               <a:t>          [ ‘-’ , ’-’ , ’-’ , ’IPFP’ ] ]</a:t>
             </a:r>
+          </a:p>
+        </p:txBody>
+      </p:sp>
+      <p:sp>
+        <p:nvSpPr>
+          <p:cNvPr id="4" name="Marcador de Posição do Número do Diapositivo 3">
+            <a:extLst>
+              <a:ext uri="{FF2B5EF4-FFF2-40B4-BE49-F238E27FC236}">
+                <a16:creationId xmlns:a16="http://schemas.microsoft.com/office/drawing/2014/main" id="{6BE1F9BF-A0FA-4973-ACCA-F8A191746EFC}"/>
+              </a:ext>
+            </a:extLst>
+          </p:cNvPr>
+          <p:cNvSpPr>
+            <a:spLocks noGrp="1"/>
+          </p:cNvSpPr>
+          <p:nvPr>
+            <p:ph type="sldNum" sz="quarter" idx="12"/>
+          </p:nvPr>
+        </p:nvSpPr>
+        <p:spPr/>
+        <p:txBody>
+          <a:bodyPr/>
+          <a:lstStyle/>
+          <a:p>
+            <a:fld id="{6D22F896-40B5-4ADD-8801-0D06FADFA095}" type="slidenum">
+              <a:rPr lang="en-US" smtClean="0"/>
+              <a:t>3</a:t>
+            </a:fld>
+            <a:endParaRPr lang="en-US" dirty="0"/>
           </a:p>
         </p:txBody>
       </p:sp>
@@ -35411,7 +35874,7 @@
           <p:nvPr>
             <p:extLst>
               <p:ext uri="{D42A27DB-BD31-4B8C-83A1-F6EECF244321}">
-                <p14:modId xmlns:p14="http://schemas.microsoft.com/office/powerpoint/2010/main" val="1827999833"/>
+                <p14:modId xmlns:p14="http://schemas.microsoft.com/office/powerpoint/2010/main" val="2927982190"/>
               </p:ext>
             </p:extLst>
           </p:nvPr>
@@ -35581,13 +36044,49 @@
                     <a:p>
                       <a:pPr algn="ctr"/>
                       <a:r>
-                        <a:rPr lang="pt-PT" sz="1400" b="0" kern="1200">
+                        <a:rPr lang="pt-PT" sz="1400" b="0" kern="1200" dirty="0">
                           <a:solidFill>
                             <a:schemeClr val="tx1"/>
                           </a:solidFill>
                           <a:effectLst/>
                         </a:rPr>
-                        <a:t>∃IZ, B[ IZx , IZy-1 ] ∉ { “X” , ”IY” } ∧ IZy &gt; 0</a:t>
+                        <a:t>∃IZ, B[ </a:t>
+                      </a:r>
+                      <a:r>
+                        <a:rPr lang="pt-PT" sz="1400" b="0" kern="1200" dirty="0" err="1">
+                          <a:solidFill>
+                            <a:schemeClr val="tx1"/>
+                          </a:solidFill>
+                          <a:effectLst/>
+                        </a:rPr>
+                        <a:t>IZx</a:t>
+                      </a:r>
+                      <a:r>
+                        <a:rPr lang="pt-PT" sz="1400" b="0" kern="1200" dirty="0">
+                          <a:solidFill>
+                            <a:schemeClr val="tx1"/>
+                          </a:solidFill>
+                          <a:effectLst/>
+                        </a:rPr>
+                        <a:t> , IZy-1 ] ∉ { “X” , ”IY” } ∧ </a:t>
+                      </a:r>
+                      <a:r>
+                        <a:rPr lang="pt-PT" sz="1400" b="0" kern="1200" dirty="0" err="1">
+                          <a:solidFill>
+                            <a:schemeClr val="tx1"/>
+                          </a:solidFill>
+                          <a:effectLst/>
+                        </a:rPr>
+                        <a:t>IZy</a:t>
+                      </a:r>
+                      <a:r>
+                        <a:rPr lang="pt-PT" sz="1400" b="0" kern="1200" dirty="0">
+                          <a:solidFill>
+                            <a:schemeClr val="tx1"/>
+                          </a:solidFill>
+                          <a:effectLst/>
+                        </a:rPr>
+                        <a:t> &gt; 0</a:t>
                       </a:r>
                       <a:endParaRPr lang="pt-PT" sz="1400" dirty="0">
                         <a:solidFill>
@@ -35605,7 +36104,7 @@
                     <a:p>
                       <a:pPr algn="ctr"/>
                       <a:r>
-                        <a:rPr lang="pt-PT" sz="1400" b="0" kern="1200">
+                        <a:rPr lang="pt-PT" sz="1400" b="0" kern="1200" dirty="0">
                           <a:solidFill>
                             <a:schemeClr val="tx1"/>
                           </a:solidFill>
@@ -35617,27 +36116,72 @@
                     <a:p>
                       <a:pPr algn="ctr"/>
                       <a:r>
-                        <a:rPr lang="pt-PT" sz="1400" b="0" kern="1200">
+                        <a:rPr lang="pt-PT" sz="1400" b="0" kern="1200" dirty="0" err="1">
                           <a:solidFill>
                             <a:schemeClr val="tx1"/>
                           </a:solidFill>
                           <a:effectLst/>
                         </a:rPr>
-                        <a:t>While (B[ IZx-1, IZy ] ∉ { “X” , ”IY” }) </a:t>
+                        <a:t>While</a:t>
+                      </a:r>
+                      <a:r>
+                        <a:rPr lang="pt-PT" sz="1400" b="0" kern="1200" dirty="0">
+                          <a:solidFill>
+                            <a:schemeClr val="tx1"/>
+                          </a:solidFill>
+                          <a:effectLst/>
+                        </a:rPr>
+                        <a:t> (B[ IZx-1, </a:t>
+                      </a:r>
+                      <a:r>
+                        <a:rPr lang="pt-PT" sz="1400" b="0" kern="1200" dirty="0" err="1">
+                          <a:solidFill>
+                            <a:schemeClr val="tx1"/>
+                          </a:solidFill>
+                          <a:effectLst/>
+                        </a:rPr>
+                        <a:t>IZy</a:t>
+                      </a:r>
+                      <a:r>
+                        <a:rPr lang="pt-PT" sz="1400" b="0" kern="1200" dirty="0">
+                          <a:solidFill>
+                            <a:schemeClr val="tx1"/>
+                          </a:solidFill>
+                          <a:effectLst/>
+                        </a:rPr>
+                        <a:t> ] ∉ { “X” , ”IY” }) </a:t>
                       </a:r>
                     </a:p>
                     <a:p>
                       <a:pPr algn="ctr"/>
                       <a:r>
-                        <a:rPr lang="pt-PT" sz="1400" b="0" kern="1200">
+                        <a:rPr lang="pt-PT" sz="1400" b="0" kern="1200" dirty="0">
                           <a:solidFill>
                             <a:schemeClr val="tx1"/>
                           </a:solidFill>
                           <a:effectLst/>
                         </a:rPr>
-                        <a:t>do B[ Izx , IXy-1 ]=IZ</a:t>
+                        <a:t>do B[ </a:t>
                       </a:r>
-                      <a:endParaRPr lang="pt-PT" sz="1400">
+                      <a:r>
+                        <a:rPr lang="pt-PT" sz="1400" b="0" kern="1200" dirty="0" err="1">
+                          <a:solidFill>
+                            <a:schemeClr val="tx1"/>
+                          </a:solidFill>
+                          <a:effectLst/>
+                        </a:rPr>
+                        <a:t>IZx</a:t>
+                      </a:r>
+                      <a:r>
+                        <a:rPr lang="pt-PT" sz="1400" b="0" kern="1200" dirty="0">
+                          <a:solidFill>
+                            <a:schemeClr val="tx1"/>
+                          </a:solidFill>
+                          <a:effectLst/>
+                        </a:rPr>
+                        <a:t> , IXy-1 ]=IZ</a:t>
+                      </a:r>
+                      <a:endParaRPr lang="pt-PT" sz="1400" dirty="0">
                         <a:solidFill>
                           <a:schemeClr val="tx1"/>
                         </a:solidFill>
@@ -35739,7 +36283,7 @@
                           </a:solidFill>
                           <a:effectLst/>
                         </a:rPr>
-                        <a:t>Ixy</a:t>
+                        <a:t>IXy</a:t>
                       </a:r>
                       <a:r>
                         <a:rPr lang="pt-PT" sz="1400" b="0" kern="1200" dirty="0">
@@ -35809,7 +36353,7 @@
                         <a:defRPr/>
                       </a:pPr>
                       <a:r>
-                        <a:rPr lang="pt-PT" sz="1400" b="0" kern="1200">
+                        <a:rPr lang="pt-PT" sz="1400" b="0" kern="1200" dirty="0">
                           <a:solidFill>
                             <a:schemeClr val="tx1"/>
                           </a:solidFill>
@@ -35837,13 +36381,22 @@
                         <a:defRPr/>
                       </a:pPr>
                       <a:r>
-                        <a:rPr lang="pt-PT" sz="1400" b="0" kern="1200">
+                        <a:rPr lang="pt-PT" sz="1400" b="0" kern="1200" dirty="0" err="1">
                           <a:solidFill>
                             <a:schemeClr val="tx1"/>
                           </a:solidFill>
                           <a:effectLst/>
                         </a:rPr>
-                        <a:t>While (B[ IZx+1,Izy ] ∉ { “X” ,”IY”}) </a:t>
+                        <a:t>While</a:t>
+                      </a:r>
+                      <a:r>
+                        <a:rPr lang="pt-PT" sz="1400" b="0" kern="1200" dirty="0">
+                          <a:solidFill>
+                            <a:schemeClr val="tx1"/>
+                          </a:solidFill>
+                          <a:effectLst/>
+                        </a:rPr>
+                        <a:t> (B[ IZx+1,IZy ] ∉ { “X” ,”IY”}) </a:t>
                       </a:r>
                     </a:p>
                     <a:p>
@@ -35865,15 +36418,33 @@
                         <a:defRPr/>
                       </a:pPr>
                       <a:r>
-                        <a:rPr lang="pt-PT" sz="1400" b="0" kern="1200">
+                        <a:rPr lang="pt-PT" sz="1400" b="0" kern="1200" dirty="0">
                           <a:solidFill>
                             <a:schemeClr val="tx1"/>
                           </a:solidFill>
                           <a:effectLst/>
                         </a:rPr>
-                        <a:t>do  B[ Izx , IXy+1] = IZ</a:t>
+                        <a:t>do  B[ </a:t>
                       </a:r>
-                      <a:endParaRPr lang="pt-PT" sz="1400">
+                      <a:r>
+                        <a:rPr lang="pt-PT" sz="1400" b="0" kern="1200" dirty="0" err="1">
+                          <a:solidFill>
+                            <a:schemeClr val="tx1"/>
+                          </a:solidFill>
+                          <a:effectLst/>
+                        </a:rPr>
+                        <a:t>IZx</a:t>
+                      </a:r>
+                      <a:r>
+                        <a:rPr lang="pt-PT" sz="1400" b="0" kern="1200" dirty="0">
+                          <a:solidFill>
+                            <a:schemeClr val="tx1"/>
+                          </a:solidFill>
+                          <a:effectLst/>
+                        </a:rPr>
+                        <a:t> , IXy+1] = IZ</a:t>
+                      </a:r>
+                      <a:endParaRPr lang="pt-PT" sz="1400" dirty="0">
                         <a:solidFill>
                           <a:schemeClr val="tx1"/>
                         </a:solidFill>
@@ -35881,7 +36452,7 @@
                     </a:p>
                     <a:p>
                       <a:pPr algn="ctr"/>
-                      <a:endParaRPr lang="pt-PT" sz="1400">
+                      <a:endParaRPr lang="pt-PT" sz="1400" dirty="0">
                         <a:solidFill>
                           <a:schemeClr val="tx1"/>
                         </a:solidFill>
@@ -35950,13 +36521,49 @@
                     <a:p>
                       <a:pPr algn="ctr"/>
                       <a:r>
-                        <a:rPr lang="pt-PT" sz="1400" b="0" kern="1200">
+                        <a:rPr lang="pt-PT" sz="1400" b="0" kern="1200" dirty="0">
                           <a:solidFill>
                             <a:schemeClr val="tx1"/>
                           </a:solidFill>
                           <a:effectLst/>
                         </a:rPr>
-                        <a:t>∃IZ, B[ IZx-1 , Ixy ] ∉ { “X” , ”IY” } ∧ IZx &gt; 0</a:t>
+                        <a:t>∃IZ, B[ IZx-1 , </a:t>
+                      </a:r>
+                      <a:r>
+                        <a:rPr lang="pt-PT" sz="1400" b="0" kern="1200" dirty="0" err="1">
+                          <a:solidFill>
+                            <a:schemeClr val="tx1"/>
+                          </a:solidFill>
+                          <a:effectLst/>
+                        </a:rPr>
+                        <a:t>IXy</a:t>
+                      </a:r>
+                      <a:r>
+                        <a:rPr lang="pt-PT" sz="1400" b="0" kern="1200" dirty="0">
+                          <a:solidFill>
+                            <a:schemeClr val="tx1"/>
+                          </a:solidFill>
+                          <a:effectLst/>
+                        </a:rPr>
+                        <a:t> ] ∉ { “X” , ”IY” } ∧ </a:t>
+                      </a:r>
+                      <a:r>
+                        <a:rPr lang="pt-PT" sz="1400" b="0" kern="1200" dirty="0" err="1">
+                          <a:solidFill>
+                            <a:schemeClr val="tx1"/>
+                          </a:solidFill>
+                          <a:effectLst/>
+                        </a:rPr>
+                        <a:t>IZx</a:t>
+                      </a:r>
+                      <a:r>
+                        <a:rPr lang="pt-PT" sz="1400" b="0" kern="1200" dirty="0">
+                          <a:solidFill>
+                            <a:schemeClr val="tx1"/>
+                          </a:solidFill>
+                          <a:effectLst/>
+                        </a:rPr>
+                        <a:t> &gt; 0</a:t>
                       </a:r>
                       <a:endParaRPr lang="pt-PT" sz="1400" dirty="0">
                         <a:solidFill>
@@ -35990,7 +36597,7 @@
                         <a:defRPr/>
                       </a:pPr>
                       <a:r>
-                        <a:rPr lang="pt-PT" sz="1400" b="0" kern="1200">
+                        <a:rPr lang="pt-PT" sz="1400" b="0" kern="1200" dirty="0">
                           <a:solidFill>
                             <a:schemeClr val="tx1"/>
                           </a:solidFill>
@@ -36018,15 +36625,60 @@
                         <a:defRPr/>
                       </a:pPr>
                       <a:r>
-                        <a:rPr lang="pt-PT" sz="1400" b="0" kern="1200">
+                        <a:rPr lang="pt-PT" sz="1400" b="0" kern="1200" dirty="0" err="1">
                           <a:solidFill>
                             <a:schemeClr val="tx1"/>
                           </a:solidFill>
                           <a:effectLst/>
                         </a:rPr>
-                        <a:t>While (B[ Izx , IZy-1 ] ∉ { “X” , ”IY” }) do B[ IZx-1 , Ixy ] = IZ</a:t>
+                        <a:t>While</a:t>
                       </a:r>
-                      <a:endParaRPr lang="pt-PT" sz="1400">
+                      <a:r>
+                        <a:rPr lang="pt-PT" sz="1400" b="0" kern="1200" dirty="0">
+                          <a:solidFill>
+                            <a:schemeClr val="tx1"/>
+                          </a:solidFill>
+                          <a:effectLst/>
+                        </a:rPr>
+                        <a:t> (B[ </a:t>
+                      </a:r>
+                      <a:r>
+                        <a:rPr lang="pt-PT" sz="1400" b="0" kern="1200" dirty="0" err="1">
+                          <a:solidFill>
+                            <a:schemeClr val="tx1"/>
+                          </a:solidFill>
+                          <a:effectLst/>
+                        </a:rPr>
+                        <a:t>IZx</a:t>
+                      </a:r>
+                      <a:r>
+                        <a:rPr lang="pt-PT" sz="1400" b="0" kern="1200" dirty="0">
+                          <a:solidFill>
+                            <a:schemeClr val="tx1"/>
+                          </a:solidFill>
+                          <a:effectLst/>
+                        </a:rPr>
+                        <a:t> , IZy-1 ] ∉ { “X” , ”IY” }) do B[ IZx-1 , </a:t>
+                      </a:r>
+                      <a:r>
+                        <a:rPr lang="pt-PT" sz="1400" b="0" kern="1200" dirty="0" err="1">
+                          <a:solidFill>
+                            <a:schemeClr val="tx1"/>
+                          </a:solidFill>
+                          <a:effectLst/>
+                        </a:rPr>
+                        <a:t>IXy</a:t>
+                      </a:r>
+                      <a:r>
+                        <a:rPr lang="pt-PT" sz="1400" b="0" kern="1200" dirty="0">
+                          <a:solidFill>
+                            <a:schemeClr val="tx1"/>
+                          </a:solidFill>
+                          <a:effectLst/>
+                        </a:rPr>
+                        <a:t> ] = IZ</a:t>
+                      </a:r>
+                      <a:endParaRPr lang="pt-PT" sz="1400" dirty="0">
                         <a:solidFill>
                           <a:schemeClr val="tx1"/>
                         </a:solidFill>
@@ -36034,7 +36686,7 @@
                     </a:p>
                     <a:p>
                       <a:pPr algn="ctr"/>
-                      <a:endParaRPr lang="pt-PT" sz="1400">
+                      <a:endParaRPr lang="pt-PT" sz="1400" dirty="0">
                         <a:solidFill>
                           <a:schemeClr val="tx1"/>
                         </a:solidFill>
@@ -36119,13 +36771,58 @@
                         <a:defRPr/>
                       </a:pPr>
                       <a:r>
-                        <a:rPr lang="pt-PT" sz="1400" b="0" kern="1200">
+                        <a:rPr lang="pt-PT" sz="1400" b="0" kern="1200" dirty="0">
                           <a:solidFill>
                             <a:schemeClr val="tx1"/>
                           </a:solidFill>
                           <a:effectLst/>
                         </a:rPr>
-                        <a:t>∃IZ, B[ IZx+1 , Ixy ] ∉ { “X” , ”IY” } ∧ Izx &lt; B.size</a:t>
+                        <a:t>∃IZ, B[ IZx+1 , </a:t>
+                      </a:r>
+                      <a:r>
+                        <a:rPr lang="pt-PT" sz="1400" b="0" kern="1200" dirty="0" err="1">
+                          <a:solidFill>
+                            <a:schemeClr val="tx1"/>
+                          </a:solidFill>
+                          <a:effectLst/>
+                        </a:rPr>
+                        <a:t>IXy</a:t>
+                      </a:r>
+                      <a:r>
+                        <a:rPr lang="pt-PT" sz="1400" b="0" kern="1200" dirty="0">
+                          <a:solidFill>
+                            <a:schemeClr val="tx1"/>
+                          </a:solidFill>
+                          <a:effectLst/>
+                        </a:rPr>
+                        <a:t> ] ∉ { “X” , ”IY” } ∧ </a:t>
+                      </a:r>
+                      <a:r>
+                        <a:rPr lang="pt-PT" sz="1400" b="0" kern="1200" dirty="0" err="1">
+                          <a:solidFill>
+                            <a:schemeClr val="tx1"/>
+                          </a:solidFill>
+                          <a:effectLst/>
+                        </a:rPr>
+                        <a:t>IZx</a:t>
+                      </a:r>
+                      <a:r>
+                        <a:rPr lang="pt-PT" sz="1400" b="0" kern="1200" dirty="0">
+                          <a:solidFill>
+                            <a:schemeClr val="tx1"/>
+                          </a:solidFill>
+                          <a:effectLst/>
+                        </a:rPr>
+                        <a:t> &lt; </a:t>
+                      </a:r>
+                      <a:r>
+                        <a:rPr lang="pt-PT" sz="1400" b="0" kern="1200" dirty="0" err="1">
+                          <a:solidFill>
+                            <a:schemeClr val="tx1"/>
+                          </a:solidFill>
+                          <a:effectLst/>
+                        </a:rPr>
+                        <a:t>B.size</a:t>
                       </a:r>
                       <a:endParaRPr lang="pt-PT" sz="1400" dirty="0">
                         <a:solidFill>
@@ -36159,7 +36856,7 @@
                         <a:defRPr/>
                       </a:pPr>
                       <a:r>
-                        <a:rPr lang="pt-PT" sz="1400" b="0" kern="1200">
+                        <a:rPr lang="pt-PT" sz="1400" b="0" kern="1200" dirty="0">
                           <a:solidFill>
                             <a:schemeClr val="tx1"/>
                           </a:solidFill>
@@ -36187,13 +36884,40 @@
                         <a:defRPr/>
                       </a:pPr>
                       <a:r>
-                        <a:rPr lang="pt-PT" sz="1400" b="0" kern="1200">
+                        <a:rPr lang="pt-PT" sz="1400" b="0" kern="1200" dirty="0" err="1">
                           <a:solidFill>
                             <a:schemeClr val="tx1"/>
                           </a:solidFill>
                           <a:effectLst/>
                         </a:rPr>
-                        <a:t>While (B[ IZx , IZy+1 ] ∉ { “X” ,”IY”}) </a:t>
+                        <a:t>While</a:t>
+                      </a:r>
+                      <a:r>
+                        <a:rPr lang="pt-PT" sz="1400" b="0" kern="1200" dirty="0">
+                          <a:solidFill>
+                            <a:schemeClr val="tx1"/>
+                          </a:solidFill>
+                          <a:effectLst/>
+                        </a:rPr>
+                        <a:t> (B[ </a:t>
+                      </a:r>
+                      <a:r>
+                        <a:rPr lang="pt-PT" sz="1400" b="0" kern="1200" dirty="0" err="1">
+                          <a:solidFill>
+                            <a:schemeClr val="tx1"/>
+                          </a:solidFill>
+                          <a:effectLst/>
+                        </a:rPr>
+                        <a:t>IZx</a:t>
+                      </a:r>
+                      <a:r>
+                        <a:rPr lang="pt-PT" sz="1400" b="0" kern="1200" dirty="0">
+                          <a:solidFill>
+                            <a:schemeClr val="tx1"/>
+                          </a:solidFill>
+                          <a:effectLst/>
+                        </a:rPr>
+                        <a:t> , IZy+1 ] ∉ { “X” ,”IY”}) </a:t>
                       </a:r>
                     </a:p>
                     <a:p>
@@ -36215,15 +36939,33 @@
                         <a:defRPr/>
                       </a:pPr>
                       <a:r>
-                        <a:rPr lang="pt-PT" sz="1400" b="0" kern="1200">
+                        <a:rPr lang="pt-PT" sz="1400" b="0" kern="1200" dirty="0">
                           <a:solidFill>
                             <a:schemeClr val="tx1"/>
                           </a:solidFill>
                           <a:effectLst/>
                         </a:rPr>
-                        <a:t>do B[ IZx+1 , Ixy ] = IZ</a:t>
+                        <a:t>do B[ IZx+1 , </a:t>
                       </a:r>
-                      <a:endParaRPr lang="pt-PT" sz="1400">
+                      <a:r>
+                        <a:rPr lang="pt-PT" sz="1400" b="0" kern="1200" dirty="0" err="1">
+                          <a:solidFill>
+                            <a:schemeClr val="tx1"/>
+                          </a:solidFill>
+                          <a:effectLst/>
+                        </a:rPr>
+                        <a:t>IXy</a:t>
+                      </a:r>
+                      <a:r>
+                        <a:rPr lang="pt-PT" sz="1400" b="0" kern="1200" dirty="0">
+                          <a:solidFill>
+                            <a:schemeClr val="tx1"/>
+                          </a:solidFill>
+                          <a:effectLst/>
+                        </a:rPr>
+                        <a:t> ] = IZ</a:t>
+                      </a:r>
+                      <a:endParaRPr lang="pt-PT" sz="1400" dirty="0">
                         <a:solidFill>
                           <a:schemeClr val="tx1"/>
                         </a:solidFill>
@@ -36231,7 +36973,7 @@
                     </a:p>
                     <a:p>
                       <a:pPr algn="ctr"/>
-                      <a:endParaRPr lang="pt-PT" sz="1400">
+                      <a:endParaRPr lang="pt-PT" sz="1400" dirty="0">
                         <a:solidFill>
                           <a:schemeClr val="tx1"/>
                         </a:solidFill>
@@ -36415,6 +37157,35 @@
           </a:p>
         </p:txBody>
       </p:sp>
+      <p:sp>
+        <p:nvSpPr>
+          <p:cNvPr id="3" name="Marcador de Posição do Número do Diapositivo 2">
+            <a:extLst>
+              <a:ext uri="{FF2B5EF4-FFF2-40B4-BE49-F238E27FC236}">
+                <a16:creationId xmlns:a16="http://schemas.microsoft.com/office/drawing/2014/main" id="{E4A4434B-DFCD-4264-9027-AE0CEC15036F}"/>
+              </a:ext>
+            </a:extLst>
+          </p:cNvPr>
+          <p:cNvSpPr>
+            <a:spLocks noGrp="1"/>
+          </p:cNvSpPr>
+          <p:nvPr>
+            <p:ph type="sldNum" sz="quarter" idx="12"/>
+          </p:nvPr>
+        </p:nvSpPr>
+        <p:spPr/>
+        <p:txBody>
+          <a:bodyPr/>
+          <a:lstStyle/>
+          <a:p>
+            <a:fld id="{6D22F896-40B5-4ADD-8801-0D06FADFA095}" type="slidenum">
+              <a:rPr lang="en-US" smtClean="0"/>
+              <a:t>4</a:t>
+            </a:fld>
+            <a:endParaRPr lang="en-US" dirty="0"/>
+          </a:p>
+        </p:txBody>
+      </p:sp>
     </p:spTree>
     <p:extLst>
       <p:ext uri="{BB962C8B-B14F-4D97-AF65-F5344CB8AC3E}">
@@ -36596,6 +37367,35 @@
             <a:endParaRPr lang="pt-PT" i="1" dirty="0"/>
           </a:p>
           <a:p>
+            <a:endParaRPr lang="en-US" dirty="0"/>
+          </a:p>
+        </p:txBody>
+      </p:sp>
+      <p:sp>
+        <p:nvSpPr>
+          <p:cNvPr id="4" name="Marcador de Posição do Número do Diapositivo 3">
+            <a:extLst>
+              <a:ext uri="{FF2B5EF4-FFF2-40B4-BE49-F238E27FC236}">
+                <a16:creationId xmlns:a16="http://schemas.microsoft.com/office/drawing/2014/main" id="{774DBBE3-BA7A-4FEB-9B2D-72EC9F1D492A}"/>
+              </a:ext>
+            </a:extLst>
+          </p:cNvPr>
+          <p:cNvSpPr>
+            <a:spLocks noGrp="1"/>
+          </p:cNvSpPr>
+          <p:nvPr>
+            <p:ph type="sldNum" sz="quarter" idx="12"/>
+          </p:nvPr>
+        </p:nvSpPr>
+        <p:spPr/>
+        <p:txBody>
+          <a:bodyPr/>
+          <a:lstStyle/>
+          <a:p>
+            <a:fld id="{6D22F896-40B5-4ADD-8801-0D06FADFA095}" type="slidenum">
+              <a:rPr lang="en-US" smtClean="0"/>
+              <a:t>5</a:t>
+            </a:fld>
             <a:endParaRPr lang="en-US" dirty="0"/>
           </a:p>
         </p:txBody>
@@ -37139,6 +37939,35 @@
           </a:p>
         </p:txBody>
       </p:sp>
+      <p:sp>
+        <p:nvSpPr>
+          <p:cNvPr id="4" name="Marcador de Posição do Número do Diapositivo 3">
+            <a:extLst>
+              <a:ext uri="{FF2B5EF4-FFF2-40B4-BE49-F238E27FC236}">
+                <a16:creationId xmlns:a16="http://schemas.microsoft.com/office/drawing/2014/main" id="{8108C703-E4FF-4035-82CB-FB3EE6F372BB}"/>
+              </a:ext>
+            </a:extLst>
+          </p:cNvPr>
+          <p:cNvSpPr>
+            <a:spLocks noGrp="1"/>
+          </p:cNvSpPr>
+          <p:nvPr>
+            <p:ph type="sldNum" sz="quarter" idx="12"/>
+          </p:nvPr>
+        </p:nvSpPr>
+        <p:spPr/>
+        <p:txBody>
+          <a:bodyPr/>
+          <a:lstStyle/>
+          <a:p>
+            <a:fld id="{6D22F896-40B5-4ADD-8801-0D06FADFA095}" type="slidenum">
+              <a:rPr lang="en-US" smtClean="0"/>
+              <a:t>6</a:t>
+            </a:fld>
+            <a:endParaRPr lang="en-US" dirty="0"/>
+          </a:p>
+        </p:txBody>
+      </p:sp>
     </p:spTree>
     <p:extLst>
       <p:ext uri="{BB962C8B-B14F-4D97-AF65-F5344CB8AC3E}">
@@ -37155,14 +37984,6 @@
 <file path=ppt/slides/slide7.xml><?xml version="1.0" encoding="utf-8"?>
 <p:sld xmlns:a="http://schemas.openxmlformats.org/drawingml/2006/main" xmlns:r="http://schemas.openxmlformats.org/officeDocument/2006/relationships" xmlns:p="http://schemas.openxmlformats.org/presentationml/2006/main">
   <p:cSld>
-    <p:bg>
-      <p:bgPr>
-        <a:solidFill>
-          <a:schemeClr val="bg1"/>
-        </a:solidFill>
-        <a:effectLst/>
-      </p:bgPr>
-    </p:bg>
     <p:spTree>
       <p:nvGrpSpPr>
         <p:cNvPr id="1" name=""/>
@@ -37182,7 +38003,7 @@
           <p:cNvPr id="2" name="Título 1">
             <a:extLst>
               <a:ext uri="{FF2B5EF4-FFF2-40B4-BE49-F238E27FC236}">
-                <a16:creationId xmlns:a16="http://schemas.microsoft.com/office/drawing/2014/main" id="{88905D7D-3F4C-42D9-A1AD-79C975BE305C}"/>
+                <a16:creationId xmlns:a16="http://schemas.microsoft.com/office/drawing/2014/main" id="{387BCAF2-D229-4A29-85AC-E7FBE5A5EB89}"/>
               </a:ext>
             </a:extLst>
           </p:cNvPr>
@@ -37195,16 +38016,13 @@
         </p:nvSpPr>
         <p:spPr/>
         <p:txBody>
-          <a:bodyPr>
-            <a:normAutofit/>
-          </a:bodyPr>
+          <a:bodyPr/>
           <a:lstStyle/>
           <a:p>
             <a:r>
               <a:rPr lang="pt-PT" b="1" dirty="0"/>
-              <a:t>Detalhes de implementação </a:t>
-            </a:r>
-            <a:endParaRPr lang="en-US" b="1" dirty="0"/>
+              <a:t>Detalhes da implementação</a:t>
+            </a:r>
           </a:p>
         </p:txBody>
       </p:sp>
@@ -37213,7 +38031,7 @@
           <p:cNvPr id="3" name="Marcador de Posição de Conteúdo 2">
             <a:extLst>
               <a:ext uri="{FF2B5EF4-FFF2-40B4-BE49-F238E27FC236}">
-                <a16:creationId xmlns:a16="http://schemas.microsoft.com/office/drawing/2014/main" id="{A951B94C-2D27-4E83-841A-5A40C63FC665}"/>
+                <a16:creationId xmlns:a16="http://schemas.microsoft.com/office/drawing/2014/main" id="{ABD2313D-8EB7-457C-B757-84F4520ADC04}"/>
               </a:ext>
             </a:extLst>
           </p:cNvPr>
@@ -37224,444 +38042,388 @@
             <p:ph idx="1"/>
           </p:nvPr>
         </p:nvSpPr>
-        <p:spPr/>
+        <p:spPr>
+          <a:xfrm>
+            <a:off x="1097280" y="1845734"/>
+            <a:ext cx="10058400" cy="4163180"/>
+          </a:xfrm>
+        </p:spPr>
         <p:txBody>
-          <a:bodyPr>
-            <a:normAutofit fontScale="92500" lnSpcReduction="20000"/>
+          <a:bodyPr numCol="2">
+            <a:normAutofit/>
           </a:bodyPr>
           <a:lstStyle/>
           <a:p>
-            <a:pPr defTabSz="914400">
+            <a:pPr>
               <a:lnSpc>
-                <a:spcPct val="110000"/>
+                <a:spcPct val="100000"/>
               </a:lnSpc>
-              <a:spcAft>
-                <a:spcPts val="600"/>
-              </a:spcAft>
-              <a:buClr>
-                <a:schemeClr val="accent1"/>
-              </a:buClr>
-              <a:buFont typeface="Calibri" panose="020F0502020204030204" pitchFamily="34" charset="0"/>
             </a:pPr>
             <a:r>
-              <a:rPr lang="en-US" sz="1900" b="1" dirty="0" err="1"/>
-              <a:t>Linguagem</a:t>
-            </a:r>
-            <a:r>
-              <a:rPr lang="en-US" sz="1900" b="1" dirty="0"/>
-              <a:t> de </a:t>
-            </a:r>
-            <a:r>
-              <a:rPr lang="en-US" sz="1900" b="1" dirty="0" err="1"/>
-              <a:t>programação</a:t>
-            </a:r>
-            <a:r>
-              <a:rPr lang="en-US" sz="1900" b="1" dirty="0"/>
-              <a:t>: </a:t>
+              <a:rPr lang="pt-PT" sz="1800" b="1" dirty="0"/>
+              <a:t>Linguagem de programação</a:t>
             </a:r>
           </a:p>
           <a:p>
-            <a:pPr defTabSz="914400">
+            <a:pPr>
               <a:lnSpc>
-                <a:spcPct val="110000"/>
+                <a:spcPct val="100000"/>
               </a:lnSpc>
-              <a:spcAft>
-                <a:spcPts val="600"/>
-              </a:spcAft>
-              <a:buClr>
-                <a:schemeClr val="accent1"/>
-              </a:buClr>
-              <a:buFont typeface="Calibri" panose="020F0502020204030204" pitchFamily="34" charset="0"/>
             </a:pPr>
             <a:r>
-              <a:rPr lang="en-US" sz="1700" dirty="0"/>
+              <a:rPr lang="en-US" sz="1600" dirty="0"/>
               <a:t>Python, </a:t>
             </a:r>
             <a:r>
-              <a:rPr lang="en-US" sz="1700" dirty="0" err="1"/>
+              <a:rPr lang="en-US" sz="1600" dirty="0" err="1"/>
               <a:t>recorrendo</a:t>
             </a:r>
             <a:r>
-              <a:rPr lang="en-US" sz="1700" dirty="0"/>
+              <a:rPr lang="en-US" sz="1600" dirty="0"/>
               <a:t> </a:t>
             </a:r>
             <a:r>
-              <a:rPr lang="en-US" sz="1700" dirty="0" err="1"/>
+              <a:rPr lang="en-US" sz="1600" dirty="0" err="1"/>
               <a:t>ao</a:t>
             </a:r>
             <a:r>
-              <a:rPr lang="en-US" sz="1700" dirty="0"/>
+              <a:rPr lang="en-US" sz="1600" dirty="0"/>
               <a:t> </a:t>
             </a:r>
             <a:r>
-              <a:rPr lang="en-US" sz="1700" dirty="0" err="1"/>
+              <a:rPr lang="en-US" sz="1600" dirty="0" err="1"/>
               <a:t>pacote</a:t>
             </a:r>
             <a:r>
-              <a:rPr lang="en-US" sz="1700" dirty="0"/>
+              <a:rPr lang="en-US" sz="1600" dirty="0"/>
               <a:t> </a:t>
             </a:r>
             <a:r>
-              <a:rPr lang="en-US" sz="1700" i="1" dirty="0" err="1"/>
+              <a:rPr lang="en-US" sz="1600" i="1" dirty="0" err="1"/>
               <a:t>pygame</a:t>
             </a:r>
             <a:r>
-              <a:rPr lang="en-US" sz="1700" dirty="0"/>
+              <a:rPr lang="en-US" sz="1600" dirty="0"/>
               <a:t> para </a:t>
             </a:r>
             <a:r>
-              <a:rPr lang="en-US" sz="1700" dirty="0" err="1"/>
+              <a:rPr lang="en-US" sz="1600" dirty="0" err="1"/>
               <a:t>representação</a:t>
             </a:r>
             <a:r>
-              <a:rPr lang="en-US" sz="1700" dirty="0"/>
+              <a:rPr lang="en-US" sz="1600" dirty="0"/>
               <a:t> da interface do </a:t>
             </a:r>
             <a:r>
-              <a:rPr lang="en-US" sz="1700" dirty="0" err="1"/>
+              <a:rPr lang="en-US" sz="1600" dirty="0" err="1"/>
               <a:t>jogo</a:t>
             </a:r>
             <a:r>
-              <a:rPr lang="en-US" sz="1700" dirty="0"/>
+              <a:rPr lang="en-US" sz="1600" dirty="0"/>
               <a:t>.</a:t>
             </a:r>
           </a:p>
           <a:p>
-            <a:pPr defTabSz="914400">
+            <a:pPr>
               <a:lnSpc>
-                <a:spcPct val="110000"/>
+                <a:spcPct val="100000"/>
               </a:lnSpc>
-              <a:spcAft>
-                <a:spcPts val="600"/>
-              </a:spcAft>
-              <a:buClr>
-                <a:schemeClr val="accent1"/>
-              </a:buClr>
-              <a:buFont typeface="Calibri" panose="020F0502020204030204" pitchFamily="34" charset="0"/>
             </a:pPr>
             <a:r>
-              <a:rPr lang="en-US" sz="1900" b="1" dirty="0" err="1"/>
+              <a:rPr lang="en-US" sz="1800" b="1" dirty="0" err="1"/>
               <a:t>Ambiente</a:t>
             </a:r>
             <a:r>
-              <a:rPr lang="en-US" sz="1900" b="1" dirty="0"/>
+              <a:rPr lang="en-US" sz="1800" b="1" dirty="0"/>
               <a:t> de </a:t>
             </a:r>
             <a:r>
-              <a:rPr lang="en-US" sz="1900" b="1" dirty="0" err="1"/>
+              <a:rPr lang="en-US" sz="1800" b="1" dirty="0" err="1"/>
               <a:t>desenvolvimento</a:t>
             </a:r>
-            <a:r>
-              <a:rPr lang="en-US" sz="1900" b="1" dirty="0"/>
-              <a:t>: </a:t>
-            </a:r>
+            <a:endParaRPr lang="en-US" sz="1800" b="1" dirty="0"/>
           </a:p>
           <a:p>
-            <a:pPr defTabSz="914400">
+            <a:pPr>
               <a:lnSpc>
-                <a:spcPct val="110000"/>
+                <a:spcPct val="100000"/>
               </a:lnSpc>
-              <a:spcAft>
-                <a:spcPts val="600"/>
-              </a:spcAft>
-              <a:buClr>
-                <a:schemeClr val="accent1"/>
-              </a:buClr>
-              <a:buFont typeface="Calibri" panose="020F0502020204030204" pitchFamily="34" charset="0"/>
             </a:pPr>
             <a:r>
-              <a:rPr lang="en-US" sz="1700" dirty="0" err="1"/>
+              <a:rPr lang="en-US" sz="1600" dirty="0" err="1"/>
               <a:t>VSCode</a:t>
             </a:r>
             <a:r>
-              <a:rPr lang="en-US" sz="1700" dirty="0"/>
-              <a:t> / Spyder.</a:t>
+              <a:rPr lang="en-US" sz="1600" dirty="0"/>
+              <a:t>/ Spyder</a:t>
             </a:r>
           </a:p>
           <a:p>
-            <a:pPr defTabSz="914400">
+            <a:pPr>
               <a:lnSpc>
-                <a:spcPct val="110000"/>
+                <a:spcPct val="100000"/>
               </a:lnSpc>
-              <a:spcAft>
-                <a:spcPts val="600"/>
-              </a:spcAft>
-              <a:buClr>
-                <a:schemeClr val="accent1"/>
-              </a:buClr>
-              <a:buFont typeface="Calibri" panose="020F0502020204030204" pitchFamily="34" charset="0"/>
             </a:pPr>
             <a:r>
-              <a:rPr lang="en-US" sz="1900" b="1" dirty="0" err="1"/>
+              <a:rPr lang="en-US" sz="1800" b="1" dirty="0" err="1"/>
               <a:t>Estruturas</a:t>
             </a:r>
             <a:r>
-              <a:rPr lang="en-US" sz="1900" b="1" dirty="0"/>
-              <a:t> de dados:</a:t>
+              <a:rPr lang="en-US" sz="1800" b="1" dirty="0"/>
+              <a:t> de dados</a:t>
             </a:r>
           </a:p>
           <a:p>
-            <a:pPr marL="742950" lvl="1" indent="-285750" defTabSz="914400">
+            <a:pPr>
               <a:lnSpc>
-                <a:spcPct val="110000"/>
+                <a:spcPct val="100000"/>
               </a:lnSpc>
-              <a:spcAft>
-                <a:spcPts val="600"/>
-              </a:spcAft>
-              <a:buClr>
-                <a:schemeClr val="accent1"/>
-              </a:buClr>
-              <a:buFont typeface="Arial" panose="020B0604020202020204" pitchFamily="34" charset="0"/>
-              <a:buChar char="•"/>
             </a:pPr>
             <a:r>
-              <a:rPr lang="en-US" sz="1700" dirty="0" err="1"/>
-              <a:t>Listas</a:t>
-            </a:r>
-            <a:r>
-              <a:rPr lang="en-US" sz="1700" dirty="0"/>
-              <a:t>, para </a:t>
-            </a:r>
-            <a:r>
-              <a:rPr lang="en-US" sz="1700" dirty="0" err="1"/>
-              <a:t>representar</a:t>
-            </a:r>
-            <a:r>
-              <a:rPr lang="en-US" sz="1700" dirty="0"/>
+              <a:rPr lang="en-US" sz="1600" i="1" dirty="0"/>
+              <a:t>Board</a:t>
+            </a:r>
+            <a:r>
+              <a:rPr lang="en-US" sz="1600" dirty="0"/>
+              <a:t>, que </a:t>
+            </a:r>
+            <a:r>
+              <a:rPr lang="en-US" sz="1600" dirty="0" err="1"/>
+              <a:t>contém</a:t>
+            </a:r>
+            <a:r>
+              <a:rPr lang="en-US" sz="1600" dirty="0"/>
+              <a:t> o </a:t>
+            </a:r>
+            <a:r>
+              <a:rPr lang="en-US" sz="1600" dirty="0" err="1"/>
+              <a:t>estado</a:t>
+            </a:r>
+            <a:r>
+              <a:rPr lang="en-US" sz="1600" dirty="0"/>
               <a:t> </a:t>
             </a:r>
             <a:r>
-              <a:rPr lang="en-US" sz="1700" dirty="0" err="1"/>
-              <a:t>os</a:t>
-            </a:r>
-            <a:r>
-              <a:rPr lang="en-US" sz="1700" dirty="0"/>
-              <a:t> </a:t>
-            </a:r>
-            <a:r>
-              <a:rPr lang="en-US" sz="1700" dirty="0" err="1"/>
-              <a:t>tabuleiros</a:t>
-            </a:r>
-            <a:r>
-              <a:rPr lang="en-US" sz="1700" dirty="0"/>
-              <a:t> de </a:t>
-            </a:r>
-            <a:r>
-              <a:rPr lang="en-US" sz="1700" dirty="0" err="1"/>
-              <a:t>jogo</a:t>
-            </a:r>
-            <a:r>
-              <a:rPr lang="en-US" sz="1700" dirty="0"/>
+              <a:rPr lang="en-US" sz="1600" dirty="0" err="1"/>
+              <a:t>atual</a:t>
+            </a:r>
+            <a:r>
+              <a:rPr lang="en-US" sz="1600" dirty="0"/>
+              <a:t> do </a:t>
+            </a:r>
+            <a:r>
+              <a:rPr lang="en-US" sz="1600" dirty="0" err="1"/>
+              <a:t>tabuleiro</a:t>
+            </a:r>
+            <a:r>
+              <a:rPr lang="en-US" sz="1600" dirty="0"/>
               <a:t>;</a:t>
             </a:r>
           </a:p>
           <a:p>
-            <a:pPr marL="742950" lvl="1" indent="-285750" defTabSz="914400">
+            <a:pPr>
               <a:lnSpc>
-                <a:spcPct val="110000"/>
+                <a:spcPct val="100000"/>
               </a:lnSpc>
-              <a:spcAft>
-                <a:spcPts val="600"/>
-              </a:spcAft>
-              <a:buClr>
-                <a:schemeClr val="accent1"/>
-              </a:buClr>
-              <a:buFont typeface="Arial" panose="020B0604020202020204" pitchFamily="34" charset="0"/>
-              <a:buChar char="•"/>
             </a:pPr>
             <a:r>
-              <a:rPr lang="en-US" sz="1700" i="1" dirty="0"/>
-              <a:t>Nodes</a:t>
-            </a:r>
-            <a:r>
-              <a:rPr lang="en-US" sz="1700" dirty="0"/>
-              <a:t> e </a:t>
-            </a:r>
-            <a:r>
-              <a:rPr lang="en-US" sz="1700" i="1" dirty="0"/>
-              <a:t>Graphs</a:t>
-            </a:r>
-            <a:r>
-              <a:rPr lang="en-US" sz="1700" dirty="0"/>
-              <a:t>.</a:t>
+              <a:rPr lang="en-US" sz="1600" i="1" dirty="0"/>
+              <a:t>Node</a:t>
+            </a:r>
+            <a:r>
+              <a:rPr lang="en-US" sz="1600" dirty="0"/>
+              <a:t>, para </a:t>
+            </a:r>
+            <a:r>
+              <a:rPr lang="en-US" sz="1600" dirty="0" err="1"/>
+              <a:t>guardas</a:t>
+            </a:r>
+            <a:r>
+              <a:rPr lang="en-US" sz="1600" dirty="0"/>
+              <a:t> as </a:t>
+            </a:r>
+            <a:r>
+              <a:rPr lang="en-US" sz="1600" dirty="0" err="1"/>
+              <a:t>informações</a:t>
+            </a:r>
+            <a:r>
+              <a:rPr lang="en-US" sz="1600" dirty="0"/>
+              <a:t> dos </a:t>
+            </a:r>
+            <a:r>
+              <a:rPr lang="en-US" sz="1600" dirty="0" err="1"/>
+              <a:t>diferentes</a:t>
+            </a:r>
+            <a:r>
+              <a:rPr lang="en-US" sz="1600" dirty="0"/>
+              <a:t> </a:t>
+            </a:r>
+            <a:r>
+              <a:rPr lang="en-US" sz="1600" dirty="0" err="1"/>
+              <a:t>nós</a:t>
+            </a:r>
+            <a:r>
+              <a:rPr lang="en-US" sz="1600" dirty="0"/>
+              <a:t> </a:t>
+            </a:r>
+            <a:r>
+              <a:rPr lang="en-US" sz="1600" dirty="0" err="1"/>
+              <a:t>gerados</a:t>
+            </a:r>
+            <a:r>
+              <a:rPr lang="en-US" sz="1600" dirty="0"/>
+              <a:t> </a:t>
+            </a:r>
+            <a:r>
+              <a:rPr lang="en-US" sz="1600" dirty="0" err="1"/>
+              <a:t>durante</a:t>
+            </a:r>
+            <a:r>
+              <a:rPr lang="en-US" sz="1600" dirty="0"/>
+              <a:t> a </a:t>
+            </a:r>
+            <a:r>
+              <a:rPr lang="en-US" sz="1600" dirty="0" err="1"/>
+              <a:t>pesquisa</a:t>
+            </a:r>
+            <a:r>
+              <a:rPr lang="en-US" sz="1600" dirty="0"/>
+              <a:t>;</a:t>
             </a:r>
           </a:p>
           <a:p>
-            <a:pPr defTabSz="914400">
+            <a:pPr>
               <a:lnSpc>
-                <a:spcPct val="110000"/>
+                <a:spcPct val="100000"/>
               </a:lnSpc>
-              <a:spcAft>
-                <a:spcPts val="600"/>
-              </a:spcAft>
-              <a:buClr>
-                <a:schemeClr val="accent1"/>
-              </a:buClr>
-              <a:buFont typeface="Calibri" panose="020F0502020204030204" pitchFamily="34" charset="0"/>
             </a:pPr>
             <a:r>
-              <a:rPr lang="en-US" sz="1900" b="1" dirty="0" err="1"/>
-              <a:t>Estrutura</a:t>
-            </a:r>
-            <a:r>
-              <a:rPr lang="en-US" sz="1900" b="1" dirty="0"/>
-              <a:t> de </a:t>
-            </a:r>
-            <a:r>
-              <a:rPr lang="en-US" sz="1900" b="1" dirty="0" err="1"/>
-              <a:t>ficheiros</a:t>
-            </a:r>
-            <a:r>
-              <a:rPr lang="en-US" sz="1900" b="1" dirty="0"/>
-              <a:t>: </a:t>
-            </a:r>
+              <a:rPr lang="en-US" sz="1600" i="1" dirty="0"/>
+              <a:t>Piece</a:t>
+            </a:r>
+            <a:r>
+              <a:rPr lang="en-US" sz="1600" dirty="0"/>
+              <a:t>, que </a:t>
+            </a:r>
+            <a:r>
+              <a:rPr lang="en-US" sz="1600" dirty="0" err="1"/>
+              <a:t>guarda</a:t>
+            </a:r>
+            <a:r>
+              <a:rPr lang="en-US" sz="1600" dirty="0"/>
+              <a:t> as </a:t>
+            </a:r>
+            <a:r>
+              <a:rPr lang="en-US" sz="1600" dirty="0" err="1"/>
+              <a:t>informações</a:t>
+            </a:r>
+            <a:r>
+              <a:rPr lang="en-US" sz="1600" dirty="0"/>
+              <a:t> </a:t>
+            </a:r>
+            <a:r>
+              <a:rPr lang="en-US" sz="1600" dirty="0" err="1"/>
+              <a:t>sobre</a:t>
+            </a:r>
+            <a:r>
+              <a:rPr lang="en-US" sz="1600" dirty="0"/>
+              <a:t> a </a:t>
+            </a:r>
+            <a:r>
+              <a:rPr lang="en-US" sz="1600" dirty="0" err="1"/>
+              <a:t>localização</a:t>
+            </a:r>
+            <a:r>
+              <a:rPr lang="en-US" sz="1600" dirty="0"/>
+              <a:t> das </a:t>
+            </a:r>
+            <a:r>
+              <a:rPr lang="en-US" sz="1600" dirty="0" err="1"/>
+              <a:t>peças</a:t>
+            </a:r>
+            <a:r>
+              <a:rPr lang="en-US" sz="1600" dirty="0"/>
+              <a:t> e a </a:t>
+            </a:r>
+            <a:r>
+              <a:rPr lang="en-US" sz="1600" dirty="0" err="1"/>
+              <a:t>respetiva</a:t>
+            </a:r>
+            <a:r>
+              <a:rPr lang="en-US" sz="1600" dirty="0"/>
+              <a:t> cor.</a:t>
+            </a:r>
+            <a:endParaRPr lang="en-US" sz="1600" i="1" dirty="0"/>
           </a:p>
           <a:p>
-            <a:pPr defTabSz="914400">
+            <a:pPr marL="201168" lvl="1" indent="0">
               <a:lnSpc>
-                <a:spcPct val="110000"/>
+                <a:spcPct val="100000"/>
               </a:lnSpc>
-              <a:spcAft>
-                <a:spcPts val="600"/>
-              </a:spcAft>
-              <a:buClr>
-                <a:schemeClr val="accent1"/>
-              </a:buClr>
-              <a:buFont typeface="Calibri" panose="020F0502020204030204" pitchFamily="34" charset="0"/>
+              <a:buNone/>
             </a:pPr>
             <a:r>
-              <a:rPr lang="en-US" sz="1700" dirty="0"/>
-              <a:t>A </a:t>
-            </a:r>
-            <a:r>
-              <a:rPr lang="en-US" sz="1700" dirty="0" err="1"/>
-              <a:t>figura</a:t>
-            </a:r>
-            <a:r>
-              <a:rPr lang="en-US" sz="1700" dirty="0"/>
-              <a:t> </a:t>
-            </a:r>
-            <a:r>
-              <a:rPr lang="en-US" sz="1700" dirty="0" err="1"/>
-              <a:t>ao</a:t>
-            </a:r>
-            <a:r>
-              <a:rPr lang="en-US" sz="1700" dirty="0"/>
-              <a:t> </a:t>
-            </a:r>
-            <a:r>
-              <a:rPr lang="en-US" sz="1700" dirty="0" err="1"/>
-              <a:t>lado</a:t>
-            </a:r>
-            <a:r>
-              <a:rPr lang="en-US" sz="1700" dirty="0"/>
-              <a:t> </a:t>
-            </a:r>
-            <a:r>
-              <a:rPr lang="en-US" sz="1700" dirty="0" err="1"/>
-              <a:t>representa</a:t>
-            </a:r>
-            <a:r>
-              <a:rPr lang="en-US" sz="1700" dirty="0"/>
-              <a:t> a </a:t>
-            </a:r>
-            <a:r>
-              <a:rPr lang="en-US" sz="1700" dirty="0" err="1"/>
-              <a:t>estrutura</a:t>
-            </a:r>
-            <a:r>
-              <a:rPr lang="en-US" sz="1700" dirty="0"/>
-              <a:t> dos </a:t>
-            </a:r>
-            <a:r>
-              <a:rPr lang="en-US" sz="1700" dirty="0" err="1"/>
+              <a:rPr lang="en-US" b="1" dirty="0" err="1"/>
+              <a:t>Estrutura</a:t>
+            </a:r>
+            <a:r>
+              <a:rPr lang="en-US" b="1" dirty="0"/>
+              <a:t> de </a:t>
+            </a:r>
+            <a:r>
+              <a:rPr lang="en-US" b="1" dirty="0" err="1"/>
               <a:t>ficheiros</a:t>
             </a:r>
-            <a:r>
-              <a:rPr lang="en-US" sz="1700" dirty="0"/>
-              <a:t> com </a:t>
-            </a:r>
-            <a:r>
-              <a:rPr lang="en-US" sz="1700" dirty="0" err="1"/>
-              <a:t>diferentes</a:t>
-            </a:r>
-            <a:r>
-              <a:rPr lang="en-US" sz="1700" dirty="0"/>
-              <a:t> </a:t>
-            </a:r>
-            <a:r>
-              <a:rPr lang="en-US" sz="1700" dirty="0" err="1"/>
-              <a:t>matrizes</a:t>
-            </a:r>
-            <a:r>
-              <a:rPr lang="en-US" sz="1700" dirty="0"/>
-              <a:t> para </a:t>
-            </a:r>
-            <a:r>
-              <a:rPr lang="en-US" sz="1700" dirty="0" err="1"/>
-              <a:t>diferentes</a:t>
-            </a:r>
-            <a:r>
-              <a:rPr lang="en-US" sz="1700" dirty="0"/>
-              <a:t> </a:t>
-            </a:r>
-            <a:r>
-              <a:rPr lang="en-US" sz="1700" dirty="0" err="1"/>
-              <a:t>níveis</a:t>
-            </a:r>
-            <a:r>
-              <a:rPr lang="en-US" sz="1700" dirty="0"/>
-              <a:t> com </a:t>
-            </a:r>
-            <a:r>
-              <a:rPr lang="en-US" sz="1700" dirty="0" err="1"/>
-              <a:t>os</a:t>
-            </a:r>
-            <a:r>
-              <a:rPr lang="en-US" sz="1700" dirty="0"/>
-              <a:t> </a:t>
-            </a:r>
-            <a:r>
-              <a:rPr lang="en-US" sz="1700" dirty="0" err="1"/>
-              <a:t>quais</a:t>
-            </a:r>
-            <a:r>
-              <a:rPr lang="en-US" sz="1700" dirty="0"/>
-              <a:t> </a:t>
-            </a:r>
-            <a:r>
-              <a:rPr lang="en-US" sz="1700" dirty="0" err="1"/>
-              <a:t>podemos</a:t>
-            </a:r>
-            <a:r>
-              <a:rPr lang="en-US" sz="1700" dirty="0"/>
-              <a:t> </a:t>
-            </a:r>
-            <a:r>
-              <a:rPr lang="en-US" sz="1700" dirty="0" err="1"/>
-              <a:t>testar</a:t>
-            </a:r>
-            <a:r>
-              <a:rPr lang="en-US" sz="1700" dirty="0"/>
-              <a:t> o </a:t>
-            </a:r>
-            <a:r>
-              <a:rPr lang="en-US" sz="1700" dirty="0" err="1"/>
-              <a:t>jogo</a:t>
-            </a:r>
-            <a:r>
-              <a:rPr lang="en-US" sz="1700" dirty="0"/>
-              <a:t>;</a:t>
-            </a:r>
+            <a:endParaRPr lang="en-US" b="1" dirty="0"/>
+          </a:p>
+          <a:p>
+            <a:pPr>
+              <a:lnSpc>
+                <a:spcPct val="100000"/>
+              </a:lnSpc>
+            </a:pPr>
+            <a:endParaRPr lang="en-US" sz="1600" dirty="0"/>
+          </a:p>
+          <a:p>
+            <a:pPr>
+              <a:lnSpc>
+                <a:spcPct val="100000"/>
+              </a:lnSpc>
+            </a:pPr>
+            <a:endParaRPr lang="en-US" sz="1600" dirty="0"/>
+          </a:p>
+          <a:p>
+            <a:pPr>
+              <a:lnSpc>
+                <a:spcPct val="100000"/>
+              </a:lnSpc>
+            </a:pPr>
+            <a:endParaRPr lang="en-US" sz="1600" dirty="0"/>
+          </a:p>
+          <a:p>
+            <a:pPr>
+              <a:lnSpc>
+                <a:spcPct val="100000"/>
+              </a:lnSpc>
+            </a:pPr>
+            <a:endParaRPr lang="en-US" sz="1800" b="1" dirty="0"/>
+          </a:p>
+          <a:p>
+            <a:pPr>
+              <a:lnSpc>
+                <a:spcPct val="100000"/>
+              </a:lnSpc>
+            </a:pPr>
+            <a:endParaRPr lang="pt-PT" sz="1800" b="1" dirty="0"/>
           </a:p>
         </p:txBody>
       </p:sp>
       <p:pic>
         <p:nvPicPr>
-          <p:cNvPr id="4" name="Imagem 3">
+          <p:cNvPr id="5" name="Imagem 4">
             <a:extLst>
               <a:ext uri="{FF2B5EF4-FFF2-40B4-BE49-F238E27FC236}">
-                <a16:creationId xmlns:a16="http://schemas.microsoft.com/office/drawing/2014/main" id="{289067F9-24FD-417D-A685-401245CB9FF5}"/>
+                <a16:creationId xmlns:a16="http://schemas.microsoft.com/office/drawing/2014/main" id="{4B6A91D3-9B4E-4BD2-B41A-71BFCFEB20B5}"/>
               </a:ext>
             </a:extLst>
           </p:cNvPr>
@@ -37670,26 +38432,54 @@
           </p:cNvPicPr>
           <p:nvPr/>
         </p:nvPicPr>
-        <p:blipFill>
+        <p:blipFill rotWithShape="1">
           <a:blip r:embed="rId2"/>
-          <a:stretch>
-            <a:fillRect/>
-          </a:stretch>
+          <a:srcRect r="73911" b="29208"/>
+          <a:stretch/>
         </p:blipFill>
         <p:spPr>
           <a:xfrm>
-            <a:off x="8020571" y="2559463"/>
-            <a:ext cx="3135109" cy="2595901"/>
+            <a:off x="7821706" y="2252229"/>
+            <a:ext cx="2346025" cy="3350189"/>
           </a:xfrm>
           <a:prstGeom prst="rect">
             <a:avLst/>
           </a:prstGeom>
         </p:spPr>
       </p:pic>
+      <p:sp>
+        <p:nvSpPr>
+          <p:cNvPr id="6" name="Marcador de Posição do Número do Diapositivo 5">
+            <a:extLst>
+              <a:ext uri="{FF2B5EF4-FFF2-40B4-BE49-F238E27FC236}">
+                <a16:creationId xmlns:a16="http://schemas.microsoft.com/office/drawing/2014/main" id="{53705A0F-6F5E-4684-86D5-E4A682DBF4DD}"/>
+              </a:ext>
+            </a:extLst>
+          </p:cNvPr>
+          <p:cNvSpPr>
+            <a:spLocks noGrp="1"/>
+          </p:cNvSpPr>
+          <p:nvPr>
+            <p:ph type="sldNum" sz="quarter" idx="12"/>
+          </p:nvPr>
+        </p:nvSpPr>
+        <p:spPr/>
+        <p:txBody>
+          <a:bodyPr/>
+          <a:lstStyle/>
+          <a:p>
+            <a:fld id="{6D22F896-40B5-4ADD-8801-0D06FADFA095}" type="slidenum">
+              <a:rPr lang="en-US" smtClean="0"/>
+              <a:t>7</a:t>
+            </a:fld>
+            <a:endParaRPr lang="en-US" dirty="0"/>
+          </a:p>
+        </p:txBody>
+      </p:sp>
     </p:spTree>
     <p:extLst>
       <p:ext uri="{BB962C8B-B14F-4D97-AF65-F5344CB8AC3E}">
-        <p14:creationId xmlns:p14="http://schemas.microsoft.com/office/powerpoint/2010/main" val="3453389440"/>
+        <p14:creationId xmlns:p14="http://schemas.microsoft.com/office/powerpoint/2010/main" val="3965298699"/>
       </p:ext>
     </p:extLst>
   </p:cSld>
@@ -37893,8 +38683,8 @@
         </p:nvSpPr>
         <p:spPr>
           <a:xfrm>
-            <a:off x="1097280" y="2023963"/>
-            <a:ext cx="9966960" cy="4200989"/>
+            <a:off x="668215" y="2023963"/>
+            <a:ext cx="10858500" cy="4200989"/>
           </a:xfrm>
         </p:spPr>
         <p:txBody>
@@ -37920,7 +38710,7 @@
             </a:r>
             <a:r>
               <a:rPr lang="pt-PT" sz="1600" dirty="0"/>
-              <a:t>A DFS consiste na expansão dos nós da árvore, começando na sua raiz, e aprofundando progressivamente a cada interação, até chegar ao nó de profundidade máxima, retrocedendo depois para visitar os restantes. </a:t>
+              <a:t>A DFS consiste na expansão dos nós da árvore, começando na sua raiz, e aprofundando progressivamente a cada iteração, até chegar ao nó de profundidade máxima, retrocedendo depois para visitar os restantes. </a:t>
             </a:r>
           </a:p>
           <a:p>
@@ -37933,7 +38723,7 @@
             </a:pPr>
             <a:r>
               <a:rPr lang="pt-PT" sz="1600" dirty="0"/>
-              <a:t>De modo a tornar o algoritmo um pouco mais eficiente removemos todos os ciclos evitando repetir estados de tabuleiro já visitados.  No nosso problema, um nó é explorado em profundidade até se encontrar uma solução, terminando a pesquisa. Desta forma é sempre encontrada uma solução mas não sendo garantida a solução ótima (menor número de movimentos).</a:t>
+              <a:t>De modo a tornar o algoritmo um pouco mais eficiente removemos todos os ciclos evitando repetir estados de tabuleiro já visitados. No nosso problema, um nó é explorado em profundidade até se encontrar uma solução, terminando a pesquisa. Desta forma é sempre encontrada uma solução, mas não é garantida a solução ótima (menor número de movimentos).</a:t>
             </a:r>
           </a:p>
           <a:p>
@@ -37954,7 +38744,7 @@
             </a:r>
             <a:r>
               <a:rPr lang="pt-PT" sz="1600" dirty="0"/>
-              <a:t>A BFS, por sua vez, consiste na expansão dos nós em largura, ou seja, nível a nível, apenas passando para uma profundidade d+1 quando todos os nós tiverem sido visitados. </a:t>
+              <a:t>A BFS, por sua vez, consiste na expansão dos nós em largura, ou seja, nível a nível, apenas passando para uma profundidade d+1 quando todos os nós de d tiverem sido visitados. </a:t>
             </a:r>
           </a:p>
           <a:p>
@@ -38012,7 +38802,7 @@
             </a:r>
             <a:r>
               <a:rPr lang="pt-PT" sz="1600" dirty="0"/>
-              <a:t> efetuamos uma DFS com um nível de profundidade limitado e fomos aumentando esse nível de profundidade até encontrar uma solução.</a:t>
+              <a:t>, efetuamos uma DFS com um nível de profundidade limitado e fomos aumentando esse nível de profundidade até encontrar uma solução.</a:t>
             </a:r>
           </a:p>
           <a:p>
@@ -38145,6 +38935,35 @@
             <a:schemeClr val="lt1"/>
           </a:fontRef>
         </p:style>
+      </p:sp>
+      <p:sp>
+        <p:nvSpPr>
+          <p:cNvPr id="4" name="Marcador de Posição do Número do Diapositivo 3">
+            <a:extLst>
+              <a:ext uri="{FF2B5EF4-FFF2-40B4-BE49-F238E27FC236}">
+                <a16:creationId xmlns:a16="http://schemas.microsoft.com/office/drawing/2014/main" id="{93F82EF0-EBC6-4124-A2BF-7FE55304B008}"/>
+              </a:ext>
+            </a:extLst>
+          </p:cNvPr>
+          <p:cNvSpPr>
+            <a:spLocks noGrp="1"/>
+          </p:cNvSpPr>
+          <p:nvPr>
+            <p:ph type="sldNum" sz="quarter" idx="12"/>
+          </p:nvPr>
+        </p:nvSpPr>
+        <p:spPr/>
+        <p:txBody>
+          <a:bodyPr/>
+          <a:lstStyle/>
+          <a:p>
+            <a:fld id="{6D22F896-40B5-4ADD-8801-0D06FADFA095}" type="slidenum">
+              <a:rPr lang="en-US" smtClean="0"/>
+              <a:t>8</a:t>
+            </a:fld>
+            <a:endParaRPr lang="en-US" dirty="0"/>
+          </a:p>
+        </p:txBody>
       </p:sp>
     </p:spTree>
     <p:extLst>
@@ -38380,7 +39199,7 @@
             </a:r>
             <a:r>
               <a:rPr lang="pt-PT" sz="1600" dirty="0"/>
-              <a:t>Esta pesquisa é semelhante à DFS, no sentido em que exporá os nós por níveis de profundidade, mas, em vez de os expandir por ordem, estes irão ser ordenados segundo uma função de custo, sendo explorados os nós de um determinado nível por ordem desse custo (de menor para maior). </a:t>
+              <a:t>Esta pesquisa é semelhante à BFS, no sentido em que explorará os nós por níveis de profundidade, mas, em vez de os expandir por ordem, estes irão ser ordenados segundo uma função de custo, sendo explorados os nós de um determinado nível por ordem desse custo (do menor para o maior). </a:t>
             </a:r>
           </a:p>
           <a:p>
@@ -38395,14 +39214,6 @@
               <a:rPr lang="pt-PT" sz="1600" dirty="0"/>
               <a:t>Como o custo de qualquer movimento neste caso é sempre 1, então este algoritmo torna-se igual à pesquisa em largura.</a:t>
             </a:r>
-          </a:p>
-          <a:p>
-            <a:pPr marL="384048" lvl="2" indent="0">
-              <a:lnSpc>
-                <a:spcPct val="100000"/>
-              </a:lnSpc>
-              <a:buNone/>
-            </a:pPr>
             <a:endParaRPr lang="pt-PT" sz="1600" b="1" dirty="0"/>
           </a:p>
           <a:p>
@@ -38423,7 +39234,7 @@
             </a:r>
             <a:r>
               <a:rPr lang="pt-PT" sz="1600" dirty="0"/>
-              <a:t>O algoritmo ganancioso explora os nós em profundidade, utilizando uma heurística gananciosa para escolher o próximo nó a explorar. No caso tratado, a heurística atribui um valor a um nó, que será tanto maior quanto maior for a distância estimada à solução. O nó escolhido é aquele que minimiza a distância à solução. </a:t>
+              <a:t>O algoritmo ganancioso explora os nós em profundidade, utilizando uma heurística gananciosa para escolher o próximo nó a explorar. </a:t>
             </a:r>
           </a:p>
           <a:p>
@@ -38444,7 +39255,7 @@
             </a:r>
             <a:r>
               <a:rPr lang="pt-PT" sz="1600" dirty="0"/>
-              <a:t>Este combina o custo para chegar até ao nó atual, com a estimativa do custo de avançar para o próximo nó (g(n)), somando isto ao valor retornado pela heurística da pesquisa gananciosa (h(n)), sendo f(n)= g(n)+h(n), seguindo sempre o caminho que minimiza f(n). O algoritmo A* necessita de manter todos os nós em  memória enquanto procura a solução uma vez que efetua uma pesquisa exaustiva. Assim enquanto que a complexidade temporal é igual à do </a:t>
+              <a:t>Este algoritmo combina o custo para chegar até ao nó atual (f(n)), com a estimativa do custo de avançar para o próximo nó (g(n)), sendo f(n)= g(n)+h(n), seguindo sempre o caminho que minimiza f(n). O algoritmo A* necessita de manter todos os nós em  memória enquanto procura a solução uma vez que efetua uma pesquisa exaustiva. Assim enquanto que a complexidade temporal é igual à do </a:t>
             </a:r>
             <a:r>
               <a:rPr lang="pt-PT" sz="1600" dirty="0" err="1"/>
@@ -38472,7 +39283,7 @@
             </a:pPr>
             <a:r>
               <a:rPr lang="pt-PT" sz="1600" u="sng" dirty="0"/>
-              <a:t>Enquanto que o algoritmo A* alcança sempre a solução ótima e é completo o algoritmo </a:t>
+              <a:t>Enquanto que o algoritmo A* alcança sempre a solução ótima e é completo, o algoritmo </a:t>
             </a:r>
             <a:r>
               <a:rPr lang="pt-PT" sz="1600" u="sng" dirty="0" err="1"/>
@@ -38485,6 +39296,26 @@
             <a:r>
               <a:rPr lang="pt-PT" sz="1600" dirty="0"/>
               <a:t>(Ver anexo I e II para comparação de resultados).</a:t>
+            </a:r>
+          </a:p>
+          <a:p>
+            <a:pPr marL="201168" lvl="1" indent="0">
+              <a:lnSpc>
+                <a:spcPct val="100000"/>
+              </a:lnSpc>
+              <a:buNone/>
+            </a:pPr>
+            <a:r>
+              <a:rPr lang="pt-PT" sz="1600" dirty="0"/>
+              <a:t>Devido às limitações do hardware, implementamos um </a:t>
+            </a:r>
+            <a:r>
+              <a:rPr lang="pt-PT" sz="1600" i="1" dirty="0" err="1"/>
+              <a:t>max-depth</a:t>
+            </a:r>
+            <a:r>
+              <a:rPr lang="pt-PT" sz="1600" dirty="0"/>
+              <a:t> nos algoritmos.</a:t>
             </a:r>
           </a:p>
         </p:txBody>
@@ -38598,6 +39429,35 @@
             <a:schemeClr val="lt1"/>
           </a:fontRef>
         </p:style>
+      </p:sp>
+      <p:sp>
+        <p:nvSpPr>
+          <p:cNvPr id="4" name="Marcador de Posição do Número do Diapositivo 3">
+            <a:extLst>
+              <a:ext uri="{FF2B5EF4-FFF2-40B4-BE49-F238E27FC236}">
+                <a16:creationId xmlns:a16="http://schemas.microsoft.com/office/drawing/2014/main" id="{68B1601D-4497-40A7-8866-33E52AD005C2}"/>
+              </a:ext>
+            </a:extLst>
+          </p:cNvPr>
+          <p:cNvSpPr>
+            <a:spLocks noGrp="1"/>
+          </p:cNvSpPr>
+          <p:nvPr>
+            <p:ph type="sldNum" sz="quarter" idx="12"/>
+          </p:nvPr>
+        </p:nvSpPr>
+        <p:spPr/>
+        <p:txBody>
+          <a:bodyPr/>
+          <a:lstStyle/>
+          <a:p>
+            <a:fld id="{6D22F896-40B5-4ADD-8801-0D06FADFA095}" type="slidenum">
+              <a:rPr lang="en-US" smtClean="0"/>
+              <a:t>9</a:t>
+            </a:fld>
+            <a:endParaRPr lang="en-US" dirty="0"/>
+          </a:p>
+        </p:txBody>
       </p:sp>
     </p:spTree>
     <p:extLst>

</xml_diff>